<commit_message>
Updated slides a bit
</commit_message>
<xml_diff>
--- a/slides.pptx
+++ b/slides.pptx
@@ -1869,7 +1869,11 @@
         <a:p>
           <a:r>
             <a:rPr lang="cs-CZ" dirty="0" err="1"/>
-            <a:t>AngularJS</a:t>
+            <a:t>Angular</a:t>
+          </a:r>
+          <a:r>
+            <a:rPr lang="en-US" dirty="0"/>
+            <a:t> 5</a:t>
           </a:r>
           <a:r>
             <a:rPr lang="cs-CZ" dirty="0"/>
@@ -1910,15 +1914,19 @@
         <a:p>
           <a:r>
             <a:rPr lang="cs-CZ" dirty="0"/>
-            <a:t>ASP.NET </a:t>
+            <a:t>ASP.NET</a:t>
+          </a:r>
+          <a:r>
+            <a:rPr lang="en-US" dirty="0"/>
+            <a:t> Core 2.0</a:t>
+          </a:r>
+          <a:r>
+            <a:rPr lang="cs-CZ" dirty="0"/>
+            <a:t> </a:t>
           </a:r>
           <a:r>
             <a:rPr lang="cs-CZ" dirty="0" err="1"/>
             <a:t>WebApi</a:t>
-          </a:r>
-          <a:r>
-            <a:rPr lang="cs-CZ" dirty="0"/>
-            <a:t> 2</a:t>
           </a:r>
           <a:endParaRPr lang="en-US" dirty="0"/>
         </a:p>
@@ -1994,13 +2002,6 @@
         </dgm:presLayoutVars>
       </dgm:prSet>
       <dgm:spPr/>
-      <dgm:t>
-        <a:bodyPr/>
-        <a:lstStyle/>
-        <a:p>
-          <a:endParaRPr lang="en-US"/>
-        </a:p>
-      </dgm:t>
     </dgm:pt>
     <dgm:pt modelId="{4853A456-28BC-459E-BFA7-7805F4980305}" type="pres">
       <dgm:prSet presAssocID="{85F6D996-621E-43A0-B8BB-E6C3CC6879E9}" presName="vertOne" presStyleCnt="0"/>
@@ -2013,13 +2014,6 @@
         </dgm:presLayoutVars>
       </dgm:prSet>
       <dgm:spPr/>
-      <dgm:t>
-        <a:bodyPr/>
-        <a:lstStyle/>
-        <a:p>
-          <a:endParaRPr lang="en-US"/>
-        </a:p>
-      </dgm:t>
     </dgm:pt>
     <dgm:pt modelId="{30E120FB-9E43-4888-B445-BA5494088806}" type="pres">
       <dgm:prSet presAssocID="{85F6D996-621E-43A0-B8BB-E6C3CC6879E9}" presName="parTransOne" presStyleCnt="0"/>
@@ -2040,13 +2034,6 @@
         </dgm:presLayoutVars>
       </dgm:prSet>
       <dgm:spPr/>
-      <dgm:t>
-        <a:bodyPr/>
-        <a:lstStyle/>
-        <a:p>
-          <a:endParaRPr lang="en-US"/>
-        </a:p>
-      </dgm:t>
     </dgm:pt>
     <dgm:pt modelId="{2CF4CEA0-9B9E-4B73-9E29-9DC519907121}" type="pres">
       <dgm:prSet presAssocID="{FE17895F-0746-4ADD-9481-12F74E42C850}" presName="parTransTwo" presStyleCnt="0"/>
@@ -2067,13 +2054,6 @@
         </dgm:presLayoutVars>
       </dgm:prSet>
       <dgm:spPr/>
-      <dgm:t>
-        <a:bodyPr/>
-        <a:lstStyle/>
-        <a:p>
-          <a:endParaRPr lang="en-US"/>
-        </a:p>
-      </dgm:t>
     </dgm:pt>
     <dgm:pt modelId="{4150643C-30C3-4A9A-AA56-90B9F72FDC1C}" type="pres">
       <dgm:prSet presAssocID="{FFEB8160-74B9-4A12-8099-BA5FDA7FBB44}" presName="horzThree" presStyleCnt="0"/>
@@ -2082,11 +2062,11 @@
   </dgm:ptLst>
   <dgm:cxnLst>
     <dgm:cxn modelId="{32F5B412-A6F3-48A1-9564-864AAB1FBCD1}" type="presOf" srcId="{F45E59C6-AB11-42F1-AAC9-D0E1F7E00691}" destId="{A2C86B66-D132-4D1A-8BA1-DDF049E4FBBF}" srcOrd="0" destOrd="0" presId="urn:microsoft.com/office/officeart/2005/8/layout/hierarchy4"/>
+    <dgm:cxn modelId="{D330FF16-2DB4-4982-BE1C-5C1F766CBBB9}" srcId="{FE17895F-0746-4ADD-9481-12F74E42C850}" destId="{FFEB8160-74B9-4A12-8099-BA5FDA7FBB44}" srcOrd="0" destOrd="0" parTransId="{997409BB-A6ED-402B-8B78-2FCCD7017ABA}" sibTransId="{25EB3993-7DE5-4299-A3B2-C6508071D34C}"/>
+    <dgm:cxn modelId="{4B6ACD1A-773B-4577-A311-9E265EA3305C}" srcId="{F45E59C6-AB11-42F1-AAC9-D0E1F7E00691}" destId="{85F6D996-621E-43A0-B8BB-E6C3CC6879E9}" srcOrd="0" destOrd="0" parTransId="{682AE747-1964-4787-878D-6D49057FEB63}" sibTransId="{C2BC6573-09C6-4804-A46C-49D0C8F6F491}"/>
+    <dgm:cxn modelId="{A571392C-32FA-4C52-B1D0-EA0F6F47CF7B}" type="presOf" srcId="{FE17895F-0746-4ADD-9481-12F74E42C850}" destId="{45AA1A45-0976-4AD6-8375-1B7F136B9931}" srcOrd="0" destOrd="0" presId="urn:microsoft.com/office/officeart/2005/8/layout/hierarchy4"/>
+    <dgm:cxn modelId="{2EB84762-D90E-4E0F-92A7-C7A2D7C54332}" srcId="{85F6D996-621E-43A0-B8BB-E6C3CC6879E9}" destId="{FE17895F-0746-4ADD-9481-12F74E42C850}" srcOrd="0" destOrd="0" parTransId="{4B457C45-1618-4372-BF32-6F2195704CB3}" sibTransId="{90EE363C-5DAB-4B7D-A6C2-AA31500F81E4}"/>
     <dgm:cxn modelId="{81238B95-82C7-4709-AFDB-BB2476A8DB53}" type="presOf" srcId="{FFEB8160-74B9-4A12-8099-BA5FDA7FBB44}" destId="{43DB7677-B890-40A9-A0BE-B76A67B0B0B6}" srcOrd="0" destOrd="0" presId="urn:microsoft.com/office/officeart/2005/8/layout/hierarchy4"/>
-    <dgm:cxn modelId="{2EB84762-D90E-4E0F-92A7-C7A2D7C54332}" srcId="{85F6D996-621E-43A0-B8BB-E6C3CC6879E9}" destId="{FE17895F-0746-4ADD-9481-12F74E42C850}" srcOrd="0" destOrd="0" parTransId="{4B457C45-1618-4372-BF32-6F2195704CB3}" sibTransId="{90EE363C-5DAB-4B7D-A6C2-AA31500F81E4}"/>
-    <dgm:cxn modelId="{4B6ACD1A-773B-4577-A311-9E265EA3305C}" srcId="{F45E59C6-AB11-42F1-AAC9-D0E1F7E00691}" destId="{85F6D996-621E-43A0-B8BB-E6C3CC6879E9}" srcOrd="0" destOrd="0" parTransId="{682AE747-1964-4787-878D-6D49057FEB63}" sibTransId="{C2BC6573-09C6-4804-A46C-49D0C8F6F491}"/>
-    <dgm:cxn modelId="{D330FF16-2DB4-4982-BE1C-5C1F766CBBB9}" srcId="{FE17895F-0746-4ADD-9481-12F74E42C850}" destId="{FFEB8160-74B9-4A12-8099-BA5FDA7FBB44}" srcOrd="0" destOrd="0" parTransId="{997409BB-A6ED-402B-8B78-2FCCD7017ABA}" sibTransId="{25EB3993-7DE5-4299-A3B2-C6508071D34C}"/>
-    <dgm:cxn modelId="{A571392C-32FA-4C52-B1D0-EA0F6F47CF7B}" type="presOf" srcId="{FE17895F-0746-4ADD-9481-12F74E42C850}" destId="{45AA1A45-0976-4AD6-8375-1B7F136B9931}" srcOrd="0" destOrd="0" presId="urn:microsoft.com/office/officeart/2005/8/layout/hierarchy4"/>
     <dgm:cxn modelId="{77ABBEEF-324B-4A5C-B280-9AD8DB01E156}" type="presOf" srcId="{85F6D996-621E-43A0-B8BB-E6C3CC6879E9}" destId="{C5C61BD0-A389-4530-8F47-B1F7AEEEF305}" srcOrd="0" destOrd="0" presId="urn:microsoft.com/office/officeart/2005/8/layout/hierarchy4"/>
     <dgm:cxn modelId="{FA1E3CAE-527D-4EB5-BEE4-9B92009BBD0A}" type="presParOf" srcId="{A2C86B66-D132-4D1A-8BA1-DDF049E4FBBF}" destId="{4853A456-28BC-459E-BFA7-7805F4980305}" srcOrd="0" destOrd="0" presId="urn:microsoft.com/office/officeart/2005/8/layout/hierarchy4"/>
     <dgm:cxn modelId="{69B8F641-DE54-4776-85D7-DD5831F8B460}" type="presParOf" srcId="{4853A456-28BC-459E-BFA7-7805F4980305}" destId="{C5C61BD0-A389-4530-8F47-B1F7AEEEF305}" srcOrd="0" destOrd="0" presId="urn:microsoft.com/office/officeart/2005/8/layout/hierarchy4"/>
@@ -2132,10 +2112,9 @@
         <a:lstStyle/>
         <a:p>
           <a:r>
-            <a:rPr lang="en-US" dirty="0" smtClean="0"/>
+            <a:rPr lang="en-US" dirty="0"/>
             <a:t>UI behavior</a:t>
           </a:r>
-          <a:endParaRPr lang="en-US" dirty="0"/>
         </a:p>
       </dgm:t>
     </dgm:pt>
@@ -2169,10 +2148,9 @@
         <a:lstStyle/>
         <a:p>
           <a:r>
-            <a:rPr lang="en-US" dirty="0" smtClean="0"/>
+            <a:rPr lang="en-US" dirty="0"/>
             <a:t>Client logic</a:t>
           </a:r>
-          <a:endParaRPr lang="en-US" dirty="0"/>
         </a:p>
       </dgm:t>
     </dgm:pt>
@@ -2206,8 +2184,8 @@
         <a:lstStyle/>
         <a:p>
           <a:r>
-            <a:rPr lang="en-US" dirty="0" smtClean="0"/>
-            <a:t>MVC</a:t>
+            <a:rPr lang="en-US" dirty="0" err="1"/>
+            <a:t>WebApi</a:t>
           </a:r>
           <a:endParaRPr lang="en-US" dirty="0"/>
         </a:p>
@@ -2243,10 +2221,9 @@
         <a:lstStyle/>
         <a:p>
           <a:r>
-            <a:rPr lang="en-US" dirty="0" smtClean="0"/>
+            <a:rPr lang="en-US" dirty="0"/>
             <a:t>Backend</a:t>
           </a:r>
-          <a:endParaRPr lang="en-US" dirty="0"/>
         </a:p>
       </dgm:t>
     </dgm:pt>
@@ -2286,10 +2263,9 @@
         <a:lstStyle/>
         <a:p>
           <a:r>
-            <a:rPr lang="en-US" dirty="0" smtClean="0"/>
+            <a:rPr lang="en-US" dirty="0"/>
             <a:t>DB</a:t>
           </a:r>
-          <a:endParaRPr lang="en-US" dirty="0"/>
         </a:p>
       </dgm:t>
     </dgm:pt>
@@ -2326,13 +2302,6 @@
         </dgm:presLayoutVars>
       </dgm:prSet>
       <dgm:spPr/>
-      <dgm:t>
-        <a:bodyPr/>
-        <a:lstStyle/>
-        <a:p>
-          <a:endParaRPr lang="en-US"/>
-        </a:p>
-      </dgm:t>
     </dgm:pt>
     <dgm:pt modelId="{344CD8ED-28CC-4EC4-9F82-02911758175C}" type="pres">
       <dgm:prSet presAssocID="{B00BB34A-317E-4834-9278-F2129F2C7695}" presName="vertOne" presStyleCnt="0"/>
@@ -2345,13 +2314,6 @@
         </dgm:presLayoutVars>
       </dgm:prSet>
       <dgm:spPr/>
-      <dgm:t>
-        <a:bodyPr/>
-        <a:lstStyle/>
-        <a:p>
-          <a:endParaRPr lang="en-US"/>
-        </a:p>
-      </dgm:t>
     </dgm:pt>
     <dgm:pt modelId="{A0070A47-56AF-4B9E-84F0-0736FA4769E8}" type="pres">
       <dgm:prSet presAssocID="{B00BB34A-317E-4834-9278-F2129F2C7695}" presName="parTransOne" presStyleCnt="0"/>
@@ -2372,13 +2334,6 @@
         </dgm:presLayoutVars>
       </dgm:prSet>
       <dgm:spPr/>
-      <dgm:t>
-        <a:bodyPr/>
-        <a:lstStyle/>
-        <a:p>
-          <a:endParaRPr lang="en-US"/>
-        </a:p>
-      </dgm:t>
     </dgm:pt>
     <dgm:pt modelId="{6F64A3D4-5962-47AB-9E08-FD334D09DB65}" type="pres">
       <dgm:prSet presAssocID="{D7DF52CB-F06F-4760-81CB-69D2E3794649}" presName="parTransTwo" presStyleCnt="0"/>
@@ -2399,13 +2354,6 @@
         </dgm:presLayoutVars>
       </dgm:prSet>
       <dgm:spPr/>
-      <dgm:t>
-        <a:bodyPr/>
-        <a:lstStyle/>
-        <a:p>
-          <a:endParaRPr lang="en-US"/>
-        </a:p>
-      </dgm:t>
     </dgm:pt>
     <dgm:pt modelId="{FD24A845-1C5E-47E2-A38B-A199C8C43559}" type="pres">
       <dgm:prSet presAssocID="{E34A5C4B-9D90-4E8A-8E65-3FD077D01877}" presName="parTransThree" presStyleCnt="0"/>
@@ -2430,13 +2378,6 @@
         </dgm:presLayoutVars>
       </dgm:prSet>
       <dgm:spPr/>
-      <dgm:t>
-        <a:bodyPr/>
-        <a:lstStyle/>
-        <a:p>
-          <a:endParaRPr lang="en-US"/>
-        </a:p>
-      </dgm:t>
     </dgm:pt>
     <dgm:pt modelId="{F9F763A4-6CCB-4323-B8ED-E76D21022F84}" type="pres">
       <dgm:prSet presAssocID="{A7C8C167-4520-47DA-B5D5-1A1D85915BF7}" presName="parTransFour" presStyleCnt="0"/>
@@ -2461,13 +2402,6 @@
         </dgm:presLayoutVars>
       </dgm:prSet>
       <dgm:spPr/>
-      <dgm:t>
-        <a:bodyPr/>
-        <a:lstStyle/>
-        <a:p>
-          <a:endParaRPr lang="en-US"/>
-        </a:p>
-      </dgm:t>
     </dgm:pt>
     <dgm:pt modelId="{B35086C0-5B55-4F29-A59E-9665E37D8742}" type="pres">
       <dgm:prSet presAssocID="{33833936-0590-40CA-81AC-46D337BA286B}" presName="horzFour" presStyleCnt="0"/>
@@ -2475,17 +2409,17 @@
     </dgm:pt>
   </dgm:ptLst>
   <dgm:cxnLst>
+    <dgm:cxn modelId="{08859802-1E27-4721-A100-C2244E66DF53}" srcId="{A7C8C167-4520-47DA-B5D5-1A1D85915BF7}" destId="{33833936-0590-40CA-81AC-46D337BA286B}" srcOrd="0" destOrd="0" parTransId="{AA6171EA-61E3-4168-8189-DE8926E7C00E}" sibTransId="{4F4751E2-7039-4D4A-81B7-6F6B71B973A3}"/>
+    <dgm:cxn modelId="{F530950B-F404-4CA6-9368-D870954947DC}" type="presOf" srcId="{33833936-0590-40CA-81AC-46D337BA286B}" destId="{C2E8E3E9-01D0-4E48-8080-740F97698CD6}" srcOrd="0" destOrd="0" presId="urn:microsoft.com/office/officeart/2005/8/layout/hierarchy4"/>
+    <dgm:cxn modelId="{1A48CF0D-5677-44CA-840D-381849CBDE9E}" srcId="{B00BB34A-317E-4834-9278-F2129F2C7695}" destId="{D7DF52CB-F06F-4760-81CB-69D2E3794649}" srcOrd="0" destOrd="0" parTransId="{1EDFBB35-DD8A-45CF-8954-321BBE223220}" sibTransId="{610C2978-2B0B-4404-9BF6-27FDF050D446}"/>
+    <dgm:cxn modelId="{D4B95A1F-1E72-4FFF-8D05-9BA51E1CDDDA}" srcId="{2348B0C0-D3BD-4F31-9EA6-9B7518DD1438}" destId="{B00BB34A-317E-4834-9278-F2129F2C7695}" srcOrd="0" destOrd="0" parTransId="{4494EE05-B546-4A54-A558-40BC2D4A0CDA}" sibTransId="{228E1DBD-914F-4B6D-928B-43A44ABDE305}"/>
+    <dgm:cxn modelId="{02417832-F849-47CF-A5BA-DC2460A8B489}" type="presOf" srcId="{D7DF52CB-F06F-4760-81CB-69D2E3794649}" destId="{0BE8D9DF-9D89-465A-BF91-BDDDBF18C2A4}" srcOrd="0" destOrd="0" presId="urn:microsoft.com/office/officeart/2005/8/layout/hierarchy4"/>
+    <dgm:cxn modelId="{66723D4D-4BBC-41A3-A070-C9BA34E75878}" srcId="{E34A5C4B-9D90-4E8A-8E65-3FD077D01877}" destId="{A7C8C167-4520-47DA-B5D5-1A1D85915BF7}" srcOrd="0" destOrd="0" parTransId="{D0D886B5-2A83-4730-B606-3E244BA78A3F}" sibTransId="{698A87D9-54E7-43A9-9D57-1FE528A0B854}"/>
+    <dgm:cxn modelId="{E18A5476-5450-4416-9BB8-DB0C28AB7703}" type="presOf" srcId="{B00BB34A-317E-4834-9278-F2129F2C7695}" destId="{98E4FCCB-ED2E-4348-866E-5FE7F1CA676F}" srcOrd="0" destOrd="0" presId="urn:microsoft.com/office/officeart/2005/8/layout/hierarchy4"/>
+    <dgm:cxn modelId="{8BDE6E57-287B-492E-BBE4-7B828AB47C63}" type="presOf" srcId="{E34A5C4B-9D90-4E8A-8E65-3FD077D01877}" destId="{59F317A4-6913-49DD-B9DB-6DD55954216D}" srcOrd="0" destOrd="0" presId="urn:microsoft.com/office/officeart/2005/8/layout/hierarchy4"/>
     <dgm:cxn modelId="{941D2E83-20C9-4D98-920D-0D11FDE8DB46}" type="presOf" srcId="{2348B0C0-D3BD-4F31-9EA6-9B7518DD1438}" destId="{80A81DAE-8A7A-4A07-9504-152967968735}" srcOrd="0" destOrd="0" presId="urn:microsoft.com/office/officeart/2005/8/layout/hierarchy4"/>
-    <dgm:cxn modelId="{F530950B-F404-4CA6-9368-D870954947DC}" type="presOf" srcId="{33833936-0590-40CA-81AC-46D337BA286B}" destId="{C2E8E3E9-01D0-4E48-8080-740F97698CD6}" srcOrd="0" destOrd="0" presId="urn:microsoft.com/office/officeart/2005/8/layout/hierarchy4"/>
-    <dgm:cxn modelId="{02417832-F849-47CF-A5BA-DC2460A8B489}" type="presOf" srcId="{D7DF52CB-F06F-4760-81CB-69D2E3794649}" destId="{0BE8D9DF-9D89-465A-BF91-BDDDBF18C2A4}" srcOrd="0" destOrd="0" presId="urn:microsoft.com/office/officeart/2005/8/layout/hierarchy4"/>
     <dgm:cxn modelId="{086EB987-1A79-4FB2-85E5-73836BBF5F0F}" type="presOf" srcId="{A7C8C167-4520-47DA-B5D5-1A1D85915BF7}" destId="{FEEC6ECD-DEB1-4524-AB05-62F0C9729841}" srcOrd="0" destOrd="0" presId="urn:microsoft.com/office/officeart/2005/8/layout/hierarchy4"/>
-    <dgm:cxn modelId="{D4B95A1F-1E72-4FFF-8D05-9BA51E1CDDDA}" srcId="{2348B0C0-D3BD-4F31-9EA6-9B7518DD1438}" destId="{B00BB34A-317E-4834-9278-F2129F2C7695}" srcOrd="0" destOrd="0" parTransId="{4494EE05-B546-4A54-A558-40BC2D4A0CDA}" sibTransId="{228E1DBD-914F-4B6D-928B-43A44ABDE305}"/>
     <dgm:cxn modelId="{501351B9-12A3-4EF8-A13A-5F35F73D9DA0}" srcId="{D7DF52CB-F06F-4760-81CB-69D2E3794649}" destId="{E34A5C4B-9D90-4E8A-8E65-3FD077D01877}" srcOrd="0" destOrd="0" parTransId="{5B57AB43-E851-46B9-A878-7A7AF6DCE58E}" sibTransId="{A3CE33A8-9965-40C2-A63A-0835BF12E853}"/>
-    <dgm:cxn modelId="{1A48CF0D-5677-44CA-840D-381849CBDE9E}" srcId="{B00BB34A-317E-4834-9278-F2129F2C7695}" destId="{D7DF52CB-F06F-4760-81CB-69D2E3794649}" srcOrd="0" destOrd="0" parTransId="{1EDFBB35-DD8A-45CF-8954-321BBE223220}" sibTransId="{610C2978-2B0B-4404-9BF6-27FDF050D446}"/>
-    <dgm:cxn modelId="{66723D4D-4BBC-41A3-A070-C9BA34E75878}" srcId="{E34A5C4B-9D90-4E8A-8E65-3FD077D01877}" destId="{A7C8C167-4520-47DA-B5D5-1A1D85915BF7}" srcOrd="0" destOrd="0" parTransId="{D0D886B5-2A83-4730-B606-3E244BA78A3F}" sibTransId="{698A87D9-54E7-43A9-9D57-1FE528A0B854}"/>
-    <dgm:cxn modelId="{8BDE6E57-287B-492E-BBE4-7B828AB47C63}" type="presOf" srcId="{E34A5C4B-9D90-4E8A-8E65-3FD077D01877}" destId="{59F317A4-6913-49DD-B9DB-6DD55954216D}" srcOrd="0" destOrd="0" presId="urn:microsoft.com/office/officeart/2005/8/layout/hierarchy4"/>
-    <dgm:cxn modelId="{E18A5476-5450-4416-9BB8-DB0C28AB7703}" type="presOf" srcId="{B00BB34A-317E-4834-9278-F2129F2C7695}" destId="{98E4FCCB-ED2E-4348-866E-5FE7F1CA676F}" srcOrd="0" destOrd="0" presId="urn:microsoft.com/office/officeart/2005/8/layout/hierarchy4"/>
-    <dgm:cxn modelId="{08859802-1E27-4721-A100-C2244E66DF53}" srcId="{A7C8C167-4520-47DA-B5D5-1A1D85915BF7}" destId="{33833936-0590-40CA-81AC-46D337BA286B}" srcOrd="0" destOrd="0" parTransId="{AA6171EA-61E3-4168-8189-DE8926E7C00E}" sibTransId="{4F4751E2-7039-4D4A-81B7-6F6B71B973A3}"/>
     <dgm:cxn modelId="{BD85FCD3-F7AF-49DF-89BA-8CA2FC3C9DFD}" type="presParOf" srcId="{80A81DAE-8A7A-4A07-9504-152967968735}" destId="{344CD8ED-28CC-4EC4-9F82-02911758175C}" srcOrd="0" destOrd="0" presId="urn:microsoft.com/office/officeart/2005/8/layout/hierarchy4"/>
     <dgm:cxn modelId="{6431C99F-B46B-4ED3-B1B6-BA5C682E42A2}" type="presParOf" srcId="{344CD8ED-28CC-4EC4-9F82-02911758175C}" destId="{98E4FCCB-ED2E-4348-866E-5FE7F1CA676F}" srcOrd="0" destOrd="0" presId="urn:microsoft.com/office/officeart/2005/8/layout/hierarchy4"/>
     <dgm:cxn modelId="{0761A528-93A8-4421-8A04-69C34A770AFD}" type="presParOf" srcId="{344CD8ED-28CC-4EC4-9F82-02911758175C}" destId="{A0070A47-56AF-4B9E-84F0-0736FA4769E8}" srcOrd="1" destOrd="0" presId="urn:microsoft.com/office/officeart/2005/8/layout/hierarchy4"/>
@@ -2580,7 +2514,7 @@
         </a:bodyPr>
         <a:lstStyle/>
         <a:p>
-          <a:pPr lvl="0" algn="ctr" defTabSz="1244600">
+          <a:pPr marL="0" lvl="0" indent="0" algn="ctr" defTabSz="1244600">
             <a:lnSpc>
               <a:spcPct val="90000"/>
             </a:lnSpc>
@@ -2590,10 +2524,15 @@
             <a:spcAft>
               <a:spcPct val="35000"/>
             </a:spcAft>
+            <a:buNone/>
           </a:pPr>
           <a:r>
             <a:rPr lang="cs-CZ" sz="2800" kern="1200" dirty="0" err="1"/>
-            <a:t>AngularJS</a:t>
+            <a:t>Angular</a:t>
+          </a:r>
+          <a:r>
+            <a:rPr lang="en-US" sz="2800" kern="1200" dirty="0"/>
+            <a:t> 5</a:t>
           </a:r>
           <a:r>
             <a:rPr lang="cs-CZ" sz="2800" kern="1200" dirty="0"/>
@@ -2663,7 +2602,7 @@
         </a:bodyPr>
         <a:lstStyle/>
         <a:p>
-          <a:pPr lvl="0" algn="ctr" defTabSz="1244600">
+          <a:pPr marL="0" lvl="0" indent="0" algn="ctr" defTabSz="1244600">
             <a:lnSpc>
               <a:spcPct val="90000"/>
             </a:lnSpc>
@@ -2673,18 +2612,23 @@
             <a:spcAft>
               <a:spcPct val="35000"/>
             </a:spcAft>
+            <a:buNone/>
           </a:pPr>
           <a:r>
             <a:rPr lang="cs-CZ" sz="2800" kern="1200" dirty="0"/>
-            <a:t>ASP.NET </a:t>
+            <a:t>ASP.NET</a:t>
+          </a:r>
+          <a:r>
+            <a:rPr lang="en-US" sz="2800" kern="1200" dirty="0"/>
+            <a:t> Core 2.0</a:t>
+          </a:r>
+          <a:r>
+            <a:rPr lang="cs-CZ" sz="2800" kern="1200" dirty="0"/>
+            <a:t> </a:t>
           </a:r>
           <a:r>
             <a:rPr lang="cs-CZ" sz="2800" kern="1200" dirty="0" err="1"/>
             <a:t>WebApi</a:t>
-          </a:r>
-          <a:r>
-            <a:rPr lang="cs-CZ" sz="2800" kern="1200" dirty="0"/>
-            <a:t> 2</a:t>
           </a:r>
           <a:endParaRPr lang="en-US" sz="2800" kern="1200" dirty="0"/>
         </a:p>
@@ -2750,7 +2694,7 @@
         </a:bodyPr>
         <a:lstStyle/>
         <a:p>
-          <a:pPr lvl="0" algn="ctr" defTabSz="1244600">
+          <a:pPr marL="0" lvl="0" indent="0" algn="ctr" defTabSz="1244600">
             <a:lnSpc>
               <a:spcPct val="90000"/>
             </a:lnSpc>
@@ -2760,6 +2704,7 @@
             <a:spcAft>
               <a:spcPct val="35000"/>
             </a:spcAft>
+            <a:buNone/>
           </a:pPr>
           <a:r>
             <a:rPr lang="cs-CZ" sz="2800" kern="1200" dirty="0"/>
@@ -2841,7 +2786,7 @@
         </a:bodyPr>
         <a:lstStyle/>
         <a:p>
-          <a:pPr lvl="0" algn="ctr" defTabSz="1466850">
+          <a:pPr marL="0" lvl="0" indent="0" algn="ctr" defTabSz="1466850">
             <a:lnSpc>
               <a:spcPct val="90000"/>
             </a:lnSpc>
@@ -2851,12 +2796,12 @@
             <a:spcAft>
               <a:spcPct val="35000"/>
             </a:spcAft>
+            <a:buNone/>
           </a:pPr>
           <a:r>
-            <a:rPr lang="en-US" sz="3300" kern="1200" dirty="0" smtClean="0"/>
+            <a:rPr lang="en-US" sz="3300" kern="1200" dirty="0"/>
             <a:t>UI behavior</a:t>
           </a:r>
-          <a:endParaRPr lang="en-US" sz="3300" kern="1200" dirty="0"/>
         </a:p>
       </dsp:txBody>
       <dsp:txXfrm>
@@ -2920,7 +2865,7 @@
         </a:bodyPr>
         <a:lstStyle/>
         <a:p>
-          <a:pPr lvl="0" algn="ctr" defTabSz="1466850">
+          <a:pPr marL="0" lvl="0" indent="0" algn="ctr" defTabSz="1466850">
             <a:lnSpc>
               <a:spcPct val="90000"/>
             </a:lnSpc>
@@ -2930,12 +2875,12 @@
             <a:spcAft>
               <a:spcPct val="35000"/>
             </a:spcAft>
+            <a:buNone/>
           </a:pPr>
           <a:r>
-            <a:rPr lang="en-US" sz="3300" kern="1200" dirty="0" smtClean="0"/>
+            <a:rPr lang="en-US" sz="3300" kern="1200" dirty="0"/>
             <a:t>Client logic</a:t>
           </a:r>
-          <a:endParaRPr lang="en-US" sz="3300" kern="1200" dirty="0"/>
         </a:p>
       </dsp:txBody>
       <dsp:txXfrm>
@@ -2999,7 +2944,7 @@
         </a:bodyPr>
         <a:lstStyle/>
         <a:p>
-          <a:pPr lvl="0" algn="ctr" defTabSz="1466850">
+          <a:pPr marL="0" lvl="0" indent="0" algn="ctr" defTabSz="1466850">
             <a:lnSpc>
               <a:spcPct val="90000"/>
             </a:lnSpc>
@@ -3009,10 +2954,11 @@
             <a:spcAft>
               <a:spcPct val="35000"/>
             </a:spcAft>
+            <a:buNone/>
           </a:pPr>
           <a:r>
-            <a:rPr lang="en-US" sz="3300" kern="1200" dirty="0" smtClean="0"/>
-            <a:t>MVC</a:t>
+            <a:rPr lang="en-US" sz="3300" kern="1200" dirty="0" err="1"/>
+            <a:t>WebApi</a:t>
           </a:r>
           <a:endParaRPr lang="en-US" sz="3300" kern="1200" dirty="0"/>
         </a:p>
@@ -3078,7 +3024,7 @@
         </a:bodyPr>
         <a:lstStyle/>
         <a:p>
-          <a:pPr lvl="0" algn="ctr" defTabSz="1466850">
+          <a:pPr marL="0" lvl="0" indent="0" algn="ctr" defTabSz="1466850">
             <a:lnSpc>
               <a:spcPct val="90000"/>
             </a:lnSpc>
@@ -3088,12 +3034,12 @@
             <a:spcAft>
               <a:spcPct val="35000"/>
             </a:spcAft>
+            <a:buNone/>
           </a:pPr>
           <a:r>
-            <a:rPr lang="en-US" sz="3300" kern="1200" dirty="0" smtClean="0"/>
+            <a:rPr lang="en-US" sz="3300" kern="1200" dirty="0"/>
             <a:t>Backend</a:t>
           </a:r>
-          <a:endParaRPr lang="en-US" sz="3300" kern="1200" dirty="0"/>
         </a:p>
       </dsp:txBody>
       <dsp:txXfrm>
@@ -3154,7 +3100,7 @@
         </a:bodyPr>
         <a:lstStyle/>
         <a:p>
-          <a:pPr lvl="0" algn="ctr" defTabSz="1466850">
+          <a:pPr marL="0" lvl="0" indent="0" algn="ctr" defTabSz="1466850">
             <a:lnSpc>
               <a:spcPct val="90000"/>
             </a:lnSpc>
@@ -3164,12 +3110,12 @@
             <a:spcAft>
               <a:spcPct val="35000"/>
             </a:spcAft>
+            <a:buNone/>
           </a:pPr>
           <a:r>
-            <a:rPr lang="en-US" sz="3300" kern="1200" dirty="0" smtClean="0"/>
+            <a:rPr lang="en-US" sz="3300" kern="1200" dirty="0"/>
             <a:t>DB</a:t>
           </a:r>
-          <a:endParaRPr lang="en-US" sz="3300" kern="1200" dirty="0"/>
         </a:p>
       </dsp:txBody>
       <dsp:txXfrm>
@@ -6376,7 +6322,7 @@
             <a:fld id="{22F88518-DE89-B24A-B1E9-8CEB78A9F7DC}" type="datetimeFigureOut">
               <a:rPr lang="en-US" smtClean="0"/>
               <a:pPr/>
-              <a:t>10/7/2016</a:t>
+              <a:t>3/21/2018</a:t>
             </a:fld>
             <a:endParaRPr lang="en-US"/>
           </a:p>
@@ -6544,7 +6490,7 @@
             <a:fld id="{7CF9138B-62FA-4C4E-9419-890C530175D1}" type="datetimeFigureOut">
               <a:rPr lang="en-US" smtClean="0"/>
               <a:pPr/>
-              <a:t>10/7/2016</a:t>
+              <a:t>3/21/2018</a:t>
             </a:fld>
             <a:endParaRPr lang="en-US"/>
           </a:p>
@@ -10963,7 +10909,7 @@
           <a:lstStyle/>
           <a:p>
             <a:r>
-              <a:rPr lang="en-US" sz="4800" dirty="0" smtClean="0"/>
+              <a:rPr lang="en-US" sz="4800" dirty="0"/>
               <a:t>How to write testable web applications</a:t>
             </a:r>
             <a:endParaRPr lang="en-US" dirty="0"/>
@@ -10991,24 +10937,15 @@
             </a:r>
             <a:r>
               <a:rPr lang="cs-CZ" dirty="0"/>
-              <a:t>ří </a:t>
-            </a:r>
-            <a:r>
-              <a:rPr lang="cs-CZ" dirty="0" smtClean="0"/>
-              <a:t>Tomek</a:t>
-            </a:r>
-            <a:endParaRPr lang="en-US" dirty="0" smtClean="0"/>
+              <a:t>ří Tomek</a:t>
+            </a:r>
+            <a:endParaRPr lang="en-US" dirty="0"/>
           </a:p>
           <a:p>
             <a:r>
               <a:rPr lang="en-US" dirty="0"/>
-              <a:t>j</a:t>
-            </a:r>
-            <a:r>
-              <a:rPr lang="en-US" dirty="0" smtClean="0"/>
-              <a:t>iri.tomek@solarwinds.com</a:t>
-            </a:r>
-            <a:endParaRPr lang="en-US" dirty="0"/>
+              <a:t>jiri.tomek@solarwinds.com</a:t>
+            </a:r>
           </a:p>
         </p:txBody>
       </p:sp>
@@ -11017,13 +10954,6 @@
   <p:clrMapOvr>
     <a:masterClrMapping/>
   </p:clrMapOvr>
-  <p:timing>
-    <p:tnLst>
-      <p:par>
-        <p:cTn id="1" dur="indefinite" restart="never" nodeType="tmRoot"/>
-      </p:par>
-    </p:tnLst>
-  </p:timing>
 </p:sld>
 </file>
 
@@ -11061,14 +10991,10 @@
           <a:p>
             <a:r>
               <a:rPr lang="cs-CZ" dirty="0"/>
-              <a:t>End-to-end </a:t>
-            </a:r>
-            <a:r>
-              <a:rPr lang="cs-CZ" dirty="0" smtClean="0"/>
-              <a:t>test</a:t>
-            </a:r>
-            <a:r>
-              <a:rPr lang="en-US" dirty="0" smtClean="0"/>
+              <a:t>End-to-end test</a:t>
+            </a:r>
+            <a:r>
+              <a:rPr lang="en-US" dirty="0"/>
               <a:t>s</a:t>
             </a:r>
             <a:endParaRPr lang="cs-CZ" dirty="0"/>
@@ -11091,21 +11017,21 @@
           <a:lstStyle/>
           <a:p>
             <a:r>
-              <a:rPr lang="en-US" dirty="0" smtClean="0"/>
+              <a:rPr lang="en-US" dirty="0"/>
               <a:t>Run against live application</a:t>
             </a:r>
             <a:endParaRPr lang="cs-CZ" dirty="0"/>
           </a:p>
           <a:p>
             <a:r>
-              <a:rPr lang="en-US" dirty="0" smtClean="0"/>
+              <a:rPr lang="en-US" dirty="0"/>
               <a:t>Test whole application or its major part</a:t>
             </a:r>
             <a:endParaRPr lang="cs-CZ" dirty="0"/>
           </a:p>
           <a:p>
             <a:r>
-              <a:rPr lang="en-US" dirty="0" smtClean="0"/>
+              <a:rPr lang="en-US" dirty="0"/>
               <a:t>Use public interface of application</a:t>
             </a:r>
             <a:endParaRPr lang="cs-CZ" dirty="0"/>
@@ -11116,42 +11042,41 @@
               <a:rPr lang="cs-CZ" dirty="0"/>
               <a:t>API </a:t>
             </a:r>
-            <a:endParaRPr lang="en-US" dirty="0" smtClean="0"/>
+            <a:endParaRPr lang="en-US" dirty="0"/>
           </a:p>
           <a:p>
             <a:pPr lvl="1"/>
             <a:r>
-              <a:rPr lang="cs-CZ" dirty="0" smtClean="0"/>
+              <a:rPr lang="cs-CZ" dirty="0"/>
               <a:t>UI</a:t>
             </a:r>
+          </a:p>
+          <a:p>
+            <a:r>
+              <a:rPr lang="en-US" dirty="0"/>
+              <a:t>Most expensive</a:t>
+            </a:r>
             <a:endParaRPr lang="cs-CZ" dirty="0"/>
           </a:p>
           <a:p>
-            <a:r>
-              <a:rPr lang="en-US" dirty="0" smtClean="0"/>
-              <a:t>Most expensive</a:t>
+            <a:pPr lvl="1"/>
+            <a:r>
+              <a:rPr lang="en-US" dirty="0"/>
+              <a:t>Time to setup the test</a:t>
+            </a:r>
+          </a:p>
+          <a:p>
+            <a:pPr lvl="1"/>
+            <a:r>
+              <a:rPr lang="en-US" dirty="0"/>
+              <a:t>Time to setup the environment</a:t>
             </a:r>
             <a:endParaRPr lang="cs-CZ" dirty="0"/>
           </a:p>
           <a:p>
             <a:pPr lvl="1"/>
             <a:r>
-              <a:rPr lang="en-US" dirty="0" smtClean="0"/>
-              <a:t>Time to setup the test</a:t>
-            </a:r>
-          </a:p>
-          <a:p>
-            <a:pPr lvl="1"/>
-            <a:r>
-              <a:rPr lang="en-US" dirty="0" smtClean="0"/>
-              <a:t>Time to setup the environment</a:t>
-            </a:r>
-            <a:endParaRPr lang="cs-CZ" dirty="0"/>
-          </a:p>
-          <a:p>
-            <a:pPr lvl="1"/>
-            <a:r>
-              <a:rPr lang="en-US" dirty="0" smtClean="0"/>
+              <a:rPr lang="en-US" dirty="0"/>
               <a:t>Execution time</a:t>
             </a:r>
           </a:p>
@@ -11207,13 +11132,6 @@
   <p:clrMapOvr>
     <a:masterClrMapping/>
   </p:clrMapOvr>
-  <p:timing>
-    <p:tnLst>
-      <p:par>
-        <p:cTn id="1" dur="indefinite" restart="never" nodeType="tmRoot"/>
-      </p:par>
-    </p:tnLst>
-  </p:timing>
 </p:sld>
 </file>
 
@@ -11251,11 +11169,7 @@
           <a:p>
             <a:r>
               <a:rPr lang="en-US" dirty="0"/>
-              <a:t>UI </a:t>
-            </a:r>
-            <a:r>
-              <a:rPr lang="en-US" dirty="0" smtClean="0"/>
-              <a:t>tests</a:t>
+              <a:t>UI tests</a:t>
             </a:r>
             <a:endParaRPr lang="cs-CZ" dirty="0"/>
           </a:p>
@@ -11277,14 +11191,14 @@
           <a:lstStyle/>
           <a:p>
             <a:r>
-              <a:rPr lang="en-US" dirty="0" smtClean="0"/>
+              <a:rPr lang="en-US" dirty="0"/>
               <a:t>Test UI behavior</a:t>
             </a:r>
             <a:endParaRPr lang="cs-CZ" dirty="0"/>
           </a:p>
           <a:p>
             <a:r>
-              <a:rPr lang="en-US" dirty="0" smtClean="0"/>
+              <a:rPr lang="en-US" dirty="0"/>
               <a:t>Without real backend</a:t>
             </a:r>
             <a:endParaRPr lang="cs-CZ" dirty="0"/>
@@ -11292,11 +11206,11 @@
           <a:p>
             <a:pPr lvl="1"/>
             <a:r>
-              <a:rPr lang="cs-CZ" dirty="0" smtClean="0"/>
+              <a:rPr lang="cs-CZ" dirty="0"/>
               <a:t>Mock</a:t>
             </a:r>
             <a:r>
-              <a:rPr lang="en-US" dirty="0" smtClean="0"/>
+              <a:rPr lang="en-US" dirty="0"/>
               <a:t> API</a:t>
             </a:r>
             <a:endParaRPr lang="cs-CZ" dirty="0"/>
@@ -11310,8 +11224,11 @@
               <a:rPr lang="en-US" dirty="0">
                 <a:hlinkClick r:id="rId2"/>
               </a:rPr>
-              <a:t>https://github.com/atecarlos/protractor-http-mock</a:t>
-            </a:r>
+              <a:t>https://www.npmjs.com/package/protractor-xmlhttprequest-mock</a:t>
+            </a:r>
+            <a:endParaRPr lang="en-US" dirty="0"/>
+          </a:p>
+          <a:p>
             <a:endParaRPr lang="en-US" dirty="0"/>
           </a:p>
           <a:p>
@@ -11357,13 +11274,6 @@
   <p:clrMapOvr>
     <a:masterClrMapping/>
   </p:clrMapOvr>
-  <p:timing>
-    <p:tnLst>
-      <p:par>
-        <p:cTn id="1" dur="indefinite" restart="never" nodeType="tmRoot"/>
-      </p:par>
-    </p:tnLst>
-  </p:timing>
 </p:sld>
 </file>
 
@@ -11400,7 +11310,7 @@
           <a:lstStyle/>
           <a:p>
             <a:r>
-              <a:rPr lang="en-US" dirty="0" smtClean="0"/>
+              <a:rPr lang="en-US" dirty="0"/>
               <a:t>Sample application</a:t>
             </a:r>
             <a:endParaRPr lang="cs-CZ" dirty="0"/>
@@ -11436,13 +11346,6 @@
   <p:clrMapOvr>
     <a:masterClrMapping/>
   </p:clrMapOvr>
-  <p:timing>
-    <p:tnLst>
-      <p:par>
-        <p:cTn id="1" dur="indefinite" restart="never" nodeType="tmRoot"/>
-      </p:par>
-    </p:tnLst>
-  </p:timing>
 </p:sld>
 </file>
 
@@ -11479,23 +11382,23 @@
           <a:lstStyle/>
           <a:p>
             <a:r>
-              <a:rPr lang="en-US" dirty="0" smtClean="0"/>
+              <a:rPr lang="en-US" dirty="0"/>
               <a:t>Web </a:t>
             </a:r>
             <a:r>
-              <a:rPr lang="cs-CZ" dirty="0" smtClean="0"/>
+              <a:rPr lang="cs-CZ" dirty="0"/>
               <a:t>ap</a:t>
             </a:r>
             <a:r>
-              <a:rPr lang="en-US" dirty="0" smtClean="0"/>
+              <a:rPr lang="en-US" dirty="0"/>
               <a:t>p</a:t>
             </a:r>
             <a:r>
-              <a:rPr lang="cs-CZ" dirty="0" smtClean="0"/>
+              <a:rPr lang="cs-CZ" dirty="0"/>
               <a:t>li</a:t>
             </a:r>
             <a:r>
-              <a:rPr lang="en-US" dirty="0" smtClean="0"/>
+              <a:rPr lang="en-US" dirty="0"/>
               <a:t>cation</a:t>
             </a:r>
             <a:endParaRPr lang="cs-CZ" dirty="0"/>
@@ -11518,40 +11421,34 @@
           <a:lstStyle/>
           <a:p>
             <a:r>
-              <a:rPr lang="en-US" dirty="0" smtClean="0"/>
+              <a:rPr lang="en-US" dirty="0"/>
               <a:t>Presentation layer</a:t>
             </a:r>
-            <a:endParaRPr lang="en-US" dirty="0"/>
           </a:p>
           <a:p>
             <a:pPr lvl="1"/>
             <a:r>
-              <a:rPr lang="en-US" dirty="0" smtClean="0"/>
+              <a:rPr lang="en-US" dirty="0"/>
               <a:t>Web browser</a:t>
             </a:r>
-            <a:endParaRPr lang="en-US" dirty="0"/>
           </a:p>
           <a:p>
             <a:pPr lvl="1"/>
             <a:r>
-              <a:rPr lang="en-US" dirty="0" err="1" smtClean="0"/>
+              <a:rPr lang="en-US" dirty="0" err="1"/>
               <a:t>TypeScript</a:t>
             </a:r>
             <a:r>
-              <a:rPr lang="en-US" dirty="0" smtClean="0"/>
+              <a:rPr lang="en-US" dirty="0"/>
               <a:t>/</a:t>
             </a:r>
             <a:r>
-              <a:rPr lang="cs-CZ" dirty="0" smtClean="0"/>
-              <a:t>JavaScript</a:t>
-            </a:r>
-            <a:r>
               <a:rPr lang="cs-CZ" dirty="0"/>
-              <a:t>, </a:t>
+              <a:t>JavaScript, </a:t>
             </a:r>
             <a:r>
               <a:rPr lang="en-US" dirty="0"/>
-              <a:t>AngularJS, </a:t>
+              <a:t>Angular 5, </a:t>
             </a:r>
             <a:r>
               <a:rPr lang="cs-CZ" dirty="0"/>
@@ -11560,24 +11457,22 @@
           </a:p>
           <a:p>
             <a:r>
-              <a:rPr lang="en-US" dirty="0" smtClean="0"/>
+              <a:rPr lang="en-US" dirty="0"/>
               <a:t>Business layer</a:t>
             </a:r>
-            <a:endParaRPr lang="en-US" dirty="0"/>
           </a:p>
           <a:p>
             <a:pPr lvl="1"/>
             <a:r>
-              <a:rPr lang="en-US" dirty="0" smtClean="0"/>
+              <a:rPr lang="en-US" dirty="0"/>
               <a:t>Web server</a:t>
             </a:r>
-            <a:endParaRPr lang="en-US" dirty="0"/>
           </a:p>
           <a:p>
             <a:pPr lvl="1"/>
             <a:r>
               <a:rPr lang="en-US" dirty="0"/>
-              <a:t>ASP.NET </a:t>
+              <a:t>ASP.NET Core 2.0 </a:t>
             </a:r>
             <a:r>
               <a:rPr lang="en-US" dirty="0" err="1"/>
@@ -11585,7 +11480,7 @@
             </a:r>
             <a:r>
               <a:rPr lang="en-US" dirty="0"/>
-              <a:t> 2, </a:t>
+              <a:t>, </a:t>
             </a:r>
             <a:r>
               <a:rPr lang="cs-CZ" dirty="0"/>
@@ -11598,7 +11493,7 @@
           </a:p>
           <a:p>
             <a:r>
-              <a:rPr lang="en-US" dirty="0" smtClean="0"/>
+              <a:rPr lang="en-US" dirty="0"/>
               <a:t>Data layer</a:t>
             </a:r>
             <a:endParaRPr lang="cs-CZ" dirty="0"/>
@@ -11606,18 +11501,18 @@
           <a:p>
             <a:pPr lvl="1"/>
             <a:r>
-              <a:rPr lang="en-US" dirty="0" smtClean="0"/>
+              <a:rPr lang="en-US" dirty="0"/>
               <a:t>Entity framework</a:t>
             </a:r>
           </a:p>
           <a:p>
             <a:pPr lvl="1"/>
             <a:r>
-              <a:rPr lang="cs-CZ" dirty="0" smtClean="0"/>
+              <a:rPr lang="cs-CZ" dirty="0"/>
               <a:t>SQL </a:t>
             </a:r>
             <a:r>
-              <a:rPr lang="en-US" dirty="0" smtClean="0"/>
+              <a:rPr lang="en-US" dirty="0"/>
               <a:t>database</a:t>
             </a:r>
             <a:endParaRPr lang="cs-CZ" dirty="0"/>
@@ -11631,7 +11526,7 @@
           <p:nvPr>
             <p:extLst>
               <p:ext uri="{D42A27DB-BD31-4B8C-83A1-F6EECF244321}">
-                <p14:modId xmlns:p14="http://schemas.microsoft.com/office/powerpoint/2010/main" val="1614395580"/>
+                <p14:modId xmlns:p14="http://schemas.microsoft.com/office/powerpoint/2010/main" val="1950542971"/>
               </p:ext>
             </p:extLst>
           </p:nvPr>
@@ -11680,13 +11575,6 @@
   <p:clrMapOvr>
     <a:masterClrMapping/>
   </p:clrMapOvr>
-  <p:timing>
-    <p:tnLst>
-      <p:par>
-        <p:cTn id="1" dur="indefinite" restart="never" nodeType="tmRoot"/>
-      </p:par>
-    </p:tnLst>
-  </p:timing>
 </p:sld>
 </file>
 
@@ -11723,14 +11611,13 @@
           <a:lstStyle/>
           <a:p>
             <a:r>
-              <a:rPr lang="en-US" dirty="0" smtClean="0"/>
+              <a:rPr lang="en-US" dirty="0"/>
               <a:t>Testable</a:t>
             </a:r>
             <a:r>
-              <a:rPr lang="cs-CZ" dirty="0" smtClean="0"/>
+              <a:rPr lang="cs-CZ" dirty="0"/>
               <a:t>?</a:t>
             </a:r>
-            <a:endParaRPr lang="cs-CZ" dirty="0"/>
           </a:p>
         </p:txBody>
       </p:sp>
@@ -11750,7 +11637,7 @@
           <a:lstStyle/>
           <a:p>
             <a:r>
-              <a:rPr lang="en-US" dirty="0" smtClean="0"/>
+              <a:rPr lang="en-US" dirty="0"/>
               <a:t>Covered by automated tests</a:t>
             </a:r>
           </a:p>
@@ -11790,7 +11677,7 @@
           <p:nvPr>
             <p:extLst>
               <p:ext uri="{D42A27DB-BD31-4B8C-83A1-F6EECF244321}">
-                <p14:modId xmlns:p14="http://schemas.microsoft.com/office/powerpoint/2010/main" val="1272420771"/>
+                <p14:modId xmlns:p14="http://schemas.microsoft.com/office/powerpoint/2010/main" val="3142469021"/>
               </p:ext>
             </p:extLst>
           </p:nvPr>
@@ -11872,18 +11759,13 @@
           <a:lstStyle/>
           <a:p>
             <a:r>
-              <a:rPr lang="en-US" dirty="0" smtClean="0">
+              <a:rPr lang="en-US" dirty="0">
                 <a:solidFill>
                   <a:srgbClr val="C00000"/>
                 </a:solidFill>
               </a:rPr>
               <a:t>End-to-end tests</a:t>
             </a:r>
-            <a:endParaRPr lang="en-US" dirty="0">
-              <a:solidFill>
-                <a:srgbClr val="C00000"/>
-              </a:solidFill>
-            </a:endParaRPr>
           </a:p>
         </p:txBody>
       </p:sp>
@@ -11910,18 +11792,13 @@
           <a:lstStyle/>
           <a:p>
             <a:r>
-              <a:rPr lang="en-US" dirty="0" smtClean="0">
+              <a:rPr lang="en-US" dirty="0">
                 <a:solidFill>
                   <a:srgbClr val="0070C0"/>
                 </a:solidFill>
               </a:rPr>
               <a:t>Unit tests</a:t>
             </a:r>
-            <a:endParaRPr lang="en-US" dirty="0">
-              <a:solidFill>
-                <a:srgbClr val="0070C0"/>
-              </a:solidFill>
-            </a:endParaRPr>
           </a:p>
         </p:txBody>
       </p:sp>
@@ -12054,18 +11931,13 @@
           <a:lstStyle/>
           <a:p>
             <a:r>
-              <a:rPr lang="en-US" dirty="0" smtClean="0">
+              <a:rPr lang="en-US" dirty="0">
                 <a:solidFill>
                   <a:srgbClr val="00B050"/>
                 </a:solidFill>
               </a:rPr>
               <a:t>Integration tests</a:t>
             </a:r>
-            <a:endParaRPr lang="en-US" dirty="0">
-              <a:solidFill>
-                <a:srgbClr val="00B050"/>
-              </a:solidFill>
-            </a:endParaRPr>
           </a:p>
         </p:txBody>
       </p:sp>
@@ -12273,14 +12145,13 @@
           <a:lstStyle/>
           <a:p>
             <a:r>
-              <a:rPr lang="en-US" dirty="0" smtClean="0"/>
+              <a:rPr lang="en-US" dirty="0"/>
               <a:t>Switch to </a:t>
             </a:r>
             <a:r>
-              <a:rPr lang="cs-CZ" dirty="0" smtClean="0"/>
+              <a:rPr lang="cs-CZ" dirty="0"/>
               <a:t>VS</a:t>
             </a:r>
-            <a:endParaRPr lang="cs-CZ" dirty="0"/>
           </a:p>
         </p:txBody>
       </p:sp>
@@ -12396,96 +12267,87 @@
           <a:lstStyle/>
           <a:p>
             <a:r>
-              <a:rPr lang="cs-CZ" dirty="0"/>
-              <a:t>TypeScript - </a:t>
-            </a:r>
-            <a:r>
-              <a:rPr lang="cs-CZ" dirty="0">
+              <a:rPr lang="en-US" dirty="0"/>
+              <a:t>ASP.NET Core - </a:t>
+            </a:r>
+            <a:r>
+              <a:rPr lang="en-US" dirty="0">
                 <a:hlinkClick r:id="rId2"/>
               </a:rPr>
-              <a:t>https://www.typescriptlang.org/</a:t>
-            </a:r>
-            <a:endParaRPr lang="cs-CZ" dirty="0"/>
-          </a:p>
-          <a:p>
-            <a:r>
-              <a:rPr lang="en-US" dirty="0" err="1" smtClean="0"/>
-              <a:t>Moq</a:t>
-            </a:r>
-            <a:r>
-              <a:rPr lang="en-US" dirty="0" smtClean="0"/>
+              <a:t>https://docs.microsoft.com/en-us/aspnet/core/</a:t>
+            </a:r>
+            <a:endParaRPr lang="en-US" dirty="0"/>
+          </a:p>
+          <a:p>
+            <a:r>
+              <a:rPr lang="cs-CZ" dirty="0" err="1"/>
+              <a:t>TypeScript</a:t>
+            </a:r>
+            <a:r>
+              <a:rPr lang="cs-CZ" dirty="0"/>
               <a:t> - </a:t>
             </a:r>
             <a:r>
-              <a:rPr lang="en-US" dirty="0" smtClean="0">
+              <a:rPr lang="cs-CZ" dirty="0">
                 <a:hlinkClick r:id="rId3"/>
               </a:rPr>
-              <a:t>https</a:t>
-            </a:r>
-            <a:r>
-              <a:rPr lang="en-US" dirty="0">
-                <a:hlinkClick r:id="rId3"/>
-              </a:rPr>
-              <a:t>://</a:t>
-            </a:r>
-            <a:r>
-              <a:rPr lang="en-US" dirty="0" smtClean="0">
-                <a:hlinkClick r:id="rId3"/>
-              </a:rPr>
-              <a:t>github.com/Moq/moq4/wiki/Quickstart</a:t>
-            </a:r>
-            <a:endParaRPr lang="en-US" dirty="0"/>
-          </a:p>
-          <a:p>
-            <a:r>
-              <a:rPr lang="en-US" dirty="0" smtClean="0"/>
-              <a:t>AngularJS </a:t>
+              <a:t>https://www.typescriptlang.org/</a:t>
+            </a:r>
+            <a:endParaRPr lang="cs-CZ" dirty="0"/>
+          </a:p>
+          <a:p>
+            <a:r>
+              <a:rPr lang="en-US" dirty="0" err="1"/>
+              <a:t>Moq</a:t>
             </a:r>
             <a:r>
               <a:rPr lang="en-US" dirty="0"/>
-              <a:t>– </a:t>
+              <a:t> - </a:t>
             </a:r>
             <a:r>
               <a:rPr lang="en-US" dirty="0">
                 <a:hlinkClick r:id="rId4"/>
               </a:rPr>
-              <a:t>https://</a:t>
-            </a:r>
-            <a:r>
-              <a:rPr lang="en-US" dirty="0" smtClean="0">
-                <a:hlinkClick r:id="rId4"/>
-              </a:rPr>
-              <a:t>angularjs.org</a:t>
-            </a:r>
-            <a:endParaRPr lang="en-US" dirty="0" smtClean="0"/>
-          </a:p>
-          <a:p>
-            <a:r>
-              <a:rPr lang="en-US" dirty="0" smtClean="0"/>
-              <a:t>Protractor </a:t>
-            </a:r>
+              <a:t>https://github.com/Moq/moq4/wiki/Quickstart</a:t>
+            </a:r>
+            <a:endParaRPr lang="en-US" dirty="0"/>
+          </a:p>
+          <a:p>
             <a:r>
               <a:rPr lang="en-US" dirty="0"/>
-              <a:t>- </a:t>
+              <a:t>Angular – </a:t>
             </a:r>
             <a:r>
               <a:rPr lang="en-US" dirty="0">
                 <a:hlinkClick r:id="rId5"/>
               </a:rPr>
-              <a:t>http://www.protractortest.org/</a:t>
+              <a:t>https://angular.io</a:t>
             </a:r>
             <a:endParaRPr lang="en-US" dirty="0"/>
           </a:p>
           <a:p>
             <a:r>
               <a:rPr lang="en-US" dirty="0"/>
-              <a:t>Protractor HTTP mock - </a:t>
+              <a:t>Protractor - </a:t>
             </a:r>
             <a:r>
               <a:rPr lang="en-US" dirty="0">
                 <a:hlinkClick r:id="rId6"/>
               </a:rPr>
-              <a:t>https://github.com/atecarlos/protractor-http-mock</a:t>
+              <a:t>http://www.protractortest.org/</a:t>
+            </a:r>
+            <a:endParaRPr lang="en-US" dirty="0"/>
+          </a:p>
+          <a:p>
+            <a:r>
+              <a:rPr lang="en-US" dirty="0"/>
+              <a:t>Protractor HTTP mock - </a:t>
+            </a:r>
+            <a:r>
+              <a:rPr lang="en-US" dirty="0">
+                <a:hlinkClick r:id="rId7"/>
+              </a:rPr>
+              <a:t>https://www.npmjs.com/package/protractor-xmlhttprequest-mock</a:t>
             </a:r>
             <a:endParaRPr lang="en-US" dirty="0"/>
           </a:p>
@@ -12496,7 +12358,7 @@
             </a:r>
             <a:r>
               <a:rPr lang="cs-CZ" dirty="0">
-                <a:hlinkClick r:id="rId7"/>
+                <a:hlinkClick r:id="rId8"/>
               </a:rPr>
               <a:t>https://github.com/tamasflamich/effort</a:t>
             </a:r>
@@ -12604,7 +12466,7 @@
           <a:lstStyle/>
           <a:p>
             <a:r>
-              <a:rPr lang="cs-CZ" dirty="0" smtClean="0"/>
+              <a:rPr lang="cs-CZ" dirty="0"/>
               <a:t>Solar</a:t>
             </a:r>
             <a:r>
@@ -12612,7 +12474,7 @@
               <a:t>W</a:t>
             </a:r>
             <a:r>
-              <a:rPr lang="cs-CZ" dirty="0" smtClean="0"/>
+              <a:rPr lang="cs-CZ" dirty="0"/>
               <a:t>inds</a:t>
             </a:r>
             <a:endParaRPr lang="en-US" dirty="0"/>
@@ -12660,7 +12522,7 @@
             </a:pPr>
             <a:r>
               <a:rPr lang="en-US" dirty="0"/>
-              <a:t>Microsoft stack: C#, MS SQL, AngularJS</a:t>
+              <a:t>Microsoft stack: C#, MS SQL, Angular</a:t>
             </a:r>
           </a:p>
           <a:p>
@@ -12674,15 +12536,7 @@
             </a:pPr>
             <a:r>
               <a:rPr lang="en-US" dirty="0"/>
-              <a:t>Brno office – </a:t>
-            </a:r>
-            <a:r>
-              <a:rPr lang="en-US" dirty="0"/>
-              <a:t>SolarWinds </a:t>
-            </a:r>
-            <a:r>
-              <a:rPr lang="en-US" dirty="0"/>
-              <a:t>R&amp;D center</a:t>
+              <a:t>Brno office – SolarWinds R&amp;D center</a:t>
             </a:r>
           </a:p>
           <a:p>
@@ -12730,15 +12584,9 @@
             </a:r>
           </a:p>
           <a:p>
-            <a:pPr>
-              <a:defRPr/>
+            <a:pPr marL="0" indent="0">
+              <a:buNone/>
             </a:pPr>
-            <a:r>
-              <a:rPr lang="en-US" dirty="0"/>
-              <a:t>Visit our booth</a:t>
-            </a:r>
-          </a:p>
-          <a:p>
             <a:endParaRPr lang="en-US" dirty="0"/>
           </a:p>
         </p:txBody>
@@ -12843,21 +12691,13 @@
           <a:p>
             <a:r>
               <a:rPr lang="en-US" dirty="0"/>
-              <a:t>Test </a:t>
-            </a:r>
-            <a:r>
-              <a:rPr lang="en-US" dirty="0" smtClean="0"/>
-              <a:t>pyramid</a:t>
-            </a:r>
-          </a:p>
-          <a:p>
-            <a:r>
-              <a:rPr lang="en-US" dirty="0" smtClean="0"/>
-              <a:t>Different </a:t>
-            </a:r>
+              <a:t>Test pyramid</a:t>
+            </a:r>
+          </a:p>
+          <a:p>
             <a:r>
               <a:rPr lang="en-US" dirty="0"/>
-              <a:t>kinds of tests</a:t>
+              <a:t>Different kinds of tests</a:t>
             </a:r>
           </a:p>
           <a:p>
@@ -12883,23 +12723,19 @@
           </a:p>
           <a:p>
             <a:r>
-              <a:rPr lang="en-US" dirty="0" smtClean="0"/>
+              <a:rPr lang="en-US" dirty="0"/>
               <a:t>Sample application</a:t>
             </a:r>
           </a:p>
           <a:p>
             <a:pPr lvl="1"/>
             <a:r>
-              <a:rPr lang="en-US" dirty="0" smtClean="0"/>
-              <a:t>AngularJS, ASP.NET </a:t>
-            </a:r>
-            <a:r>
-              <a:rPr lang="en-US" dirty="0" err="1" smtClean="0"/>
+              <a:rPr lang="en-US" dirty="0"/>
+              <a:t>Angular 5, ASP.NET Core </a:t>
+            </a:r>
+            <a:r>
+              <a:rPr lang="en-US" dirty="0" err="1"/>
               <a:t>WebApi</a:t>
-            </a:r>
-            <a:r>
-              <a:rPr lang="en-US" dirty="0" smtClean="0"/>
-              <a:t> 2</a:t>
             </a:r>
             <a:endParaRPr lang="cs-CZ" dirty="0"/>
           </a:p>
@@ -12939,13 +12775,6 @@
   <p:clrMapOvr>
     <a:masterClrMapping/>
   </p:clrMapOvr>
-  <p:timing>
-    <p:tnLst>
-      <p:par>
-        <p:cTn id="1" dur="indefinite" restart="never" nodeType="tmRoot"/>
-      </p:par>
-    </p:tnLst>
-  </p:timing>
 </p:sld>
 </file>
 
@@ -12982,14 +12811,13 @@
           <a:lstStyle/>
           <a:p>
             <a:r>
-              <a:rPr lang="en-US" dirty="0" smtClean="0"/>
+              <a:rPr lang="en-US" dirty="0"/>
               <a:t>Why testing</a:t>
             </a:r>
             <a:r>
-              <a:rPr lang="cs-CZ" dirty="0" smtClean="0"/>
+              <a:rPr lang="cs-CZ" dirty="0"/>
               <a:t>?</a:t>
             </a:r>
-            <a:endParaRPr lang="cs-CZ" dirty="0"/>
           </a:p>
         </p:txBody>
       </p:sp>
@@ -13009,21 +12837,20 @@
           <a:lstStyle/>
           <a:p>
             <a:r>
-              <a:rPr lang="en-US" dirty="0" smtClean="0"/>
+              <a:rPr lang="en-US" dirty="0"/>
               <a:t>Tests define the behavior of application</a:t>
             </a:r>
-            <a:endParaRPr lang="en-US" dirty="0"/>
-          </a:p>
-          <a:p>
-            <a:r>
-              <a:rPr lang="en-US" dirty="0" smtClean="0"/>
+          </a:p>
+          <a:p>
+            <a:r>
+              <a:rPr lang="en-US" dirty="0"/>
               <a:t>Allow safe changes and refactoring</a:t>
             </a:r>
             <a:endParaRPr lang="cs-CZ" dirty="0"/>
           </a:p>
           <a:p>
             <a:r>
-              <a:rPr lang="en-US" dirty="0" smtClean="0"/>
+              <a:rPr lang="en-US" dirty="0"/>
               <a:t>Simplify debugging</a:t>
             </a:r>
             <a:endParaRPr lang="cs-CZ" dirty="0"/>
@@ -13031,34 +12858,34 @@
           <a:p>
             <a:pPr lvl="1"/>
             <a:r>
-              <a:rPr lang="en-US" dirty="0" smtClean="0"/>
+              <a:rPr lang="en-US" dirty="0"/>
               <a:t>Debugging against unit test is much cheaper than against live application</a:t>
             </a:r>
             <a:endParaRPr lang="cs-CZ" dirty="0"/>
           </a:p>
           <a:p>
             <a:r>
-              <a:rPr lang="en-US" dirty="0" smtClean="0"/>
+              <a:rPr lang="en-US" dirty="0"/>
               <a:t>Improve code quality</a:t>
             </a:r>
           </a:p>
           <a:p>
             <a:r>
-              <a:rPr lang="en-US" dirty="0" smtClean="0"/>
+              <a:rPr lang="en-US" dirty="0"/>
               <a:t>What to test?</a:t>
             </a:r>
           </a:p>
           <a:p>
             <a:pPr lvl="1"/>
             <a:r>
-              <a:rPr lang="en-US" dirty="0" smtClean="0"/>
+              <a:rPr lang="en-US" dirty="0"/>
               <a:t>Consider gain/price ratio</a:t>
             </a:r>
           </a:p>
           <a:p>
             <a:pPr lvl="1"/>
             <a:r>
-              <a:rPr lang="en-US" dirty="0" smtClean="0"/>
+              <a:rPr lang="en-US" dirty="0"/>
               <a:t>Parts that have high impact on functionality bring more benefit</a:t>
             </a:r>
             <a:endParaRPr lang="cs-CZ" dirty="0"/>
@@ -13099,13 +12926,6 @@
   <p:clrMapOvr>
     <a:masterClrMapping/>
   </p:clrMapOvr>
-  <p:timing>
-    <p:tnLst>
-      <p:par>
-        <p:cTn id="1" dur="indefinite" restart="never" nodeType="tmRoot"/>
-      </p:par>
-    </p:tnLst>
-  </p:timing>
 </p:sld>
 </file>
 
@@ -13142,7 +12962,7 @@
           <a:lstStyle/>
           <a:p>
             <a:r>
-              <a:rPr lang="cs-CZ" dirty="0" smtClean="0"/>
+              <a:rPr lang="cs-CZ" dirty="0"/>
               <a:t>Test pyramid</a:t>
             </a:r>
             <a:endParaRPr lang="en-US" dirty="0"/>
@@ -13259,11 +13079,11 @@
           <a:lstStyle/>
           <a:p>
             <a:r>
-              <a:rPr lang="en-US" sz="2800" dirty="0" smtClean="0"/>
+              <a:rPr lang="en-US" sz="2800" dirty="0"/>
               <a:t>To the top</a:t>
             </a:r>
             <a:r>
-              <a:rPr lang="cs-CZ" sz="2800" dirty="0" smtClean="0"/>
+              <a:rPr lang="cs-CZ" sz="2800" dirty="0"/>
               <a:t>:</a:t>
             </a:r>
             <a:endParaRPr lang="en-US" sz="2800" dirty="0"/>
@@ -13271,35 +13091,20 @@
           <a:p>
             <a:r>
               <a:rPr lang="en-US" sz="2800" dirty="0"/>
-              <a:t>- l</a:t>
-            </a:r>
-            <a:r>
-              <a:rPr lang="en-US" sz="2800" dirty="0" smtClean="0"/>
-              <a:t>ess reliable</a:t>
-            </a:r>
-            <a:endParaRPr lang="en-US" sz="2800" dirty="0"/>
+              <a:t>- less reliable</a:t>
+            </a:r>
           </a:p>
           <a:p>
             <a:r>
               <a:rPr lang="en-US" sz="2800" dirty="0"/>
-              <a:t>- h</a:t>
-            </a:r>
-            <a:r>
-              <a:rPr lang="en-US" sz="2800" dirty="0" smtClean="0"/>
-              <a:t>igher price</a:t>
-            </a:r>
-            <a:endParaRPr lang="en-US" sz="2800" dirty="0"/>
+              <a:t>- higher price</a:t>
+            </a:r>
           </a:p>
           <a:p>
             <a:r>
               <a:rPr lang="en-US" sz="2800" dirty="0"/>
-              <a:t>- s</a:t>
-            </a:r>
-            <a:r>
-              <a:rPr lang="en-US" sz="2800" dirty="0" smtClean="0"/>
-              <a:t>lower feedback</a:t>
-            </a:r>
-            <a:endParaRPr lang="en-US" sz="2800" dirty="0"/>
+              <a:t>- slower feedback</a:t>
+            </a:r>
           </a:p>
         </p:txBody>
       </p:sp>
@@ -13425,11 +13230,7 @@
           <a:p>
             <a:r>
               <a:rPr lang="cs-CZ" dirty="0"/>
-              <a:t>Unit </a:t>
-            </a:r>
-            <a:r>
-              <a:rPr lang="cs-CZ" dirty="0" smtClean="0"/>
-              <a:t>test</a:t>
+              <a:t>Unit test</a:t>
             </a:r>
             <a:r>
               <a:rPr lang="en-US" dirty="0"/>
@@ -13461,7 +13262,7 @@
               <a:t>Unit test </a:t>
             </a:r>
             <a:r>
-              <a:rPr lang="en-US" dirty="0" smtClean="0"/>
+              <a:rPr lang="en-US" dirty="0"/>
               <a:t>is code as any other</a:t>
             </a:r>
             <a:endParaRPr lang="cs-CZ" dirty="0"/>
@@ -13469,7 +13270,7 @@
           <a:p>
             <a:pPr lvl="1"/>
             <a:r>
-              <a:rPr lang="en-US" dirty="0" smtClean="0"/>
+              <a:rPr lang="en-US" dirty="0"/>
               <a:t>Needs to be maintained</a:t>
             </a:r>
             <a:endParaRPr lang="cs-CZ" dirty="0"/>
@@ -13477,92 +13278,91 @@
           <a:p>
             <a:pPr lvl="1"/>
             <a:r>
-              <a:rPr lang="en-US" dirty="0" smtClean="0"/>
+              <a:rPr lang="en-US" dirty="0"/>
               <a:t>Can be debugged</a:t>
             </a:r>
             <a:endParaRPr lang="cs-CZ" dirty="0"/>
           </a:p>
           <a:p>
             <a:r>
-              <a:rPr lang="en-US" dirty="0" smtClean="0"/>
+              <a:rPr lang="en-US" dirty="0"/>
               <a:t>Tests just one class/component</a:t>
             </a:r>
             <a:endParaRPr lang="cs-CZ" dirty="0"/>
           </a:p>
           <a:p>
             <a:r>
-              <a:rPr lang="en-US" dirty="0" smtClean="0"/>
+              <a:rPr lang="en-US" dirty="0"/>
               <a:t>Should be</a:t>
             </a:r>
             <a:r>
-              <a:rPr lang="cs-CZ" dirty="0" smtClean="0"/>
+              <a:rPr lang="cs-CZ" dirty="0"/>
               <a:t>:</a:t>
             </a:r>
+          </a:p>
+          <a:p>
+            <a:pPr lvl="1"/>
+            <a:r>
+              <a:rPr lang="en-US" dirty="0"/>
+              <a:t>Easy to write</a:t>
+            </a:r>
             <a:endParaRPr lang="cs-CZ" dirty="0"/>
           </a:p>
           <a:p>
             <a:pPr lvl="1"/>
             <a:r>
-              <a:rPr lang="en-US" dirty="0" smtClean="0"/>
-              <a:t>Easy to write</a:t>
+              <a:rPr lang="en-US" dirty="0"/>
+              <a:t>Readable</a:t>
             </a:r>
             <a:endParaRPr lang="cs-CZ" dirty="0"/>
           </a:p>
           <a:p>
             <a:pPr lvl="1"/>
             <a:r>
-              <a:rPr lang="en-US" dirty="0" smtClean="0"/>
-              <a:t>Readable</a:t>
+              <a:rPr lang="en-US" dirty="0"/>
+              <a:t>Reliable</a:t>
             </a:r>
             <a:endParaRPr lang="cs-CZ" dirty="0"/>
           </a:p>
           <a:p>
             <a:pPr lvl="1"/>
             <a:r>
-              <a:rPr lang="en-US" dirty="0" smtClean="0"/>
-              <a:t>Reliable</a:t>
+              <a:rPr lang="en-US" dirty="0"/>
+              <a:t>Fast</a:t>
             </a:r>
             <a:endParaRPr lang="cs-CZ" dirty="0"/>
           </a:p>
           <a:p>
             <a:pPr lvl="1"/>
             <a:r>
-              <a:rPr lang="en-US" dirty="0" smtClean="0"/>
-              <a:t>Fast</a:t>
+              <a:rPr lang="en-US" dirty="0"/>
+              <a:t>Independent</a:t>
             </a:r>
             <a:endParaRPr lang="cs-CZ" dirty="0"/>
           </a:p>
           <a:p>
             <a:pPr lvl="1"/>
             <a:r>
-              <a:rPr lang="en-US" dirty="0" smtClean="0"/>
-              <a:t>Independent</a:t>
+              <a:rPr lang="cs-CZ" dirty="0"/>
+              <a:t>Determinist</a:t>
+            </a:r>
+            <a:r>
+              <a:rPr lang="en-US" dirty="0" err="1"/>
+              <a:t>ic</a:t>
+            </a:r>
+            <a:endParaRPr lang="en-US" dirty="0"/>
+          </a:p>
+          <a:p>
+            <a:pPr lvl="1"/>
+            <a:r>
+              <a:rPr lang="en-US" dirty="0"/>
+              <a:t>No need for special test code</a:t>
             </a:r>
             <a:endParaRPr lang="cs-CZ" dirty="0"/>
           </a:p>
           <a:p>
-            <a:pPr lvl="1"/>
-            <a:r>
-              <a:rPr lang="cs-CZ" dirty="0" smtClean="0"/>
-              <a:t>Determinist</a:t>
-            </a:r>
-            <a:r>
-              <a:rPr lang="en-US" dirty="0" err="1" smtClean="0"/>
-              <a:t>ic</a:t>
-            </a:r>
-            <a:endParaRPr lang="en-US" dirty="0" smtClean="0"/>
-          </a:p>
-          <a:p>
-            <a:pPr lvl="1"/>
-            <a:r>
-              <a:rPr lang="en-US" dirty="0" smtClean="0"/>
-              <a:t>No need for special test code</a:t>
-            </a:r>
-            <a:endParaRPr lang="cs-CZ" dirty="0"/>
-          </a:p>
-          <a:p>
-            <a:r>
-              <a:rPr lang="en-US" dirty="0" smtClean="0"/>
+            <a:r>
+              <a:rPr lang="en-US" dirty="0"/>
               <a:t>It’s cheapest kind of test</a:t>
             </a:r>
             <a:endParaRPr lang="cs-CZ" dirty="0"/>
@@ -13606,13 +13406,6 @@
   <p:clrMapOvr>
     <a:masterClrMapping/>
   </p:clrMapOvr>
-  <p:timing>
-    <p:tnLst>
-      <p:par>
-        <p:cTn id="1" dur="indefinite" restart="never" nodeType="tmRoot"/>
-      </p:par>
-    </p:tnLst>
-  </p:timing>
 </p:sld>
 </file>
 
@@ -13649,10 +13442,9 @@
           <a:lstStyle/>
           <a:p>
             <a:r>
-              <a:rPr lang="en-US" dirty="0" smtClean="0"/>
+              <a:rPr lang="en-US" dirty="0"/>
               <a:t>Readable</a:t>
             </a:r>
-            <a:endParaRPr lang="en-US" dirty="0"/>
           </a:p>
         </p:txBody>
       </p:sp>
@@ -13789,7 +13581,7 @@
           <a:lstStyle/>
           <a:p>
             <a:r>
-              <a:rPr lang="en-US" dirty="0" smtClean="0"/>
+              <a:rPr lang="en-US" dirty="0"/>
               <a:t>Enemies of testable code</a:t>
             </a:r>
             <a:endParaRPr lang="cs-CZ" dirty="0"/>
@@ -13814,7 +13606,7 @@
           <a:lstStyle/>
           <a:p>
             <a:r>
-              <a:rPr lang="en-US" dirty="0" smtClean="0"/>
+              <a:rPr lang="en-US" dirty="0"/>
               <a:t>Static classes/methods</a:t>
             </a:r>
             <a:endParaRPr lang="cs-CZ" dirty="0"/>
@@ -13822,69 +13614,68 @@
           <a:p>
             <a:pPr lvl="1"/>
             <a:r>
-              <a:rPr lang="en-US" dirty="0" smtClean="0"/>
+              <a:rPr lang="en-US" dirty="0"/>
               <a:t>You can’t replace them with custom logic for testing</a:t>
             </a:r>
-            <a:endParaRPr lang="cs-CZ" dirty="0" smtClean="0"/>
-          </a:p>
-          <a:p>
-            <a:endParaRPr lang="en-US" dirty="0" smtClean="0"/>
+            <a:endParaRPr lang="cs-CZ" dirty="0"/>
           </a:p>
           <a:p>
             <a:endParaRPr lang="en-US" dirty="0"/>
           </a:p>
           <a:p>
-            <a:endParaRPr lang="en-US" dirty="0" smtClean="0"/>
-          </a:p>
-          <a:p>
-            <a:r>
-              <a:rPr lang="cs-CZ" dirty="0" smtClean="0"/>
+            <a:endParaRPr lang="en-US" dirty="0"/>
+          </a:p>
+          <a:p>
+            <a:endParaRPr lang="en-US" dirty="0"/>
+          </a:p>
+          <a:p>
+            <a:r>
+              <a:rPr lang="cs-CZ" dirty="0"/>
               <a:t>Singleton</a:t>
             </a:r>
+          </a:p>
+          <a:p>
+            <a:pPr lvl="1"/>
+            <a:r>
+              <a:rPr lang="en-US" dirty="0"/>
+              <a:t>Only one instance holding the state</a:t>
+            </a:r>
             <a:endParaRPr lang="cs-CZ" dirty="0"/>
           </a:p>
           <a:p>
             <a:pPr lvl="1"/>
             <a:r>
-              <a:rPr lang="en-US" dirty="0" smtClean="0"/>
-              <a:t>Only one instance holding the state</a:t>
+              <a:rPr lang="en-US" dirty="0"/>
+              <a:t>Can’t parallelize tests</a:t>
             </a:r>
             <a:endParaRPr lang="cs-CZ" dirty="0"/>
           </a:p>
           <a:p>
             <a:pPr lvl="1"/>
             <a:r>
-              <a:rPr lang="en-US" dirty="0" smtClean="0"/>
-              <a:t>Can’t parallelize tests</a:t>
+              <a:rPr lang="en-US" dirty="0"/>
+              <a:t>Can’t reset to default state without special test-only code</a:t>
             </a:r>
             <a:endParaRPr lang="cs-CZ" dirty="0"/>
           </a:p>
           <a:p>
+            <a:r>
+              <a:rPr lang="en-US" dirty="0"/>
+              <a:t>Global state</a:t>
+            </a:r>
+            <a:endParaRPr lang="cs-CZ" dirty="0"/>
+          </a:p>
+          <a:p>
             <a:pPr lvl="1"/>
             <a:r>
-              <a:rPr lang="en-US" dirty="0" smtClean="0"/>
-              <a:t>Can’t reset to default state</a:t>
-            </a:r>
-            <a:endParaRPr lang="cs-CZ" dirty="0"/>
-          </a:p>
-          <a:p>
-            <a:r>
-              <a:rPr lang="en-US" dirty="0" smtClean="0"/>
-              <a:t>Global state</a:t>
-            </a:r>
-            <a:endParaRPr lang="cs-CZ" dirty="0" smtClean="0"/>
+              <a:rPr lang="cs-CZ" dirty="0"/>
+              <a:t>Environment variables</a:t>
+            </a:r>
           </a:p>
           <a:p>
             <a:pPr lvl="1"/>
             <a:r>
-              <a:rPr lang="cs-CZ" dirty="0" smtClean="0"/>
-              <a:t>Environment variables</a:t>
-            </a:r>
-          </a:p>
-          <a:p>
-            <a:pPr lvl="1"/>
-            <a:r>
-              <a:rPr lang="en-US" dirty="0" smtClean="0"/>
+              <a:rPr lang="en-US" dirty="0"/>
               <a:t>Configuration files</a:t>
             </a:r>
             <a:endParaRPr lang="cs-CZ" dirty="0"/>
@@ -13955,13 +13746,6 @@
   <p:clrMapOvr>
     <a:masterClrMapping/>
   </p:clrMapOvr>
-  <p:timing>
-    <p:tnLst>
-      <p:par>
-        <p:cTn id="1" dur="indefinite" restart="never" nodeType="tmRoot"/>
-      </p:par>
-    </p:tnLst>
-  </p:timing>
 </p:sld>
 </file>
 
@@ -14027,13 +13811,8 @@
             </a:r>
             <a:r>
               <a:rPr lang="en-US" dirty="0"/>
-              <a:t>OLID </a:t>
-            </a:r>
-            <a:r>
-              <a:rPr lang="en-US" dirty="0" smtClean="0"/>
-              <a:t>principles</a:t>
-            </a:r>
-            <a:endParaRPr lang="en-US" dirty="0"/>
+              <a:t>OLID principles</a:t>
+            </a:r>
           </a:p>
           <a:p>
             <a:pPr lvl="1"/>
@@ -14046,10 +13825,9 @@
           <a:p>
             <a:pPr lvl="2"/>
             <a:r>
-              <a:rPr lang="en-US" dirty="0" smtClean="0"/>
+              <a:rPr lang="en-US" dirty="0"/>
               <a:t>Class does just one thing</a:t>
             </a:r>
-            <a:endParaRPr lang="en-US" dirty="0"/>
           </a:p>
           <a:p>
             <a:pPr lvl="1"/>
@@ -14062,17 +13840,16 @@
           <a:p>
             <a:pPr lvl="2"/>
             <a:r>
-              <a:rPr lang="en-US" dirty="0" smtClean="0"/>
+              <a:rPr lang="en-US" dirty="0"/>
               <a:t>Class is opened for extension but closed for changes</a:t>
             </a:r>
           </a:p>
           <a:p>
             <a:pPr lvl="2"/>
             <a:r>
-              <a:rPr lang="en-US" dirty="0" smtClean="0"/>
+              <a:rPr lang="en-US" dirty="0"/>
               <a:t>Easy to add new functionality without need to touch existing code</a:t>
             </a:r>
-            <a:endParaRPr lang="en-US" dirty="0"/>
           </a:p>
           <a:p>
             <a:pPr lvl="1"/>
@@ -14089,10 +13866,9 @@
           <a:p>
             <a:pPr lvl="2"/>
             <a:r>
-              <a:rPr lang="en-US" dirty="0" smtClean="0"/>
+              <a:rPr lang="en-US" dirty="0"/>
               <a:t>Class can be replaced by its subclass without affecting functionality</a:t>
             </a:r>
-            <a:endParaRPr lang="en-US" dirty="0"/>
           </a:p>
           <a:p>
             <a:pPr lvl="1"/>
@@ -14105,10 +13881,9 @@
           <a:p>
             <a:pPr lvl="2"/>
             <a:r>
-              <a:rPr lang="en-US" dirty="0" smtClean="0"/>
+              <a:rPr lang="en-US" dirty="0"/>
               <a:t>Interface should be small and focused</a:t>
             </a:r>
-            <a:endParaRPr lang="en-US" dirty="0"/>
           </a:p>
           <a:p>
             <a:pPr lvl="1"/>
@@ -14121,10 +13896,9 @@
           <a:p>
             <a:pPr lvl="2"/>
             <a:r>
-              <a:rPr lang="en-US" dirty="0" smtClean="0"/>
+              <a:rPr lang="en-US" dirty="0"/>
               <a:t>Concrete classes depend on abstract interfaces, not vice versa</a:t>
             </a:r>
-            <a:endParaRPr lang="en-US" dirty="0"/>
           </a:p>
           <a:p>
             <a:endParaRPr lang="cs-CZ" dirty="0"/>
@@ -14165,13 +13939,6 @@
   <p:clrMapOvr>
     <a:masterClrMapping/>
   </p:clrMapOvr>
-  <p:timing>
-    <p:tnLst>
-      <p:par>
-        <p:cTn id="1" dur="indefinite" restart="never" nodeType="tmRoot"/>
-      </p:par>
-    </p:tnLst>
-  </p:timing>
 </p:sld>
 </file>
 
@@ -14208,7 +13975,7 @@
           <a:lstStyle/>
           <a:p>
             <a:r>
-              <a:rPr lang="en-US" dirty="0" smtClean="0"/>
+              <a:rPr lang="en-US" dirty="0"/>
               <a:t>Integration tests</a:t>
             </a:r>
             <a:endParaRPr lang="cs-CZ" dirty="0"/>
@@ -14231,14 +13998,14 @@
           <a:lstStyle/>
           <a:p>
             <a:r>
-              <a:rPr lang="en-US" dirty="0" smtClean="0"/>
+              <a:rPr lang="en-US" dirty="0"/>
               <a:t>Test more classes or components together</a:t>
             </a:r>
             <a:endParaRPr lang="cs-CZ" dirty="0"/>
           </a:p>
           <a:p>
             <a:r>
-              <a:rPr lang="en-US" dirty="0" smtClean="0"/>
+              <a:rPr lang="en-US" dirty="0"/>
               <a:t>Focused on component integration</a:t>
             </a:r>
             <a:endParaRPr lang="cs-CZ" dirty="0"/>
@@ -14246,14 +14013,14 @@
           <a:p>
             <a:pPr lvl="1"/>
             <a:r>
-              <a:rPr lang="en-US" dirty="0" smtClean="0"/>
+              <a:rPr lang="en-US" dirty="0"/>
               <a:t>Correct use of API</a:t>
             </a:r>
             <a:endParaRPr lang="cs-CZ" dirty="0"/>
           </a:p>
           <a:p>
             <a:r>
-              <a:rPr lang="en-US" dirty="0" smtClean="0"/>
+              <a:rPr lang="en-US" dirty="0"/>
               <a:t>Good to use when</a:t>
             </a:r>
             <a:endParaRPr lang="cs-CZ" dirty="0"/>
@@ -14261,7 +14028,7 @@
           <a:p>
             <a:pPr lvl="1"/>
             <a:r>
-              <a:rPr lang="en-US" dirty="0" smtClean="0"/>
+              <a:rPr lang="en-US" dirty="0"/>
               <a:t>Testing component alone is too complex to setup</a:t>
             </a:r>
             <a:endParaRPr lang="cs-CZ" dirty="0"/>
@@ -14269,7 +14036,7 @@
           <a:p>
             <a:pPr lvl="1"/>
             <a:r>
-              <a:rPr lang="en-US" dirty="0" smtClean="0"/>
+              <a:rPr lang="en-US" dirty="0"/>
               <a:t>Component integration is not trivial</a:t>
             </a:r>
             <a:endParaRPr lang="cs-CZ" dirty="0"/>
@@ -14277,30 +14044,29 @@
           <a:p>
             <a:pPr lvl="1"/>
             <a:r>
-              <a:rPr lang="en-US" dirty="0" smtClean="0"/>
-              <a:t>To test complex workflow</a:t>
-            </a:r>
-          </a:p>
-          <a:p>
-            <a:r>
-              <a:rPr lang="en-US" dirty="0" smtClean="0"/>
+              <a:rPr lang="en-US" dirty="0"/>
+              <a:t>To test complex workflows</a:t>
+            </a:r>
+          </a:p>
+          <a:p>
+            <a:r>
+              <a:rPr lang="en-US" dirty="0"/>
               <a:t>More expensive than unit tests but still good</a:t>
             </a:r>
           </a:p>
           <a:p>
             <a:pPr lvl="1"/>
             <a:r>
-              <a:rPr lang="en-US" dirty="0" smtClean="0"/>
+              <a:rPr lang="en-US" dirty="0"/>
               <a:t>Slower</a:t>
             </a:r>
           </a:p>
           <a:p>
             <a:pPr lvl="1"/>
             <a:r>
-              <a:rPr lang="en-US" dirty="0" smtClean="0"/>
+              <a:rPr lang="en-US" dirty="0"/>
               <a:t>Harder to maintain</a:t>
             </a:r>
-            <a:endParaRPr lang="en-US" dirty="0"/>
           </a:p>
         </p:txBody>
       </p:sp>
@@ -14325,10 +14091,9 @@
           <a:lstStyle/>
           <a:p>
             <a:r>
-              <a:rPr lang="en-US" dirty="0" smtClean="0"/>
+              <a:rPr lang="en-US" dirty="0"/>
               <a:t>8</a:t>
             </a:r>
-            <a:endParaRPr lang="en-US" dirty="0"/>
           </a:p>
         </p:txBody>
       </p:sp>
@@ -14342,13 +14107,6 @@
   <p:clrMapOvr>
     <a:masterClrMapping/>
   </p:clrMapOvr>
-  <p:timing>
-    <p:tnLst>
-      <p:par>
-        <p:cTn id="1" dur="indefinite" restart="never" nodeType="tmRoot"/>
-      </p:par>
-    </p:tnLst>
-  </p:timing>
 </p:sld>
 </file>
 

</xml_diff>

<commit_message>
Polished client tests, cleanup, agenda
</commit_message>
<xml_diff>
--- a/slides.pptx
+++ b/slides.pptx
@@ -12264,7 +12264,7 @@
         <p:spPr/>
         <p:txBody>
           <a:bodyPr>
-            <a:normAutofit/>
+            <a:normAutofit lnSpcReduction="10000"/>
           </a:bodyPr>
           <a:lstStyle/>
           <a:p>
@@ -12316,16 +12316,16 @@
           </a:p>
           <a:p>
             <a:r>
-              <a:rPr lang="en-US"/>
+              <a:rPr lang="en-US" dirty="0"/>
               <a:t>Fluent Assertions - </a:t>
             </a:r>
             <a:r>
-              <a:rPr lang="en-US">
+              <a:rPr lang="en-US" dirty="0">
                 <a:hlinkClick r:id="rId5"/>
               </a:rPr>
               <a:t>https://fluentassertions.com/</a:t>
             </a:r>
-            <a:endParaRPr lang="en-US"/>
+            <a:endParaRPr lang="en-US" dirty="0"/>
           </a:p>
           <a:p>
             <a:r>
@@ -12343,25 +12343,38 @@
           <a:p>
             <a:r>
               <a:rPr lang="en-US" dirty="0"/>
-              <a:t>Protractor - </a:t>
+              <a:t>Jasmine - </a:t>
             </a:r>
             <a:r>
               <a:rPr lang="en-US" dirty="0">
                 <a:hlinkClick r:id="rId7"/>
               </a:rPr>
-              <a:t>http://www.protractortest.org/</a:t>
+              <a:t>https://jasmine.github.io/</a:t>
             </a:r>
             <a:endParaRPr lang="en-US" dirty="0"/>
           </a:p>
           <a:p>
             <a:r>
               <a:rPr lang="en-US" dirty="0"/>
-              <a:t>Protractor HTTP mock - </a:t>
+              <a:t>Protractor - </a:t>
             </a:r>
             <a:r>
               <a:rPr lang="en-US" dirty="0">
                 <a:hlinkClick r:id="rId8"/>
               </a:rPr>
+              <a:t>http://www.protractortest.org/</a:t>
+            </a:r>
+            <a:endParaRPr lang="en-US" dirty="0"/>
+          </a:p>
+          <a:p>
+            <a:r>
+              <a:rPr lang="en-US" dirty="0"/>
+              <a:t>Protractor HTTP mock - </a:t>
+            </a:r>
+            <a:r>
+              <a:rPr lang="en-US" dirty="0">
+                <a:hlinkClick r:id="rId9"/>
+              </a:rPr>
               <a:t>https://www.npmjs.com/package/protractor-xmlhttprequest-mock</a:t>
             </a:r>
             <a:endParaRPr lang="en-US" dirty="0"/>
@@ -12373,7 +12386,7 @@
             </a:r>
             <a:r>
               <a:rPr lang="cs-CZ" dirty="0">
-                <a:hlinkClick r:id="rId9"/>
+                <a:hlinkClick r:id="rId10"/>
               </a:rPr>
               <a:t>https://github.com/tamasflamich/effort</a:t>
             </a:r>

</xml_diff>

<commit_message>
Added link to this repo to slides
</commit_message>
<xml_diff>
--- a/slides.pptx
+++ b/slides.pptx
@@ -5,30 +5,29 @@
     <p:sldMasterId id="2147483648" r:id="rId1"/>
   </p:sldMasterIdLst>
   <p:notesMasterIdLst>
-    <p:notesMasterId r:id="rId20"/>
+    <p:notesMasterId r:id="rId19"/>
   </p:notesMasterIdLst>
   <p:handoutMasterIdLst>
-    <p:handoutMasterId r:id="rId21"/>
+    <p:handoutMasterId r:id="rId20"/>
   </p:handoutMasterIdLst>
   <p:sldIdLst>
     <p:sldId id="256" r:id="rId2"/>
-    <p:sldId id="309" r:id="rId3"/>
-    <p:sldId id="301" r:id="rId4"/>
-    <p:sldId id="289" r:id="rId5"/>
-    <p:sldId id="274" r:id="rId6"/>
-    <p:sldId id="284" r:id="rId7"/>
-    <p:sldId id="308" r:id="rId8"/>
-    <p:sldId id="293" r:id="rId9"/>
-    <p:sldId id="292" r:id="rId10"/>
-    <p:sldId id="285" r:id="rId11"/>
-    <p:sldId id="286" r:id="rId12"/>
-    <p:sldId id="304" r:id="rId13"/>
-    <p:sldId id="298" r:id="rId14"/>
-    <p:sldId id="296" r:id="rId15"/>
-    <p:sldId id="297" r:id="rId16"/>
-    <p:sldId id="299" r:id="rId17"/>
-    <p:sldId id="303" r:id="rId18"/>
-    <p:sldId id="306" r:id="rId19"/>
+    <p:sldId id="301" r:id="rId3"/>
+    <p:sldId id="289" r:id="rId4"/>
+    <p:sldId id="274" r:id="rId5"/>
+    <p:sldId id="284" r:id="rId6"/>
+    <p:sldId id="308" r:id="rId7"/>
+    <p:sldId id="293" r:id="rId8"/>
+    <p:sldId id="292" r:id="rId9"/>
+    <p:sldId id="285" r:id="rId10"/>
+    <p:sldId id="286" r:id="rId11"/>
+    <p:sldId id="304" r:id="rId12"/>
+    <p:sldId id="298" r:id="rId13"/>
+    <p:sldId id="296" r:id="rId14"/>
+    <p:sldId id="297" r:id="rId15"/>
+    <p:sldId id="299" r:id="rId16"/>
+    <p:sldId id="303" r:id="rId17"/>
+    <p:sldId id="306" r:id="rId18"/>
   </p:sldIdLst>
   <p:sldSz cx="9144000" cy="6858000" type="screen4x3"/>
   <p:notesSz cx="6858000" cy="9144000"/>
@@ -6343,7 +6342,7 @@
             <a:fld id="{22F88518-DE89-B24A-B1E9-8CEB78A9F7DC}" type="datetimeFigureOut">
               <a:rPr lang="en-US" smtClean="0"/>
               <a:pPr/>
-              <a:t>4/5/2018</a:t>
+              <a:t>4/6/2018</a:t>
             </a:fld>
             <a:endParaRPr lang="en-US"/>
           </a:p>
@@ -6511,7 +6510,7 @@
             <a:fld id="{7CF9138B-62FA-4C4E-9419-890C530175D1}" type="datetimeFigureOut">
               <a:rPr lang="en-US" smtClean="0"/>
               <a:pPr/>
-              <a:t>4/5/2018</a:t>
+              <a:t>4/6/2018</a:t>
             </a:fld>
             <a:endParaRPr lang="en-US"/>
           </a:p>
@@ -6933,7 +6932,7 @@
             <a:fld id="{B5195E51-AFFD-CD44-A574-11A1AF1DAC1A}" type="slidenum">
               <a:rPr lang="en-US" smtClean="0"/>
               <a:pPr/>
-              <a:t>11</a:t>
+              <a:t>10</a:t>
             </a:fld>
             <a:endParaRPr lang="en-US"/>
           </a:p>
@@ -10970,6 +10969,44 @@
           </a:p>
         </p:txBody>
       </p:sp>
+      <p:sp>
+        <p:nvSpPr>
+          <p:cNvPr id="4" name="TextBox 3">
+            <a:extLst>
+              <a:ext uri="{FF2B5EF4-FFF2-40B4-BE49-F238E27FC236}">
+                <a16:creationId xmlns:a16="http://schemas.microsoft.com/office/drawing/2014/main" id="{BE1FA65E-FC55-46E8-94C2-7D23682DE7EE}"/>
+              </a:ext>
+            </a:extLst>
+          </p:cNvPr>
+          <p:cNvSpPr txBox="1"/>
+          <p:nvPr/>
+        </p:nvSpPr>
+        <p:spPr>
+          <a:xfrm>
+            <a:off x="115410" y="5457957"/>
+            <a:ext cx="6445188" cy="369332"/>
+          </a:xfrm>
+          <a:prstGeom prst="rect">
+            <a:avLst/>
+          </a:prstGeom>
+          <a:noFill/>
+        </p:spPr>
+        <p:txBody>
+          <a:bodyPr wrap="square" rtlCol="0">
+            <a:spAutoFit/>
+          </a:bodyPr>
+          <a:lstStyle/>
+          <a:p>
+            <a:r>
+              <a:rPr lang="en-US" dirty="0">
+                <a:hlinkClick r:id="rId3"/>
+              </a:rPr>
+              <a:t>https://github.com/Katulus/WebApplictionTestingExample</a:t>
+            </a:r>
+            <a:endParaRPr lang="en-US" dirty="0"/>
+          </a:p>
+        </p:txBody>
+      </p:sp>
     </p:spTree>
   </p:cSld>
   <p:clrMapOvr>
@@ -11011,8 +11048,12 @@
           <a:lstStyle/>
           <a:p>
             <a:r>
+              <a:rPr lang="cs-CZ" dirty="0"/>
+              <a:t>End-to-end test</a:t>
+            </a:r>
+            <a:r>
               <a:rPr lang="en-US" dirty="0"/>
-              <a:t>Integration tests</a:t>
+              <a:t>s</a:t>
             </a:r>
             <a:endParaRPr lang="cs-CZ" dirty="0"/>
           </a:p>
@@ -11035,29 +11076,58 @@
           <a:p>
             <a:r>
               <a:rPr lang="en-US" dirty="0"/>
-              <a:t>Test more classes or components together</a:t>
+              <a:t>Run against live application</a:t>
             </a:r>
             <a:endParaRPr lang="cs-CZ" dirty="0"/>
           </a:p>
           <a:p>
             <a:r>
               <a:rPr lang="en-US" dirty="0"/>
-              <a:t>Focused on component integration</a:t>
+              <a:t>Test whole application or its major part</a:t>
             </a:r>
             <a:endParaRPr lang="cs-CZ" dirty="0"/>
           </a:p>
           <a:p>
+            <a:r>
+              <a:rPr lang="en-US" dirty="0"/>
+              <a:t>Use public interface of application</a:t>
+            </a:r>
+            <a:endParaRPr lang="cs-CZ" dirty="0"/>
+          </a:p>
+          <a:p>
             <a:pPr lvl="1"/>
             <a:r>
+              <a:rPr lang="cs-CZ" dirty="0"/>
+              <a:t>API </a:t>
+            </a:r>
+            <a:endParaRPr lang="en-US" dirty="0"/>
+          </a:p>
+          <a:p>
+            <a:pPr lvl="1"/>
+            <a:r>
+              <a:rPr lang="cs-CZ" dirty="0"/>
+              <a:t>UI</a:t>
+            </a:r>
+          </a:p>
+          <a:p>
+            <a:r>
               <a:rPr lang="en-US" dirty="0"/>
-              <a:t>Correct use of API</a:t>
+              <a:t>Most expensive</a:t>
             </a:r>
             <a:endParaRPr lang="cs-CZ" dirty="0"/>
           </a:p>
           <a:p>
+            <a:pPr lvl="1"/>
             <a:r>
               <a:rPr lang="en-US" dirty="0"/>
-              <a:t>Good to use when</a:t>
+              <a:t>Time to setup the test</a:t>
+            </a:r>
+          </a:p>
+          <a:p>
+            <a:pPr lvl="1"/>
+            <a:r>
+              <a:rPr lang="en-US" dirty="0"/>
+              <a:t>Time to setup the environment</a:t>
             </a:r>
             <a:endParaRPr lang="cs-CZ" dirty="0"/>
           </a:p>
@@ -11065,50 +11135,20 @@
             <a:pPr lvl="1"/>
             <a:r>
               <a:rPr lang="en-US" dirty="0"/>
-              <a:t>Testing component alone is too complex to setup</a:t>
-            </a:r>
+              <a:t>Execution time</a:t>
+            </a:r>
+          </a:p>
+          <a:p>
+            <a:pPr marL="0" indent="0">
+              <a:buNone/>
+            </a:pPr>
             <a:endParaRPr lang="cs-CZ" dirty="0"/>
-          </a:p>
-          <a:p>
-            <a:pPr lvl="1"/>
-            <a:r>
-              <a:rPr lang="en-US" dirty="0"/>
-              <a:t>Component integration is not trivial</a:t>
-            </a:r>
-            <a:endParaRPr lang="cs-CZ" dirty="0"/>
-          </a:p>
-          <a:p>
-            <a:pPr lvl="1"/>
-            <a:r>
-              <a:rPr lang="en-US" dirty="0"/>
-              <a:t>To test complex workflows</a:t>
-            </a:r>
-          </a:p>
-          <a:p>
-            <a:r>
-              <a:rPr lang="en-US" dirty="0"/>
-              <a:t>More expensive than unit tests but still good</a:t>
-            </a:r>
-          </a:p>
-          <a:p>
-            <a:pPr lvl="1"/>
-            <a:r>
-              <a:rPr lang="en-US" dirty="0"/>
-              <a:t>Slower</a:t>
-            </a:r>
-          </a:p>
-          <a:p>
-            <a:pPr lvl="1"/>
-            <a:r>
-              <a:rPr lang="en-US" dirty="0"/>
-              <a:t>Harder to maintain</a:t>
-            </a:r>
           </a:p>
         </p:txBody>
       </p:sp>
       <p:sp>
         <p:nvSpPr>
-          <p:cNvPr id="4" name="Slide Number Placeholder 4"/>
+          <p:cNvPr id="5" name="Slide Number Placeholder 4"/>
           <p:cNvSpPr>
             <a:spLocks noGrp="1"/>
           </p:cNvSpPr>
@@ -11116,27 +11156,24 @@
             <p:ph type="sldNum" sz="quarter" idx="12"/>
           </p:nvPr>
         </p:nvSpPr>
-        <p:spPr>
-          <a:xfrm>
-            <a:off x="4264783" y="6473950"/>
-            <a:ext cx="614434" cy="365125"/>
-          </a:xfrm>
-        </p:spPr>
+        <p:spPr/>
         <p:txBody>
           <a:bodyPr/>
           <a:lstStyle/>
           <a:p>
-            <a:r>
-              <a:rPr lang="en-US" dirty="0"/>
-              <a:t>8</a:t>
-            </a:r>
+            <a:fld id="{009831D7-A162-FC48-82E7-0E3299834122}" type="slidenum">
+              <a:rPr lang="en-US" smtClean="0"/>
+              <a:pPr/>
+              <a:t>10</a:t>
+            </a:fld>
+            <a:endParaRPr lang="en-US" dirty="0"/>
           </a:p>
         </p:txBody>
       </p:sp>
     </p:spTree>
     <p:extLst>
       <p:ext uri="{BB962C8B-B14F-4D97-AF65-F5344CB8AC3E}">
-        <p14:creationId xmlns:p14="http://schemas.microsoft.com/office/powerpoint/2010/main" val="3548815812"/>
+        <p14:creationId xmlns:p14="http://schemas.microsoft.com/office/powerpoint/2010/main" val="1988389677"/>
       </p:ext>
     </p:extLst>
   </p:cSld>
@@ -11179,12 +11216,8 @@
           <a:lstStyle/>
           <a:p>
             <a:r>
-              <a:rPr lang="cs-CZ" dirty="0"/>
-              <a:t>End-to-end test</a:t>
-            </a:r>
-            <a:r>
               <a:rPr lang="en-US" dirty="0"/>
-              <a:t>s</a:t>
+              <a:t>UI tests</a:t>
             </a:r>
             <a:endParaRPr lang="cs-CZ" dirty="0"/>
           </a:p>
@@ -11207,82 +11240,34 @@
           <a:p>
             <a:r>
               <a:rPr lang="en-US" dirty="0"/>
-              <a:t>Run against live application</a:t>
+              <a:t>Test UI behavior</a:t>
             </a:r>
             <a:endParaRPr lang="cs-CZ" dirty="0"/>
           </a:p>
           <a:p>
             <a:r>
               <a:rPr lang="en-US" dirty="0"/>
-              <a:t>Test whole application or its major part</a:t>
+              <a:t>Without real backend</a:t>
             </a:r>
             <a:endParaRPr lang="cs-CZ" dirty="0"/>
           </a:p>
           <a:p>
-            <a:r>
-              <a:rPr lang="en-US" dirty="0"/>
-              <a:t>Use public interface of application</a:t>
-            </a:r>
+            <a:pPr lvl="1"/>
+            <a:r>
+              <a:rPr lang="cs-CZ" dirty="0"/>
+              <a:t>Mock</a:t>
+            </a:r>
+            <a:r>
+              <a:rPr lang="en-US"/>
+              <a:t> API</a:t>
+            </a:r>
+            <a:endParaRPr lang="en-US" dirty="0"/>
+          </a:p>
+          <a:p>
             <a:endParaRPr lang="cs-CZ" dirty="0"/>
           </a:p>
           <a:p>
             <a:pPr lvl="1"/>
-            <a:r>
-              <a:rPr lang="cs-CZ" dirty="0"/>
-              <a:t>API </a:t>
-            </a:r>
-            <a:endParaRPr lang="en-US" dirty="0"/>
-          </a:p>
-          <a:p>
-            <a:pPr lvl="1"/>
-            <a:r>
-              <a:rPr lang="cs-CZ" dirty="0"/>
-              <a:t>UI</a:t>
-            </a:r>
-          </a:p>
-          <a:p>
-            <a:r>
-              <a:rPr lang="en-US" dirty="0"/>
-              <a:t>Most expensive</a:t>
-            </a:r>
-            <a:endParaRPr lang="cs-CZ" dirty="0"/>
-          </a:p>
-          <a:p>
-            <a:pPr lvl="1"/>
-            <a:r>
-              <a:rPr lang="en-US" dirty="0"/>
-              <a:t>Time to setup the test</a:t>
-            </a:r>
-          </a:p>
-          <a:p>
-            <a:pPr lvl="1"/>
-            <a:r>
-              <a:rPr lang="en-US" dirty="0"/>
-              <a:t>Time to setup the environment</a:t>
-            </a:r>
-            <a:endParaRPr lang="cs-CZ" dirty="0"/>
-          </a:p>
-          <a:p>
-            <a:pPr lvl="1"/>
-            <a:r>
-              <a:rPr lang="en-US" dirty="0"/>
-              <a:t>Execution time</a:t>
-            </a:r>
-          </a:p>
-          <a:p>
-            <a:r>
-              <a:rPr lang="en-US" dirty="0"/>
-              <a:t>Protractor - </a:t>
-            </a:r>
-            <a:r>
-              <a:rPr lang="en-US" dirty="0">
-                <a:hlinkClick r:id="rId3"/>
-              </a:rPr>
-              <a:t>http://www.protractortest.org/</a:t>
-            </a:r>
-            <a:endParaRPr lang="en-US" dirty="0"/>
-          </a:p>
-          <a:p>
             <a:endParaRPr lang="cs-CZ" dirty="0"/>
           </a:p>
         </p:txBody>
@@ -11314,7 +11299,7 @@
     </p:spTree>
     <p:extLst>
       <p:ext uri="{BB962C8B-B14F-4D97-AF65-F5344CB8AC3E}">
-        <p14:creationId xmlns:p14="http://schemas.microsoft.com/office/powerpoint/2010/main" val="1988389677"/>
+        <p14:creationId xmlns:p14="http://schemas.microsoft.com/office/powerpoint/2010/main" val="646235180"/>
       </p:ext>
     </p:extLst>
   </p:cSld>
@@ -11325,6 +11310,78 @@
 </file>
 
 <file path=ppt/slides/slide12.xml><?xml version="1.0" encoding="utf-8"?>
+<p:sld xmlns:a="http://schemas.openxmlformats.org/drawingml/2006/main" xmlns:r="http://schemas.openxmlformats.org/officeDocument/2006/relationships" xmlns:p="http://schemas.openxmlformats.org/presentationml/2006/main">
+  <p:cSld>
+    <p:spTree>
+      <p:nvGrpSpPr>
+        <p:cNvPr id="1" name=""/>
+        <p:cNvGrpSpPr/>
+        <p:nvPr/>
+      </p:nvGrpSpPr>
+      <p:grpSpPr>
+        <a:xfrm>
+          <a:off x="0" y="0"/>
+          <a:ext cx="0" cy="0"/>
+          <a:chOff x="0" y="0"/>
+          <a:chExt cx="0" cy="0"/>
+        </a:xfrm>
+      </p:grpSpPr>
+      <p:sp>
+        <p:nvSpPr>
+          <p:cNvPr id="3" name="Title 2"/>
+          <p:cNvSpPr>
+            <a:spLocks noGrp="1"/>
+          </p:cNvSpPr>
+          <p:nvPr>
+            <p:ph type="title"/>
+          </p:nvPr>
+        </p:nvSpPr>
+        <p:spPr/>
+        <p:txBody>
+          <a:bodyPr/>
+          <a:lstStyle/>
+          <a:p>
+            <a:r>
+              <a:rPr lang="en-US" dirty="0"/>
+              <a:t>Sample application</a:t>
+            </a:r>
+            <a:endParaRPr lang="cs-CZ" dirty="0"/>
+          </a:p>
+        </p:txBody>
+      </p:sp>
+      <p:sp>
+        <p:nvSpPr>
+          <p:cNvPr id="4" name="Text Placeholder 3"/>
+          <p:cNvSpPr>
+            <a:spLocks noGrp="1"/>
+          </p:cNvSpPr>
+          <p:nvPr>
+            <p:ph type="body" idx="1"/>
+          </p:nvPr>
+        </p:nvSpPr>
+        <p:spPr/>
+        <p:txBody>
+          <a:bodyPr/>
+          <a:lstStyle/>
+          <a:p>
+            <a:endParaRPr lang="cs-CZ"/>
+          </a:p>
+        </p:txBody>
+      </p:sp>
+    </p:spTree>
+    <p:extLst>
+      <p:ext uri="{BB962C8B-B14F-4D97-AF65-F5344CB8AC3E}">
+        <p14:creationId xmlns:p14="http://schemas.microsoft.com/office/powerpoint/2010/main" val="3576243694"/>
+      </p:ext>
+    </p:extLst>
+  </p:cSld>
+  <p:clrMapOvr>
+    <a:masterClrMapping/>
+  </p:clrMapOvr>
+</p:sld>
+</file>
+
+<file path=ppt/slides/slide13.xml><?xml version="1.0" encoding="utf-8"?>
 <p:sld xmlns:a="http://schemas.openxmlformats.org/drawingml/2006/main" xmlns:r="http://schemas.openxmlformats.org/officeDocument/2006/relationships" xmlns:p="http://schemas.openxmlformats.org/presentationml/2006/main">
   <p:cSld>
     <p:spTree>
@@ -11358,7 +11415,23 @@
           <a:p>
             <a:r>
               <a:rPr lang="en-US" dirty="0"/>
-              <a:t>UI tests</a:t>
+              <a:t>Web </a:t>
+            </a:r>
+            <a:r>
+              <a:rPr lang="cs-CZ" dirty="0"/>
+              <a:t>ap</a:t>
+            </a:r>
+            <a:r>
+              <a:rPr lang="en-US" dirty="0"/>
+              <a:t>p</a:t>
+            </a:r>
+            <a:r>
+              <a:rPr lang="cs-CZ" dirty="0"/>
+              <a:t>li</a:t>
+            </a:r>
+            <a:r>
+              <a:rPr lang="en-US" dirty="0"/>
+              <a:t>cation</a:t>
             </a:r>
             <a:endParaRPr lang="cs-CZ" dirty="0"/>
           </a:p>
@@ -11381,57 +11454,124 @@
           <a:p>
             <a:r>
               <a:rPr lang="en-US" dirty="0"/>
-              <a:t>Test UI behavior</a:t>
+              <a:t>Presentation layer</a:t>
+            </a:r>
+          </a:p>
+          <a:p>
+            <a:pPr lvl="1"/>
+            <a:r>
+              <a:rPr lang="en-US" dirty="0"/>
+              <a:t>Web browser</a:t>
+            </a:r>
+          </a:p>
+          <a:p>
+            <a:pPr lvl="1"/>
+            <a:r>
+              <a:rPr lang="en-US" dirty="0"/>
+              <a:t>TypeScript</a:t>
+            </a:r>
+            <a:r>
+              <a:rPr lang="cs-CZ" dirty="0"/>
+              <a:t>, </a:t>
+            </a:r>
+            <a:r>
+              <a:rPr lang="en-US" dirty="0"/>
+              <a:t>Angular 5, </a:t>
+            </a:r>
+            <a:r>
+              <a:rPr lang="cs-CZ" dirty="0"/>
+              <a:t>HTML, CSS</a:t>
+            </a:r>
+          </a:p>
+          <a:p>
+            <a:r>
+              <a:rPr lang="en-US" dirty="0"/>
+              <a:t>Business layer</a:t>
+            </a:r>
+          </a:p>
+          <a:p>
+            <a:pPr lvl="1"/>
+            <a:r>
+              <a:rPr lang="en-US" dirty="0"/>
+              <a:t>Web server</a:t>
+            </a:r>
+          </a:p>
+          <a:p>
+            <a:pPr lvl="1"/>
+            <a:r>
+              <a:rPr lang="en-US" dirty="0"/>
+              <a:t>ASP.NET Core 2.0 </a:t>
+            </a:r>
+            <a:r>
+              <a:rPr lang="en-US" dirty="0" err="1"/>
+              <a:t>WebApi</a:t>
+            </a:r>
+            <a:r>
+              <a:rPr lang="en-US" dirty="0"/>
+              <a:t>, </a:t>
+            </a:r>
+            <a:r>
+              <a:rPr lang="cs-CZ" dirty="0"/>
+              <a:t>C</a:t>
+            </a:r>
+            <a:r>
+              <a:rPr lang="en-US" dirty="0"/>
+              <a:t>#</a:t>
+            </a:r>
+          </a:p>
+          <a:p>
+            <a:r>
+              <a:rPr lang="en-US" dirty="0"/>
+              <a:t>Data layer</a:t>
             </a:r>
             <a:endParaRPr lang="cs-CZ" dirty="0"/>
           </a:p>
           <a:p>
+            <a:pPr lvl="1"/>
             <a:r>
               <a:rPr lang="en-US" dirty="0"/>
-              <a:t>Without real backend</a:t>
-            </a:r>
-            <a:endParaRPr lang="cs-CZ" dirty="0"/>
+              <a:t>Entity framework</a:t>
+            </a:r>
           </a:p>
           <a:p>
             <a:pPr lvl="1"/>
             <a:r>
               <a:rPr lang="cs-CZ" dirty="0"/>
-              <a:t>Mock</a:t>
+              <a:t>SQL </a:t>
             </a:r>
             <a:r>
               <a:rPr lang="en-US" dirty="0"/>
-              <a:t> API</a:t>
-            </a:r>
-            <a:endParaRPr lang="cs-CZ" dirty="0"/>
-          </a:p>
-          <a:p>
-            <a:r>
-              <a:rPr lang="en-US" dirty="0"/>
-              <a:t>Protractor HTTP mock - </a:t>
-            </a:r>
-            <a:r>
-              <a:rPr lang="en-US" dirty="0">
-                <a:hlinkClick r:id="rId2"/>
-              </a:rPr>
-              <a:t>https://www.npmjs.com/package/protractor-xmlhttprequest-mock</a:t>
-            </a:r>
-            <a:endParaRPr lang="en-US" dirty="0"/>
-          </a:p>
-          <a:p>
-            <a:endParaRPr lang="en-US" dirty="0"/>
-          </a:p>
-          <a:p>
-            <a:endParaRPr lang="cs-CZ" dirty="0"/>
-          </a:p>
-          <a:p>
-            <a:pPr lvl="1"/>
+              <a:t>database</a:t>
+            </a:r>
             <a:endParaRPr lang="cs-CZ" dirty="0"/>
           </a:p>
         </p:txBody>
       </p:sp>
+      <p:graphicFrame>
+        <p:nvGraphicFramePr>
+          <p:cNvPr id="13" name="Diagram 12"/>
+          <p:cNvGraphicFramePr/>
+          <p:nvPr>
+            <p:extLst>
+              <p:ext uri="{D42A27DB-BD31-4B8C-83A1-F6EECF244321}">
+                <p14:modId xmlns:p14="http://schemas.microsoft.com/office/powerpoint/2010/main" val="2083685467"/>
+              </p:ext>
+            </p:extLst>
+          </p:nvPr>
+        </p:nvGraphicFramePr>
+        <p:xfrm>
+          <a:off x="4881966" y="2789694"/>
+          <a:ext cx="3939153" cy="3317629"/>
+        </p:xfrm>
+        <a:graphic>
+          <a:graphicData uri="http://schemas.openxmlformats.org/drawingml/2006/diagram">
+            <dgm:relIds xmlns:dgm="http://schemas.openxmlformats.org/drawingml/2006/diagram" xmlns:r="http://schemas.openxmlformats.org/officeDocument/2006/relationships" r:dm="rId2" r:lo="rId3" r:qs="rId4" r:cs="rId5"/>
+          </a:graphicData>
+        </a:graphic>
+      </p:graphicFrame>
       <p:sp>
         <p:nvSpPr>
-          <p:cNvPr id="5" name="Slide Number Placeholder 4"/>
+          <p:cNvPr id="4" name="Slide Number Placeholder 3"/>
           <p:cNvSpPr>
             <a:spLocks noGrp="1"/>
           </p:cNvSpPr>
@@ -11447,7 +11587,7 @@
             <a:fld id="{009831D7-A162-FC48-82E7-0E3299834122}" type="slidenum">
               <a:rPr lang="en-US" smtClean="0"/>
               <a:pPr/>
-              <a:t>12</a:t>
+              <a:t>13</a:t>
             </a:fld>
             <a:endParaRPr lang="en-US" dirty="0"/>
           </a:p>
@@ -11456,79 +11596,7 @@
     </p:spTree>
     <p:extLst>
       <p:ext uri="{BB962C8B-B14F-4D97-AF65-F5344CB8AC3E}">
-        <p14:creationId xmlns:p14="http://schemas.microsoft.com/office/powerpoint/2010/main" val="646235180"/>
-      </p:ext>
-    </p:extLst>
-  </p:cSld>
-  <p:clrMapOvr>
-    <a:masterClrMapping/>
-  </p:clrMapOvr>
-</p:sld>
-</file>
-
-<file path=ppt/slides/slide13.xml><?xml version="1.0" encoding="utf-8"?>
-<p:sld xmlns:a="http://schemas.openxmlformats.org/drawingml/2006/main" xmlns:r="http://schemas.openxmlformats.org/officeDocument/2006/relationships" xmlns:p="http://schemas.openxmlformats.org/presentationml/2006/main">
-  <p:cSld>
-    <p:spTree>
-      <p:nvGrpSpPr>
-        <p:cNvPr id="1" name=""/>
-        <p:cNvGrpSpPr/>
-        <p:nvPr/>
-      </p:nvGrpSpPr>
-      <p:grpSpPr>
-        <a:xfrm>
-          <a:off x="0" y="0"/>
-          <a:ext cx="0" cy="0"/>
-          <a:chOff x="0" y="0"/>
-          <a:chExt cx="0" cy="0"/>
-        </a:xfrm>
-      </p:grpSpPr>
-      <p:sp>
-        <p:nvSpPr>
-          <p:cNvPr id="3" name="Title 2"/>
-          <p:cNvSpPr>
-            <a:spLocks noGrp="1"/>
-          </p:cNvSpPr>
-          <p:nvPr>
-            <p:ph type="title"/>
-          </p:nvPr>
-        </p:nvSpPr>
-        <p:spPr/>
-        <p:txBody>
-          <a:bodyPr/>
-          <a:lstStyle/>
-          <a:p>
-            <a:r>
-              <a:rPr lang="en-US" dirty="0"/>
-              <a:t>Sample application</a:t>
-            </a:r>
-            <a:endParaRPr lang="cs-CZ" dirty="0"/>
-          </a:p>
-        </p:txBody>
-      </p:sp>
-      <p:sp>
-        <p:nvSpPr>
-          <p:cNvPr id="4" name="Text Placeholder 3"/>
-          <p:cNvSpPr>
-            <a:spLocks noGrp="1"/>
-          </p:cNvSpPr>
-          <p:nvPr>
-            <p:ph type="body" idx="1"/>
-          </p:nvPr>
-        </p:nvSpPr>
-        <p:spPr/>
-        <p:txBody>
-          <a:bodyPr/>
-          <a:lstStyle/>
-          <a:p>
-            <a:endParaRPr lang="cs-CZ"/>
-          </a:p>
-        </p:txBody>
-      </p:sp>
-    </p:spTree>
-    <p:extLst>
-      <p:ext uri="{BB962C8B-B14F-4D97-AF65-F5344CB8AC3E}">
-        <p14:creationId xmlns:p14="http://schemas.microsoft.com/office/powerpoint/2010/main" val="3576243694"/>
+        <p14:creationId xmlns:p14="http://schemas.microsoft.com/office/powerpoint/2010/main" val="2489853731"/>
       </p:ext>
     </p:extLst>
   </p:cSld>
@@ -11572,25 +11640,12 @@
           <a:p>
             <a:r>
               <a:rPr lang="en-US" dirty="0"/>
-              <a:t>Web </a:t>
+              <a:t>Testable</a:t>
             </a:r>
             <a:r>
               <a:rPr lang="cs-CZ" dirty="0"/>
-              <a:t>ap</a:t>
-            </a:r>
-            <a:r>
-              <a:rPr lang="en-US" dirty="0"/>
-              <a:t>p</a:t>
-            </a:r>
-            <a:r>
-              <a:rPr lang="cs-CZ" dirty="0"/>
-              <a:t>li</a:t>
-            </a:r>
-            <a:r>
-              <a:rPr lang="en-US" dirty="0"/>
-              <a:t>cation</a:t>
-            </a:r>
-            <a:endParaRPr lang="cs-CZ" dirty="0"/>
+              <a:t>?</a:t>
+            </a:r>
           </a:p>
         </p:txBody>
       </p:sp>
@@ -11611,218 +11666,6 @@
           <a:p>
             <a:r>
               <a:rPr lang="en-US" dirty="0"/>
-              <a:t>Presentation layer</a:t>
-            </a:r>
-          </a:p>
-          <a:p>
-            <a:pPr lvl="1"/>
-            <a:r>
-              <a:rPr lang="en-US" dirty="0"/>
-              <a:t>Web browser</a:t>
-            </a:r>
-          </a:p>
-          <a:p>
-            <a:pPr lvl="1"/>
-            <a:r>
-              <a:rPr lang="en-US" dirty="0"/>
-              <a:t>TypeScript</a:t>
-            </a:r>
-            <a:r>
-              <a:rPr lang="cs-CZ" dirty="0"/>
-              <a:t>, </a:t>
-            </a:r>
-            <a:r>
-              <a:rPr lang="en-US" dirty="0"/>
-              <a:t>Angular 5, </a:t>
-            </a:r>
-            <a:r>
-              <a:rPr lang="cs-CZ" dirty="0"/>
-              <a:t>HTML, CSS</a:t>
-            </a:r>
-          </a:p>
-          <a:p>
-            <a:r>
-              <a:rPr lang="en-US" dirty="0"/>
-              <a:t>Business layer</a:t>
-            </a:r>
-          </a:p>
-          <a:p>
-            <a:pPr lvl="1"/>
-            <a:r>
-              <a:rPr lang="en-US" dirty="0"/>
-              <a:t>Web server</a:t>
-            </a:r>
-          </a:p>
-          <a:p>
-            <a:pPr lvl="1"/>
-            <a:r>
-              <a:rPr lang="en-US" dirty="0"/>
-              <a:t>ASP.NET Core 2.0 </a:t>
-            </a:r>
-            <a:r>
-              <a:rPr lang="en-US" dirty="0" err="1"/>
-              <a:t>WebApi</a:t>
-            </a:r>
-            <a:r>
-              <a:rPr lang="en-US" dirty="0"/>
-              <a:t>, </a:t>
-            </a:r>
-            <a:r>
-              <a:rPr lang="cs-CZ" dirty="0"/>
-              <a:t>C</a:t>
-            </a:r>
-            <a:r>
-              <a:rPr lang="en-US" dirty="0"/>
-              <a:t>#</a:t>
-            </a:r>
-          </a:p>
-          <a:p>
-            <a:r>
-              <a:rPr lang="en-US" dirty="0"/>
-              <a:t>Data layer</a:t>
-            </a:r>
-            <a:endParaRPr lang="cs-CZ" dirty="0"/>
-          </a:p>
-          <a:p>
-            <a:pPr lvl="1"/>
-            <a:r>
-              <a:rPr lang="en-US" dirty="0"/>
-              <a:t>Entity framework</a:t>
-            </a:r>
-          </a:p>
-          <a:p>
-            <a:pPr lvl="1"/>
-            <a:r>
-              <a:rPr lang="cs-CZ" dirty="0"/>
-              <a:t>SQL </a:t>
-            </a:r>
-            <a:r>
-              <a:rPr lang="en-US" dirty="0"/>
-              <a:t>database</a:t>
-            </a:r>
-            <a:endParaRPr lang="cs-CZ" dirty="0"/>
-          </a:p>
-        </p:txBody>
-      </p:sp>
-      <p:graphicFrame>
-        <p:nvGraphicFramePr>
-          <p:cNvPr id="13" name="Diagram 12"/>
-          <p:cNvGraphicFramePr/>
-          <p:nvPr>
-            <p:extLst>
-              <p:ext uri="{D42A27DB-BD31-4B8C-83A1-F6EECF244321}">
-                <p14:modId xmlns:p14="http://schemas.microsoft.com/office/powerpoint/2010/main" val="2083685467"/>
-              </p:ext>
-            </p:extLst>
-          </p:nvPr>
-        </p:nvGraphicFramePr>
-        <p:xfrm>
-          <a:off x="4881966" y="2789694"/>
-          <a:ext cx="3939153" cy="3317629"/>
-        </p:xfrm>
-        <a:graphic>
-          <a:graphicData uri="http://schemas.openxmlformats.org/drawingml/2006/diagram">
-            <dgm:relIds xmlns:dgm="http://schemas.openxmlformats.org/drawingml/2006/diagram" xmlns:r="http://schemas.openxmlformats.org/officeDocument/2006/relationships" r:dm="rId2" r:lo="rId3" r:qs="rId4" r:cs="rId5"/>
-          </a:graphicData>
-        </a:graphic>
-      </p:graphicFrame>
-      <p:sp>
-        <p:nvSpPr>
-          <p:cNvPr id="4" name="Slide Number Placeholder 3"/>
-          <p:cNvSpPr>
-            <a:spLocks noGrp="1"/>
-          </p:cNvSpPr>
-          <p:nvPr>
-            <p:ph type="sldNum" sz="quarter" idx="12"/>
-          </p:nvPr>
-        </p:nvSpPr>
-        <p:spPr/>
-        <p:txBody>
-          <a:bodyPr/>
-          <a:lstStyle/>
-          <a:p>
-            <a:fld id="{009831D7-A162-FC48-82E7-0E3299834122}" type="slidenum">
-              <a:rPr lang="en-US" smtClean="0"/>
-              <a:pPr/>
-              <a:t>14</a:t>
-            </a:fld>
-            <a:endParaRPr lang="en-US" dirty="0"/>
-          </a:p>
-        </p:txBody>
-      </p:sp>
-    </p:spTree>
-    <p:extLst>
-      <p:ext uri="{BB962C8B-B14F-4D97-AF65-F5344CB8AC3E}">
-        <p14:creationId xmlns:p14="http://schemas.microsoft.com/office/powerpoint/2010/main" val="2489853731"/>
-      </p:ext>
-    </p:extLst>
-  </p:cSld>
-  <p:clrMapOvr>
-    <a:masterClrMapping/>
-  </p:clrMapOvr>
-</p:sld>
-</file>
-
-<file path=ppt/slides/slide15.xml><?xml version="1.0" encoding="utf-8"?>
-<p:sld xmlns:a="http://schemas.openxmlformats.org/drawingml/2006/main" xmlns:r="http://schemas.openxmlformats.org/officeDocument/2006/relationships" xmlns:p="http://schemas.openxmlformats.org/presentationml/2006/main">
-  <p:cSld>
-    <p:spTree>
-      <p:nvGrpSpPr>
-        <p:cNvPr id="1" name=""/>
-        <p:cNvGrpSpPr/>
-        <p:nvPr/>
-      </p:nvGrpSpPr>
-      <p:grpSpPr>
-        <a:xfrm>
-          <a:off x="0" y="0"/>
-          <a:ext cx="0" cy="0"/>
-          <a:chOff x="0" y="0"/>
-          <a:chExt cx="0" cy="0"/>
-        </a:xfrm>
-      </p:grpSpPr>
-      <p:sp>
-        <p:nvSpPr>
-          <p:cNvPr id="2" name="Title 1"/>
-          <p:cNvSpPr>
-            <a:spLocks noGrp="1"/>
-          </p:cNvSpPr>
-          <p:nvPr>
-            <p:ph type="title"/>
-          </p:nvPr>
-        </p:nvSpPr>
-        <p:spPr/>
-        <p:txBody>
-          <a:bodyPr/>
-          <a:lstStyle/>
-          <a:p>
-            <a:r>
-              <a:rPr lang="en-US" dirty="0"/>
-              <a:t>Testable</a:t>
-            </a:r>
-            <a:r>
-              <a:rPr lang="cs-CZ" dirty="0"/>
-              <a:t>?</a:t>
-            </a:r>
-          </a:p>
-        </p:txBody>
-      </p:sp>
-      <p:sp>
-        <p:nvSpPr>
-          <p:cNvPr id="3" name="Content Placeholder 2"/>
-          <p:cNvSpPr>
-            <a:spLocks noGrp="1"/>
-          </p:cNvSpPr>
-          <p:nvPr>
-            <p:ph idx="1"/>
-          </p:nvPr>
-        </p:nvSpPr>
-        <p:spPr/>
-        <p:txBody>
-          <a:bodyPr/>
-          <a:lstStyle/>
-          <a:p>
-            <a:r>
-              <a:rPr lang="en-US" dirty="0"/>
               <a:t>Covered by automated tests</a:t>
             </a:r>
           </a:p>
@@ -11849,7 +11692,7 @@
             <a:fld id="{009831D7-A162-FC48-82E7-0E3299834122}" type="slidenum">
               <a:rPr lang="en-US" smtClean="0"/>
               <a:pPr/>
-              <a:t>15</a:t>
+              <a:t>14</a:t>
             </a:fld>
             <a:endParaRPr lang="en-US" dirty="0"/>
           </a:p>
@@ -12297,7 +12140,7 @@
 </p:sld>
 </file>
 
-<file path=ppt/slides/slide16.xml><?xml version="1.0" encoding="utf-8"?>
+<file path=ppt/slides/slide15.xml><?xml version="1.0" encoding="utf-8"?>
 <p:sld xmlns:a="http://schemas.openxmlformats.org/drawingml/2006/main" xmlns:r="http://schemas.openxmlformats.org/officeDocument/2006/relationships" xmlns:p="http://schemas.openxmlformats.org/presentationml/2006/main">
   <p:cSld>
     <p:spTree>
@@ -12387,7 +12230,7 @@
             <a:fld id="{009831D7-A162-FC48-82E7-0E3299834122}" type="slidenum">
               <a:rPr lang="en-US" smtClean="0"/>
               <a:pPr/>
-              <a:t>16</a:t>
+              <a:t>15</a:t>
             </a:fld>
             <a:endParaRPr lang="en-US" dirty="0"/>
           </a:p>
@@ -12406,7 +12249,7 @@
 </p:sld>
 </file>
 
-<file path=ppt/slides/slide17.xml><?xml version="1.0" encoding="utf-8"?>
+<file path=ppt/slides/slide16.xml><?xml version="1.0" encoding="utf-8"?>
 <p:sld xmlns:a="http://schemas.openxmlformats.org/drawingml/2006/main" xmlns:r="http://schemas.openxmlformats.org/officeDocument/2006/relationships" xmlns:p="http://schemas.openxmlformats.org/presentationml/2006/main">
   <p:cSld>
     <p:spTree>
@@ -12464,13 +12307,26 @@
           <a:lstStyle/>
           <a:p>
             <a:r>
-              <a:rPr lang="en-US" dirty="0"/>
-              <a:t>ASP.NET Core - </a:t>
+              <a:rPr lang="en-US" b="1" dirty="0"/>
+              <a:t>Sample application - </a:t>
             </a:r>
             <a:r>
               <a:rPr lang="en-US" dirty="0">
                 <a:hlinkClick r:id="rId2"/>
               </a:rPr>
+              <a:t>https://github.com/Katulus/WebApplictionTestingExample</a:t>
+            </a:r>
+            <a:endParaRPr lang="en-US" dirty="0"/>
+          </a:p>
+          <a:p>
+            <a:r>
+              <a:rPr lang="en-US" dirty="0"/>
+              <a:t>ASP.NET Core - </a:t>
+            </a:r>
+            <a:r>
+              <a:rPr lang="en-US" dirty="0">
+                <a:hlinkClick r:id="rId3"/>
+              </a:rPr>
               <a:t>https://docs.microsoft.com/en-us/aspnet/core/</a:t>
             </a:r>
             <a:endParaRPr lang="en-US" dirty="0"/>
@@ -12486,7 +12342,7 @@
             </a:r>
             <a:r>
               <a:rPr lang="cs-CZ" dirty="0">
-                <a:hlinkClick r:id="rId3"/>
+                <a:hlinkClick r:id="rId4"/>
               </a:rPr>
               <a:t>https://www.typescriptlang.org/</a:t>
             </a:r>
@@ -12500,88 +12356,66 @@
             <a:r>
               <a:rPr lang="en-US" dirty="0"/>
               <a:t> - </a:t>
-            </a:r>
-            <a:r>
-              <a:rPr lang="en-US" dirty="0">
-                <a:hlinkClick r:id="rId4"/>
-              </a:rPr>
-              <a:t>https://github.com/Moq/moq4/wiki/Quickstart</a:t>
-            </a:r>
-            <a:endParaRPr lang="en-US" dirty="0"/>
-          </a:p>
-          <a:p>
-            <a:r>
-              <a:rPr lang="en-US" dirty="0"/>
-              <a:t>Fluent Assertions - </a:t>
             </a:r>
             <a:r>
               <a:rPr lang="en-US" dirty="0">
                 <a:hlinkClick r:id="rId5"/>
               </a:rPr>
-              <a:t>https://fluentassertions.com/</a:t>
+              <a:t>https://github.com/Moq/moq4/wiki/Quickstart</a:t>
             </a:r>
             <a:endParaRPr lang="en-US" dirty="0"/>
           </a:p>
           <a:p>
             <a:r>
               <a:rPr lang="en-US" dirty="0"/>
-              <a:t>Angular – </a:t>
+              <a:t>Fluent Assertions - </a:t>
             </a:r>
             <a:r>
               <a:rPr lang="en-US" dirty="0">
                 <a:hlinkClick r:id="rId6"/>
               </a:rPr>
-              <a:t>https://angular.io</a:t>
+              <a:t>https://fluentassertions.com/</a:t>
             </a:r>
             <a:endParaRPr lang="en-US" dirty="0"/>
           </a:p>
           <a:p>
             <a:r>
               <a:rPr lang="en-US" dirty="0"/>
-              <a:t>Jasmine - </a:t>
+              <a:t>Angular – </a:t>
             </a:r>
             <a:r>
               <a:rPr lang="en-US" dirty="0">
                 <a:hlinkClick r:id="rId7"/>
               </a:rPr>
-              <a:t>https://jasmine.github.io/</a:t>
+              <a:t>https://angular.io</a:t>
             </a:r>
             <a:endParaRPr lang="en-US" dirty="0"/>
           </a:p>
           <a:p>
             <a:r>
               <a:rPr lang="en-US" dirty="0"/>
-              <a:t>Protractor - </a:t>
+              <a:t>Jasmine - </a:t>
             </a:r>
             <a:r>
               <a:rPr lang="en-US" dirty="0">
                 <a:hlinkClick r:id="rId8"/>
               </a:rPr>
-              <a:t>http://www.protractortest.org/</a:t>
+              <a:t>https://jasmine.github.io/</a:t>
             </a:r>
             <a:endParaRPr lang="en-US" dirty="0"/>
           </a:p>
           <a:p>
             <a:r>
               <a:rPr lang="en-US" dirty="0"/>
-              <a:t>Effort - </a:t>
-            </a:r>
-            <a:r>
-              <a:rPr lang="cs-CZ" dirty="0">
+              <a:t>Protractor - </a:t>
+            </a:r>
+            <a:r>
+              <a:rPr lang="en-US" dirty="0">
                 <a:hlinkClick r:id="rId9"/>
               </a:rPr>
-              <a:t>http://entityframework-effort</a:t>
-            </a:r>
-            <a:r>
-              <a:rPr lang="cs-CZ">
-                <a:hlinkClick r:id="rId9"/>
-              </a:rPr>
-              <a:t>.net</a:t>
+              <a:t>http://www.protractortest.org/</a:t>
             </a:r>
             <a:endParaRPr lang="en-US" dirty="0"/>
-          </a:p>
-          <a:p>
-            <a:endParaRPr lang="cs-CZ" dirty="0"/>
           </a:p>
         </p:txBody>
       </p:sp>
@@ -12603,7 +12437,7 @@
             <a:fld id="{009831D7-A162-FC48-82E7-0E3299834122}" type="slidenum">
               <a:rPr lang="en-US" smtClean="0"/>
               <a:pPr/>
-              <a:t>17</a:t>
+              <a:t>16</a:t>
             </a:fld>
             <a:endParaRPr lang="en-US" dirty="0"/>
           </a:p>
@@ -12622,7 +12456,7 @@
 </p:sld>
 </file>
 
-<file path=ppt/slides/slide18.xml><?xml version="1.0" encoding="utf-8"?>
+<file path=ppt/slides/slide17.xml><?xml version="1.0" encoding="utf-8"?>
 <p:sld xmlns:a="http://schemas.openxmlformats.org/drawingml/2006/main" xmlns:r="http://schemas.openxmlformats.org/officeDocument/2006/relationships" xmlns:p="http://schemas.openxmlformats.org/presentationml/2006/main">
   <p:cSld>
     <p:spTree>
@@ -12822,7 +12656,7 @@
             <a:fld id="{009831D7-A162-FC48-82E7-0E3299834122}" type="slidenum">
               <a:rPr lang="en-US" smtClean="0"/>
               <a:pPr/>
-              <a:t>18</a:t>
+              <a:t>17</a:t>
             </a:fld>
             <a:endParaRPr lang="en-US" dirty="0"/>
           </a:p>
@@ -12860,13 +12694,7 @@
       </p:grpSpPr>
       <p:sp>
         <p:nvSpPr>
-          <p:cNvPr id="2" name="Title 1">
-            <a:extLst>
-              <a:ext uri="{FF2B5EF4-FFF2-40B4-BE49-F238E27FC236}">
-                <a16:creationId xmlns:a16="http://schemas.microsoft.com/office/drawing/2014/main" id="{205B9E9A-E9BE-4C0E-883D-23AA1EFE3938}"/>
-              </a:ext>
-            </a:extLst>
-          </p:cNvPr>
+          <p:cNvPr id="2" name="Title 1"/>
           <p:cNvSpPr>
             <a:spLocks noGrp="1"/>
           </p:cNvSpPr>
@@ -12881,20 +12709,15 @@
           <a:p>
             <a:r>
               <a:rPr lang="en-US" dirty="0"/>
-              <a:t>Maybe not what you expected</a:t>
-            </a:r>
+              <a:t>Agenda</a:t>
+            </a:r>
+            <a:endParaRPr lang="cs-CZ" dirty="0"/>
           </a:p>
         </p:txBody>
       </p:sp>
       <p:sp>
         <p:nvSpPr>
-          <p:cNvPr id="3" name="Content Placeholder 2">
-            <a:extLst>
-              <a:ext uri="{FF2B5EF4-FFF2-40B4-BE49-F238E27FC236}">
-                <a16:creationId xmlns:a16="http://schemas.microsoft.com/office/drawing/2014/main" id="{1DD000E1-E2C8-4B81-A943-C9C167C9B0F2}"/>
-              </a:ext>
-            </a:extLst>
-          </p:cNvPr>
+          <p:cNvPr id="3" name="Content Placeholder 2"/>
           <p:cNvSpPr>
             <a:spLocks noGrp="1"/>
           </p:cNvSpPr>
@@ -12905,26 +12728,114 @@
         <p:spPr/>
         <p:txBody>
           <a:bodyPr>
-            <a:normAutofit/>
+            <a:normAutofit fontScale="92500" lnSpcReduction="10000"/>
           </a:bodyPr>
           <a:lstStyle/>
           <a:p>
             <a:r>
-              <a:rPr lang="en-US" sz="3200" dirty="0"/>
-              <a:t>ASP.NET WebApi2 a AngularJS</a:t>
-            </a:r>
+              <a:rPr lang="en-US" dirty="0"/>
+              <a:t>Testing? Why should I care?</a:t>
+            </a:r>
+          </a:p>
+          <a:p>
+            <a:r>
+              <a:rPr lang="en-US" dirty="0"/>
+              <a:t>Test pyramid</a:t>
+            </a:r>
+          </a:p>
+          <a:p>
+            <a:r>
+              <a:rPr lang="en-US" dirty="0"/>
+              <a:t>Different kinds of tests</a:t>
+            </a:r>
+          </a:p>
+          <a:p>
+            <a:pPr lvl="1"/>
+            <a:r>
+              <a:rPr lang="en-US" dirty="0"/>
+              <a:t>Unit tests</a:t>
+            </a:r>
+          </a:p>
+          <a:p>
+            <a:pPr lvl="1"/>
+            <a:r>
+              <a:rPr lang="en-US" dirty="0"/>
+              <a:t>Integration tests</a:t>
+            </a:r>
+          </a:p>
+          <a:p>
+            <a:pPr lvl="1"/>
+            <a:r>
+              <a:rPr lang="en-US" dirty="0"/>
+              <a:t>End to end tests</a:t>
+            </a:r>
+          </a:p>
+          <a:p>
+            <a:r>
+              <a:rPr lang="en-US" dirty="0"/>
+              <a:t>Sample application</a:t>
+            </a:r>
+          </a:p>
+          <a:p>
+            <a:pPr lvl="1"/>
+            <a:r>
+              <a:rPr lang="en-US" dirty="0"/>
+              <a:t>Angular 5, ASP.NET Core 2.0 </a:t>
+            </a:r>
+            <a:r>
+              <a:rPr lang="en-US" dirty="0" err="1"/>
+              <a:t>WebApi</a:t>
+            </a:r>
+            <a:endParaRPr lang="en-US" dirty="0"/>
+          </a:p>
+          <a:p>
+            <a:pPr lvl="1"/>
+            <a:r>
+              <a:rPr lang="en-US" dirty="0"/>
+              <a:t>Server part</a:t>
+            </a:r>
+          </a:p>
+          <a:p>
+            <a:pPr lvl="2"/>
+            <a:r>
+              <a:rPr lang="en-US" dirty="0"/>
+              <a:t>code walkthrough</a:t>
+            </a:r>
+          </a:p>
+          <a:p>
+            <a:pPr lvl="2"/>
+            <a:r>
+              <a:rPr lang="en-US" dirty="0"/>
+              <a:t>tests walkthrough</a:t>
+            </a:r>
+          </a:p>
+          <a:p>
+            <a:pPr lvl="1"/>
+            <a:r>
+              <a:rPr lang="en-US" dirty="0"/>
+              <a:t>Client part</a:t>
+            </a:r>
+          </a:p>
+          <a:p>
+            <a:pPr lvl="2"/>
+            <a:r>
+              <a:rPr lang="en-US" dirty="0"/>
+              <a:t>code walkthrough</a:t>
+            </a:r>
+          </a:p>
+          <a:p>
+            <a:pPr lvl="2"/>
+            <a:r>
+              <a:rPr lang="en-US" dirty="0"/>
+              <a:t>tests walkthrough</a:t>
+            </a:r>
+            <a:endParaRPr lang="cs-CZ" dirty="0"/>
           </a:p>
         </p:txBody>
       </p:sp>
       <p:sp>
         <p:nvSpPr>
-          <p:cNvPr id="4" name="Slide Number Placeholder 3">
-            <a:extLst>
-              <a:ext uri="{FF2B5EF4-FFF2-40B4-BE49-F238E27FC236}">
-                <a16:creationId xmlns:a16="http://schemas.microsoft.com/office/drawing/2014/main" id="{62988D4E-E04A-4F33-9F80-C2818D19B035}"/>
-              </a:ext>
-            </a:extLst>
-          </p:cNvPr>
+          <p:cNvPr id="5" name="Slide Number Placeholder 4"/>
           <p:cNvSpPr>
             <a:spLocks noGrp="1"/>
           </p:cNvSpPr>
@@ -12946,1238 +12857,16 @@
           </a:p>
         </p:txBody>
       </p:sp>
-      <p:cxnSp>
-        <p:nvCxnSpPr>
-          <p:cNvPr id="8" name="Straight Connector 7">
-            <a:extLst>
-              <a:ext uri="{FF2B5EF4-FFF2-40B4-BE49-F238E27FC236}">
-                <a16:creationId xmlns:a16="http://schemas.microsoft.com/office/drawing/2014/main" id="{9BDD93FF-870A-4826-B4BF-3551523F13C5}"/>
-              </a:ext>
-            </a:extLst>
-          </p:cNvPr>
-          <p:cNvCxnSpPr/>
-          <p:nvPr/>
-        </p:nvCxnSpPr>
-        <p:spPr>
-          <a:xfrm flipV="1">
-            <a:off x="5601810" y="1358283"/>
-            <a:ext cx="346229" cy="408373"/>
-          </a:xfrm>
-          <a:prstGeom prst="line">
-            <a:avLst/>
-          </a:prstGeom>
-          <a:ln>
-            <a:solidFill>
-              <a:srgbClr val="FF0000"/>
-            </a:solidFill>
-          </a:ln>
-        </p:spPr>
-        <p:style>
-          <a:lnRef idx="2">
-            <a:schemeClr val="accent1"/>
-          </a:lnRef>
-          <a:fillRef idx="0">
-            <a:schemeClr val="accent1"/>
-          </a:fillRef>
-          <a:effectRef idx="1">
-            <a:schemeClr val="accent1"/>
-          </a:effectRef>
-          <a:fontRef idx="minor">
-            <a:schemeClr val="tx1"/>
-          </a:fontRef>
-        </p:style>
-      </p:cxnSp>
-      <p:cxnSp>
-        <p:nvCxnSpPr>
-          <p:cNvPr id="10" name="Straight Connector 9">
-            <a:extLst>
-              <a:ext uri="{FF2B5EF4-FFF2-40B4-BE49-F238E27FC236}">
-                <a16:creationId xmlns:a16="http://schemas.microsoft.com/office/drawing/2014/main" id="{539469BC-2F7E-40D4-B50A-B4D6A526EEB3}"/>
-              </a:ext>
-            </a:extLst>
-          </p:cNvPr>
-          <p:cNvCxnSpPr/>
-          <p:nvPr/>
-        </p:nvCxnSpPr>
-        <p:spPr>
-          <a:xfrm flipH="1" flipV="1">
-            <a:off x="5601810" y="1358283"/>
-            <a:ext cx="346229" cy="408373"/>
-          </a:xfrm>
-          <a:prstGeom prst="line">
-            <a:avLst/>
-          </a:prstGeom>
-          <a:ln>
-            <a:solidFill>
-              <a:srgbClr val="FF0000"/>
-            </a:solidFill>
-          </a:ln>
-        </p:spPr>
-        <p:style>
-          <a:lnRef idx="2">
-            <a:schemeClr val="accent1"/>
-          </a:lnRef>
-          <a:fillRef idx="0">
-            <a:schemeClr val="accent1"/>
-          </a:fillRef>
-          <a:effectRef idx="1">
-            <a:schemeClr val="accent1"/>
-          </a:effectRef>
-          <a:fontRef idx="minor">
-            <a:schemeClr val="tx1"/>
-          </a:fontRef>
-        </p:style>
-      </p:cxnSp>
-      <p:cxnSp>
-        <p:nvCxnSpPr>
-          <p:cNvPr id="12" name="Straight Connector 11">
-            <a:extLst>
-              <a:ext uri="{FF2B5EF4-FFF2-40B4-BE49-F238E27FC236}">
-                <a16:creationId xmlns:a16="http://schemas.microsoft.com/office/drawing/2014/main" id="{E9F9BC3B-780F-4CD3-8EDC-8A56EADB00E2}"/>
-              </a:ext>
-            </a:extLst>
-          </p:cNvPr>
-          <p:cNvCxnSpPr/>
-          <p:nvPr/>
-        </p:nvCxnSpPr>
-        <p:spPr>
-          <a:xfrm>
-            <a:off x="3693111" y="1358283"/>
-            <a:ext cx="275207" cy="408373"/>
-          </a:xfrm>
-          <a:prstGeom prst="line">
-            <a:avLst/>
-          </a:prstGeom>
-          <a:ln>
-            <a:solidFill>
-              <a:srgbClr val="FF0000"/>
-            </a:solidFill>
-          </a:ln>
-        </p:spPr>
-        <p:style>
-          <a:lnRef idx="2">
-            <a:schemeClr val="accent1"/>
-          </a:lnRef>
-          <a:fillRef idx="0">
-            <a:schemeClr val="accent1"/>
-          </a:fillRef>
-          <a:effectRef idx="1">
-            <a:schemeClr val="accent1"/>
-          </a:effectRef>
-          <a:fontRef idx="minor">
-            <a:schemeClr val="tx1"/>
-          </a:fontRef>
-        </p:style>
-      </p:cxnSp>
-      <p:cxnSp>
-        <p:nvCxnSpPr>
-          <p:cNvPr id="14" name="Straight Connector 13">
-            <a:extLst>
-              <a:ext uri="{FF2B5EF4-FFF2-40B4-BE49-F238E27FC236}">
-                <a16:creationId xmlns:a16="http://schemas.microsoft.com/office/drawing/2014/main" id="{D89DF049-06F8-4836-86A4-67DCB556EB3B}"/>
-              </a:ext>
-            </a:extLst>
-          </p:cNvPr>
-          <p:cNvCxnSpPr/>
-          <p:nvPr/>
-        </p:nvCxnSpPr>
-        <p:spPr>
-          <a:xfrm flipH="1">
-            <a:off x="3728621" y="1358283"/>
-            <a:ext cx="248575" cy="408373"/>
-          </a:xfrm>
-          <a:prstGeom prst="line">
-            <a:avLst/>
-          </a:prstGeom>
-          <a:ln>
-            <a:solidFill>
-              <a:srgbClr val="FF0000"/>
-            </a:solidFill>
-          </a:ln>
-        </p:spPr>
-        <p:style>
-          <a:lnRef idx="2">
-            <a:schemeClr val="accent1"/>
-          </a:lnRef>
-          <a:fillRef idx="0">
-            <a:schemeClr val="accent1"/>
-          </a:fillRef>
-          <a:effectRef idx="1">
-            <a:schemeClr val="accent1"/>
-          </a:effectRef>
-          <a:fontRef idx="minor">
-            <a:schemeClr val="tx1"/>
-          </a:fontRef>
-        </p:style>
-      </p:cxnSp>
-      <p:sp>
-        <p:nvSpPr>
-          <p:cNvPr id="15" name="TextBox 14">
-            <a:extLst>
-              <a:ext uri="{FF2B5EF4-FFF2-40B4-BE49-F238E27FC236}">
-                <a16:creationId xmlns:a16="http://schemas.microsoft.com/office/drawing/2014/main" id="{7CF3EA72-1081-4A16-B0ED-DBF20A6DD161}"/>
-              </a:ext>
-            </a:extLst>
-          </p:cNvPr>
-          <p:cNvSpPr txBox="1"/>
-          <p:nvPr/>
-        </p:nvSpPr>
-        <p:spPr>
-          <a:xfrm>
-            <a:off x="1660124" y="2104008"/>
-            <a:ext cx="1669002" cy="603681"/>
-          </a:xfrm>
-          <a:prstGeom prst="rect">
-            <a:avLst/>
-          </a:prstGeom>
-          <a:noFill/>
-        </p:spPr>
-        <p:txBody>
-          <a:bodyPr wrap="square" rtlCol="0">
-            <a:spAutoFit/>
-          </a:bodyPr>
-          <a:lstStyle/>
-          <a:p>
-            <a:r>
-              <a:rPr lang="en-US" sz="3200" dirty="0">
-                <a:solidFill>
-                  <a:srgbClr val="00B050"/>
-                </a:solidFill>
-              </a:rPr>
-              <a:t>Core 2.0</a:t>
-            </a:r>
-          </a:p>
-        </p:txBody>
-      </p:sp>
-      <p:sp>
-        <p:nvSpPr>
-          <p:cNvPr id="16" name="Arrow: Up 15">
-            <a:extLst>
-              <a:ext uri="{FF2B5EF4-FFF2-40B4-BE49-F238E27FC236}">
-                <a16:creationId xmlns:a16="http://schemas.microsoft.com/office/drawing/2014/main" id="{24060B08-280D-4F05-A672-0F59EFEF8089}"/>
-              </a:ext>
-            </a:extLst>
-          </p:cNvPr>
-          <p:cNvSpPr/>
-          <p:nvPr/>
-        </p:nvSpPr>
-        <p:spPr>
-          <a:xfrm>
-            <a:off x="2254928" y="1766656"/>
-            <a:ext cx="239697" cy="452761"/>
-          </a:xfrm>
-          <a:prstGeom prst="upArrow">
-            <a:avLst/>
-          </a:prstGeom>
-          <a:solidFill>
-            <a:schemeClr val="bg1"/>
-          </a:solidFill>
-          <a:ln>
-            <a:solidFill>
-              <a:srgbClr val="00B050"/>
-            </a:solidFill>
-          </a:ln>
-        </p:spPr>
-        <p:style>
-          <a:lnRef idx="1">
-            <a:schemeClr val="accent1"/>
-          </a:lnRef>
-          <a:fillRef idx="3">
-            <a:schemeClr val="accent1"/>
-          </a:fillRef>
-          <a:effectRef idx="2">
-            <a:schemeClr val="accent1"/>
-          </a:effectRef>
-          <a:fontRef idx="minor">
-            <a:schemeClr val="lt1"/>
-          </a:fontRef>
-        </p:style>
-        <p:txBody>
-          <a:bodyPr rtlCol="0" anchor="ctr"/>
-          <a:lstStyle/>
-          <a:p>
-            <a:pPr algn="ctr"/>
-            <a:endParaRPr lang="en-US"/>
-          </a:p>
-        </p:txBody>
-      </p:sp>
-      <p:sp>
-        <p:nvSpPr>
-          <p:cNvPr id="17" name="TextBox 16">
-            <a:extLst>
-              <a:ext uri="{FF2B5EF4-FFF2-40B4-BE49-F238E27FC236}">
-                <a16:creationId xmlns:a16="http://schemas.microsoft.com/office/drawing/2014/main" id="{F704D469-AE44-4C99-B664-EF748BE16313}"/>
-              </a:ext>
-            </a:extLst>
-          </p:cNvPr>
-          <p:cNvSpPr txBox="1"/>
-          <p:nvPr/>
-        </p:nvSpPr>
-        <p:spPr>
-          <a:xfrm>
-            <a:off x="5948039" y="1262234"/>
-            <a:ext cx="736846" cy="584775"/>
-          </a:xfrm>
-          <a:prstGeom prst="rect">
-            <a:avLst/>
-          </a:prstGeom>
-          <a:noFill/>
-        </p:spPr>
-        <p:txBody>
-          <a:bodyPr wrap="square" rtlCol="0">
-            <a:spAutoFit/>
-          </a:bodyPr>
-          <a:lstStyle/>
-          <a:p>
-            <a:r>
-              <a:rPr lang="en-US" sz="3200" dirty="0">
-                <a:solidFill>
-                  <a:srgbClr val="00B050"/>
-                </a:solidFill>
-              </a:rPr>
-              <a:t>5</a:t>
-            </a:r>
-          </a:p>
-        </p:txBody>
-      </p:sp>
-      <p:sp>
-        <p:nvSpPr>
-          <p:cNvPr id="19" name="Content Placeholder 2">
-            <a:extLst>
-              <a:ext uri="{FF2B5EF4-FFF2-40B4-BE49-F238E27FC236}">
-                <a16:creationId xmlns:a16="http://schemas.microsoft.com/office/drawing/2014/main" id="{ACF42B29-CF7D-4D96-9718-B161CB4F2DA8}"/>
-              </a:ext>
-            </a:extLst>
-          </p:cNvPr>
-          <p:cNvSpPr txBox="1">
-            <a:spLocks/>
-          </p:cNvSpPr>
-          <p:nvPr/>
-        </p:nvSpPr>
-        <p:spPr>
-          <a:xfrm>
-            <a:off x="466078" y="1262234"/>
-            <a:ext cx="7799034" cy="4446108"/>
-          </a:xfrm>
-          <a:prstGeom prst="rect">
-            <a:avLst/>
-          </a:prstGeom>
-        </p:spPr>
-        <p:txBody>
-          <a:bodyPr vert="horz" lIns="91440" tIns="45720" rIns="91440" bIns="45720" rtlCol="0">
-            <a:normAutofit/>
-          </a:bodyPr>
-          <a:lstStyle>
-            <a:lvl1pPr marL="457200" marR="0" indent="-457200" algn="l" defTabSz="457200" rtl="0" eaLnBrk="1" fontAlgn="auto" latinLnBrk="0" hangingPunct="1">
-              <a:lnSpc>
-                <a:spcPct val="100000"/>
-              </a:lnSpc>
-              <a:spcBef>
-                <a:spcPct val="20000"/>
-              </a:spcBef>
-              <a:spcAft>
-                <a:spcPts val="0"/>
-              </a:spcAft>
-              <a:buClr>
-                <a:srgbClr val="F79646"/>
-              </a:buClr>
-              <a:buSzTx/>
-              <a:buFont typeface="Lucida Grande"/>
-              <a:buChar char="»"/>
-              <a:tabLst/>
-              <a:defRPr sz="2400" kern="1200">
-                <a:solidFill>
-                  <a:schemeClr val="tx1">
-                    <a:lumMod val="65000"/>
-                    <a:lumOff val="35000"/>
-                  </a:schemeClr>
-                </a:solidFill>
-                <a:latin typeface="+mn-lt"/>
-                <a:ea typeface="+mn-ea"/>
-                <a:cs typeface="+mn-cs"/>
-              </a:defRPr>
-            </a:lvl1pPr>
-            <a:lvl2pPr marL="742950" marR="0" indent="-285750" algn="l" defTabSz="457200" rtl="0" eaLnBrk="1" fontAlgn="auto" latinLnBrk="0" hangingPunct="1">
-              <a:lnSpc>
-                <a:spcPct val="100000"/>
-              </a:lnSpc>
-              <a:spcBef>
-                <a:spcPct val="20000"/>
-              </a:spcBef>
-              <a:spcAft>
-                <a:spcPts val="0"/>
-              </a:spcAft>
-              <a:buClr>
-                <a:prstClr val="white">
-                  <a:lumMod val="65000"/>
-                </a:prstClr>
-              </a:buClr>
-              <a:buSzTx/>
-              <a:buFont typeface="Wingdings" charset="2"/>
-              <a:buChar char="§"/>
-              <a:tabLst/>
-              <a:defRPr sz="2000" kern="1200">
-                <a:solidFill>
-                  <a:schemeClr val="tx1">
-                    <a:lumMod val="65000"/>
-                    <a:lumOff val="35000"/>
-                  </a:schemeClr>
-                </a:solidFill>
-                <a:latin typeface="+mn-lt"/>
-                <a:ea typeface="+mn-ea"/>
-                <a:cs typeface="+mn-cs"/>
-              </a:defRPr>
-            </a:lvl2pPr>
-            <a:lvl3pPr marL="1143000" marR="0" indent="-228600" algn="l" defTabSz="457200" rtl="0" eaLnBrk="1" fontAlgn="auto" latinLnBrk="0" hangingPunct="1">
-              <a:lnSpc>
-                <a:spcPct val="100000"/>
-              </a:lnSpc>
-              <a:spcBef>
-                <a:spcPct val="20000"/>
-              </a:spcBef>
-              <a:spcAft>
-                <a:spcPts val="0"/>
-              </a:spcAft>
-              <a:buClr>
-                <a:srgbClr val="F79646"/>
-              </a:buClr>
-              <a:buSzTx/>
-              <a:buFont typeface="Arial"/>
-              <a:buChar char="•"/>
-              <a:tabLst/>
-              <a:defRPr sz="1800" kern="1200">
-                <a:solidFill>
-                  <a:schemeClr val="tx1">
-                    <a:lumMod val="65000"/>
-                    <a:lumOff val="35000"/>
-                  </a:schemeClr>
-                </a:solidFill>
-                <a:latin typeface="+mn-lt"/>
-                <a:ea typeface="+mn-ea"/>
-                <a:cs typeface="+mn-cs"/>
-              </a:defRPr>
-            </a:lvl3pPr>
-            <a:lvl4pPr marL="1600200" marR="0" indent="-228600" algn="l" defTabSz="457200" rtl="0" eaLnBrk="1" fontAlgn="auto" latinLnBrk="0" hangingPunct="1">
-              <a:lnSpc>
-                <a:spcPct val="100000"/>
-              </a:lnSpc>
-              <a:spcBef>
-                <a:spcPct val="20000"/>
-              </a:spcBef>
-              <a:spcAft>
-                <a:spcPts val="0"/>
-              </a:spcAft>
-              <a:buClr>
-                <a:prstClr val="white">
-                  <a:lumMod val="65000"/>
-                </a:prstClr>
-              </a:buClr>
-              <a:buSzTx/>
-              <a:buFont typeface="Arial"/>
-              <a:buChar char="•"/>
-              <a:tabLst/>
-              <a:defRPr sz="1600" kern="1200">
-                <a:solidFill>
-                  <a:schemeClr val="tx1">
-                    <a:lumMod val="65000"/>
-                    <a:lumOff val="35000"/>
-                  </a:schemeClr>
-                </a:solidFill>
-                <a:latin typeface="+mn-lt"/>
-                <a:ea typeface="+mn-ea"/>
-                <a:cs typeface="+mn-cs"/>
-              </a:defRPr>
-            </a:lvl4pPr>
-            <a:lvl5pPr marL="2057400" marR="0" indent="-228600" algn="l" defTabSz="457200" rtl="0" eaLnBrk="1" fontAlgn="auto" latinLnBrk="0" hangingPunct="1">
-              <a:lnSpc>
-                <a:spcPct val="100000"/>
-              </a:lnSpc>
-              <a:spcBef>
-                <a:spcPct val="20000"/>
-              </a:spcBef>
-              <a:spcAft>
-                <a:spcPts val="0"/>
-              </a:spcAft>
-              <a:buClr>
-                <a:prstClr val="white">
-                  <a:lumMod val="65000"/>
-                </a:prstClr>
-              </a:buClr>
-              <a:buSzTx/>
-              <a:buFont typeface="Arial"/>
-              <a:buChar char="•"/>
-              <a:tabLst/>
-              <a:defRPr sz="1600" kern="1200">
-                <a:solidFill>
-                  <a:schemeClr val="tx1">
-                    <a:lumMod val="65000"/>
-                    <a:lumOff val="35000"/>
-                  </a:schemeClr>
-                </a:solidFill>
-                <a:latin typeface="+mn-lt"/>
-                <a:ea typeface="+mn-ea"/>
-                <a:cs typeface="+mn-cs"/>
-              </a:defRPr>
-            </a:lvl5pPr>
-            <a:lvl6pPr marL="2514600" indent="-228600" algn="l" defTabSz="457200" rtl="0" eaLnBrk="1" latinLnBrk="0" hangingPunct="1">
-              <a:spcBef>
-                <a:spcPct val="20000"/>
-              </a:spcBef>
-              <a:buFont typeface="Arial"/>
-              <a:buChar char="•"/>
-              <a:defRPr sz="2000" kern="1200">
-                <a:solidFill>
-                  <a:schemeClr val="tx1"/>
-                </a:solidFill>
-                <a:latin typeface="+mn-lt"/>
-                <a:ea typeface="+mn-ea"/>
-                <a:cs typeface="+mn-cs"/>
-              </a:defRPr>
-            </a:lvl6pPr>
-            <a:lvl7pPr marL="2971800" indent="-228600" algn="l" defTabSz="457200" rtl="0" eaLnBrk="1" latinLnBrk="0" hangingPunct="1">
-              <a:spcBef>
-                <a:spcPct val="20000"/>
-              </a:spcBef>
-              <a:buFont typeface="Arial"/>
-              <a:buChar char="•"/>
-              <a:defRPr sz="2000" kern="1200">
-                <a:solidFill>
-                  <a:schemeClr val="tx1"/>
-                </a:solidFill>
-                <a:latin typeface="+mn-lt"/>
-                <a:ea typeface="+mn-ea"/>
-                <a:cs typeface="+mn-cs"/>
-              </a:defRPr>
-            </a:lvl7pPr>
-            <a:lvl8pPr marL="3429000" indent="-228600" algn="l" defTabSz="457200" rtl="0" eaLnBrk="1" latinLnBrk="0" hangingPunct="1">
-              <a:spcBef>
-                <a:spcPct val="20000"/>
-              </a:spcBef>
-              <a:buFont typeface="Arial"/>
-              <a:buChar char="•"/>
-              <a:defRPr sz="2000" kern="1200">
-                <a:solidFill>
-                  <a:schemeClr val="tx1"/>
-                </a:solidFill>
-                <a:latin typeface="+mn-lt"/>
-                <a:ea typeface="+mn-ea"/>
-                <a:cs typeface="+mn-cs"/>
-              </a:defRPr>
-            </a:lvl8pPr>
-            <a:lvl9pPr marL="3886200" indent="-228600" algn="l" defTabSz="457200" rtl="0" eaLnBrk="1" latinLnBrk="0" hangingPunct="1">
-              <a:spcBef>
-                <a:spcPct val="20000"/>
-              </a:spcBef>
-              <a:buFont typeface="Arial"/>
-              <a:buChar char="•"/>
-              <a:defRPr sz="2000" kern="1200">
-                <a:solidFill>
-                  <a:schemeClr val="tx1"/>
-                </a:solidFill>
-                <a:latin typeface="+mn-lt"/>
-                <a:ea typeface="+mn-ea"/>
-                <a:cs typeface="+mn-cs"/>
-              </a:defRPr>
-            </a:lvl9pPr>
-          </a:lstStyle>
-          <a:p>
-            <a:r>
-              <a:rPr lang="en-US" sz="3200" dirty="0"/>
-              <a:t>ASP.NET Core 2.0 </a:t>
-            </a:r>
-            <a:r>
-              <a:rPr lang="en-US" sz="3200" dirty="0" err="1"/>
-              <a:t>WebApi</a:t>
-            </a:r>
-            <a:r>
-              <a:rPr lang="en-US" sz="3200" dirty="0"/>
-              <a:t> and Angular 5</a:t>
-            </a:r>
-          </a:p>
-          <a:p>
-            <a:r>
-              <a:rPr lang="en-US" sz="3200" dirty="0"/>
-              <a:t>Let’s use modern technologies</a:t>
-            </a:r>
-          </a:p>
-          <a:p>
-            <a:pPr lvl="1"/>
-            <a:r>
-              <a:rPr lang="en-US" sz="2800" dirty="0"/>
-              <a:t>AngularJS is so 2016</a:t>
-            </a:r>
-          </a:p>
-          <a:p>
-            <a:pPr lvl="1"/>
-            <a:r>
-              <a:rPr lang="en-US" sz="2800" dirty="0"/>
-              <a:t>.NET Core is a bright future</a:t>
-            </a:r>
-          </a:p>
-        </p:txBody>
-      </p:sp>
     </p:spTree>
     <p:extLst>
       <p:ext uri="{BB962C8B-B14F-4D97-AF65-F5344CB8AC3E}">
-        <p14:creationId xmlns:p14="http://schemas.microsoft.com/office/powerpoint/2010/main" val="2954277900"/>
+        <p14:creationId xmlns:p14="http://schemas.microsoft.com/office/powerpoint/2010/main" val="22058017"/>
       </p:ext>
     </p:extLst>
   </p:cSld>
   <p:clrMapOvr>
     <a:masterClrMapping/>
   </p:clrMapOvr>
-  <p:timing>
-    <p:tnLst>
-      <p:par>
-        <p:cTn id="1" dur="indefinite" restart="never" nodeType="tmRoot">
-          <p:childTnLst>
-            <p:seq concurrent="1" nextAc="seek">
-              <p:cTn id="2" dur="indefinite" nodeType="mainSeq">
-                <p:childTnLst>
-                  <p:par>
-                    <p:cTn id="3" fill="hold">
-                      <p:stCondLst>
-                        <p:cond delay="indefinite"/>
-                      </p:stCondLst>
-                      <p:childTnLst>
-                        <p:par>
-                          <p:cTn id="4" fill="hold">
-                            <p:stCondLst>
-                              <p:cond delay="0"/>
-                            </p:stCondLst>
-                            <p:childTnLst>
-                              <p:par>
-                                <p:cTn id="5" presetID="1" presetClass="entr" presetSubtype="0" fill="hold" nodeType="clickEffect">
-                                  <p:stCondLst>
-                                    <p:cond delay="0"/>
-                                  </p:stCondLst>
-                                  <p:childTnLst>
-                                    <p:set>
-                                      <p:cBhvr>
-                                        <p:cTn id="6" dur="1" fill="hold">
-                                          <p:stCondLst>
-                                            <p:cond delay="0"/>
-                                          </p:stCondLst>
-                                        </p:cTn>
-                                        <p:tgtEl>
-                                          <p:spTgt spid="12"/>
-                                        </p:tgtEl>
-                                        <p:attrNameLst>
-                                          <p:attrName>style.visibility</p:attrName>
-                                        </p:attrNameLst>
-                                      </p:cBhvr>
-                                      <p:to>
-                                        <p:strVal val="visible"/>
-                                      </p:to>
-                                    </p:set>
-                                  </p:childTnLst>
-                                </p:cTn>
-                              </p:par>
-                              <p:par>
-                                <p:cTn id="7" presetID="1" presetClass="entr" presetSubtype="0" fill="hold" nodeType="withEffect">
-                                  <p:stCondLst>
-                                    <p:cond delay="0"/>
-                                  </p:stCondLst>
-                                  <p:childTnLst>
-                                    <p:set>
-                                      <p:cBhvr>
-                                        <p:cTn id="8" dur="1" fill="hold">
-                                          <p:stCondLst>
-                                            <p:cond delay="0"/>
-                                          </p:stCondLst>
-                                        </p:cTn>
-                                        <p:tgtEl>
-                                          <p:spTgt spid="14"/>
-                                        </p:tgtEl>
-                                        <p:attrNameLst>
-                                          <p:attrName>style.visibility</p:attrName>
-                                        </p:attrNameLst>
-                                      </p:cBhvr>
-                                      <p:to>
-                                        <p:strVal val="visible"/>
-                                      </p:to>
-                                    </p:set>
-                                  </p:childTnLst>
-                                </p:cTn>
-                              </p:par>
-                              <p:par>
-                                <p:cTn id="9" presetID="1" presetClass="entr" presetSubtype="0" fill="hold" nodeType="withEffect">
-                                  <p:stCondLst>
-                                    <p:cond delay="0"/>
-                                  </p:stCondLst>
-                                  <p:childTnLst>
-                                    <p:set>
-                                      <p:cBhvr>
-                                        <p:cTn id="10" dur="1" fill="hold">
-                                          <p:stCondLst>
-                                            <p:cond delay="0"/>
-                                          </p:stCondLst>
-                                        </p:cTn>
-                                        <p:tgtEl>
-                                          <p:spTgt spid="10"/>
-                                        </p:tgtEl>
-                                        <p:attrNameLst>
-                                          <p:attrName>style.visibility</p:attrName>
-                                        </p:attrNameLst>
-                                      </p:cBhvr>
-                                      <p:to>
-                                        <p:strVal val="visible"/>
-                                      </p:to>
-                                    </p:set>
-                                  </p:childTnLst>
-                                </p:cTn>
-                              </p:par>
-                              <p:par>
-                                <p:cTn id="11" presetID="1" presetClass="entr" presetSubtype="0" fill="hold" nodeType="withEffect">
-                                  <p:stCondLst>
-                                    <p:cond delay="0"/>
-                                  </p:stCondLst>
-                                  <p:childTnLst>
-                                    <p:set>
-                                      <p:cBhvr>
-                                        <p:cTn id="12" dur="1" fill="hold">
-                                          <p:stCondLst>
-                                            <p:cond delay="0"/>
-                                          </p:stCondLst>
-                                        </p:cTn>
-                                        <p:tgtEl>
-                                          <p:spTgt spid="8"/>
-                                        </p:tgtEl>
-                                        <p:attrNameLst>
-                                          <p:attrName>style.visibility</p:attrName>
-                                        </p:attrNameLst>
-                                      </p:cBhvr>
-                                      <p:to>
-                                        <p:strVal val="visible"/>
-                                      </p:to>
-                                    </p:set>
-                                  </p:childTnLst>
-                                </p:cTn>
-                              </p:par>
-                            </p:childTnLst>
-                          </p:cTn>
-                        </p:par>
-                      </p:childTnLst>
-                    </p:cTn>
-                  </p:par>
-                  <p:par>
-                    <p:cTn id="13" fill="hold">
-                      <p:stCondLst>
-                        <p:cond delay="indefinite"/>
-                      </p:stCondLst>
-                      <p:childTnLst>
-                        <p:par>
-                          <p:cTn id="14" fill="hold">
-                            <p:stCondLst>
-                              <p:cond delay="0"/>
-                            </p:stCondLst>
-                            <p:childTnLst>
-                              <p:par>
-                                <p:cTn id="15" presetID="1" presetClass="entr" presetSubtype="0" fill="hold" grpId="0" nodeType="clickEffect">
-                                  <p:stCondLst>
-                                    <p:cond delay="0"/>
-                                  </p:stCondLst>
-                                  <p:childTnLst>
-                                    <p:set>
-                                      <p:cBhvr>
-                                        <p:cTn id="16" dur="1" fill="hold">
-                                          <p:stCondLst>
-                                            <p:cond delay="0"/>
-                                          </p:stCondLst>
-                                        </p:cTn>
-                                        <p:tgtEl>
-                                          <p:spTgt spid="15"/>
-                                        </p:tgtEl>
-                                        <p:attrNameLst>
-                                          <p:attrName>style.visibility</p:attrName>
-                                        </p:attrNameLst>
-                                      </p:cBhvr>
-                                      <p:to>
-                                        <p:strVal val="visible"/>
-                                      </p:to>
-                                    </p:set>
-                                  </p:childTnLst>
-                                </p:cTn>
-                              </p:par>
-                              <p:par>
-                                <p:cTn id="17" presetID="1" presetClass="entr" presetSubtype="0" fill="hold" grpId="0" nodeType="withEffect">
-                                  <p:stCondLst>
-                                    <p:cond delay="0"/>
-                                  </p:stCondLst>
-                                  <p:childTnLst>
-                                    <p:set>
-                                      <p:cBhvr>
-                                        <p:cTn id="18" dur="1" fill="hold">
-                                          <p:stCondLst>
-                                            <p:cond delay="0"/>
-                                          </p:stCondLst>
-                                        </p:cTn>
-                                        <p:tgtEl>
-                                          <p:spTgt spid="16"/>
-                                        </p:tgtEl>
-                                        <p:attrNameLst>
-                                          <p:attrName>style.visibility</p:attrName>
-                                        </p:attrNameLst>
-                                      </p:cBhvr>
-                                      <p:to>
-                                        <p:strVal val="visible"/>
-                                      </p:to>
-                                    </p:set>
-                                  </p:childTnLst>
-                                </p:cTn>
-                              </p:par>
-                              <p:par>
-                                <p:cTn id="19" presetID="1" presetClass="entr" presetSubtype="0" fill="hold" grpId="0" nodeType="withEffect">
-                                  <p:stCondLst>
-                                    <p:cond delay="0"/>
-                                  </p:stCondLst>
-                                  <p:childTnLst>
-                                    <p:set>
-                                      <p:cBhvr>
-                                        <p:cTn id="20" dur="1" fill="hold">
-                                          <p:stCondLst>
-                                            <p:cond delay="0"/>
-                                          </p:stCondLst>
-                                        </p:cTn>
-                                        <p:tgtEl>
-                                          <p:spTgt spid="17"/>
-                                        </p:tgtEl>
-                                        <p:attrNameLst>
-                                          <p:attrName>style.visibility</p:attrName>
-                                        </p:attrNameLst>
-                                      </p:cBhvr>
-                                      <p:to>
-                                        <p:strVal val="visible"/>
-                                      </p:to>
-                                    </p:set>
-                                  </p:childTnLst>
-                                </p:cTn>
-                              </p:par>
-                            </p:childTnLst>
-                          </p:cTn>
-                        </p:par>
-                      </p:childTnLst>
-                    </p:cTn>
-                  </p:par>
-                  <p:par>
-                    <p:cTn id="21" fill="hold">
-                      <p:stCondLst>
-                        <p:cond delay="indefinite"/>
-                      </p:stCondLst>
-                      <p:childTnLst>
-                        <p:par>
-                          <p:cTn id="22" fill="hold">
-                            <p:stCondLst>
-                              <p:cond delay="0"/>
-                            </p:stCondLst>
-                            <p:childTnLst>
-                              <p:par>
-                                <p:cTn id="23" presetID="1" presetClass="exit" presetSubtype="0" fill="hold" nodeType="clickEffect">
-                                  <p:stCondLst>
-                                    <p:cond delay="0"/>
-                                  </p:stCondLst>
-                                  <p:childTnLst>
-                                    <p:set>
-                                      <p:cBhvr>
-                                        <p:cTn id="24" dur="1" fill="hold">
-                                          <p:stCondLst>
-                                            <p:cond delay="0"/>
-                                          </p:stCondLst>
-                                        </p:cTn>
-                                        <p:tgtEl>
-                                          <p:spTgt spid="3">
-                                            <p:txEl>
-                                              <p:pRg st="0" end="0"/>
-                                            </p:txEl>
-                                          </p:spTgt>
-                                        </p:tgtEl>
-                                        <p:attrNameLst>
-                                          <p:attrName>style.visibility</p:attrName>
-                                        </p:attrNameLst>
-                                      </p:cBhvr>
-                                      <p:to>
-                                        <p:strVal val="hidden"/>
-                                      </p:to>
-                                    </p:set>
-                                  </p:childTnLst>
-                                </p:cTn>
-                              </p:par>
-                              <p:par>
-                                <p:cTn id="25" presetID="1" presetClass="exit" presetSubtype="0" fill="hold" nodeType="withEffect">
-                                  <p:stCondLst>
-                                    <p:cond delay="0"/>
-                                  </p:stCondLst>
-                                  <p:childTnLst>
-                                    <p:set>
-                                      <p:cBhvr>
-                                        <p:cTn id="26" dur="1" fill="hold">
-                                          <p:stCondLst>
-                                            <p:cond delay="0"/>
-                                          </p:stCondLst>
-                                        </p:cTn>
-                                        <p:tgtEl>
-                                          <p:spTgt spid="12"/>
-                                        </p:tgtEl>
-                                        <p:attrNameLst>
-                                          <p:attrName>style.visibility</p:attrName>
-                                        </p:attrNameLst>
-                                      </p:cBhvr>
-                                      <p:to>
-                                        <p:strVal val="hidden"/>
-                                      </p:to>
-                                    </p:set>
-                                  </p:childTnLst>
-                                </p:cTn>
-                              </p:par>
-                              <p:par>
-                                <p:cTn id="27" presetID="1" presetClass="exit" presetSubtype="0" fill="hold" nodeType="withEffect">
-                                  <p:stCondLst>
-                                    <p:cond delay="0"/>
-                                  </p:stCondLst>
-                                  <p:childTnLst>
-                                    <p:set>
-                                      <p:cBhvr>
-                                        <p:cTn id="28" dur="1" fill="hold">
-                                          <p:stCondLst>
-                                            <p:cond delay="0"/>
-                                          </p:stCondLst>
-                                        </p:cTn>
-                                        <p:tgtEl>
-                                          <p:spTgt spid="14"/>
-                                        </p:tgtEl>
-                                        <p:attrNameLst>
-                                          <p:attrName>style.visibility</p:attrName>
-                                        </p:attrNameLst>
-                                      </p:cBhvr>
-                                      <p:to>
-                                        <p:strVal val="hidden"/>
-                                      </p:to>
-                                    </p:set>
-                                  </p:childTnLst>
-                                </p:cTn>
-                              </p:par>
-                              <p:par>
-                                <p:cTn id="29" presetID="1" presetClass="exit" presetSubtype="0" fill="hold" nodeType="withEffect">
-                                  <p:stCondLst>
-                                    <p:cond delay="0"/>
-                                  </p:stCondLst>
-                                  <p:childTnLst>
-                                    <p:set>
-                                      <p:cBhvr>
-                                        <p:cTn id="30" dur="1" fill="hold">
-                                          <p:stCondLst>
-                                            <p:cond delay="0"/>
-                                          </p:stCondLst>
-                                        </p:cTn>
-                                        <p:tgtEl>
-                                          <p:spTgt spid="10"/>
-                                        </p:tgtEl>
-                                        <p:attrNameLst>
-                                          <p:attrName>style.visibility</p:attrName>
-                                        </p:attrNameLst>
-                                      </p:cBhvr>
-                                      <p:to>
-                                        <p:strVal val="hidden"/>
-                                      </p:to>
-                                    </p:set>
-                                  </p:childTnLst>
-                                </p:cTn>
-                              </p:par>
-                              <p:par>
-                                <p:cTn id="31" presetID="1" presetClass="exit" presetSubtype="0" fill="hold" nodeType="withEffect">
-                                  <p:stCondLst>
-                                    <p:cond delay="0"/>
-                                  </p:stCondLst>
-                                  <p:childTnLst>
-                                    <p:set>
-                                      <p:cBhvr>
-                                        <p:cTn id="32" dur="1" fill="hold">
-                                          <p:stCondLst>
-                                            <p:cond delay="0"/>
-                                          </p:stCondLst>
-                                        </p:cTn>
-                                        <p:tgtEl>
-                                          <p:spTgt spid="8"/>
-                                        </p:tgtEl>
-                                        <p:attrNameLst>
-                                          <p:attrName>style.visibility</p:attrName>
-                                        </p:attrNameLst>
-                                      </p:cBhvr>
-                                      <p:to>
-                                        <p:strVal val="hidden"/>
-                                      </p:to>
-                                    </p:set>
-                                  </p:childTnLst>
-                                </p:cTn>
-                              </p:par>
-                              <p:par>
-                                <p:cTn id="33" presetID="1" presetClass="exit" presetSubtype="0" fill="hold" grpId="1" nodeType="withEffect">
-                                  <p:stCondLst>
-                                    <p:cond delay="0"/>
-                                  </p:stCondLst>
-                                  <p:childTnLst>
-                                    <p:set>
-                                      <p:cBhvr>
-                                        <p:cTn id="34" dur="1" fill="hold">
-                                          <p:stCondLst>
-                                            <p:cond delay="0"/>
-                                          </p:stCondLst>
-                                        </p:cTn>
-                                        <p:tgtEl>
-                                          <p:spTgt spid="15"/>
-                                        </p:tgtEl>
-                                        <p:attrNameLst>
-                                          <p:attrName>style.visibility</p:attrName>
-                                        </p:attrNameLst>
-                                      </p:cBhvr>
-                                      <p:to>
-                                        <p:strVal val="hidden"/>
-                                      </p:to>
-                                    </p:set>
-                                  </p:childTnLst>
-                                </p:cTn>
-                              </p:par>
-                              <p:par>
-                                <p:cTn id="35" presetID="1" presetClass="exit" presetSubtype="0" fill="hold" grpId="1" nodeType="withEffect">
-                                  <p:stCondLst>
-                                    <p:cond delay="0"/>
-                                  </p:stCondLst>
-                                  <p:childTnLst>
-                                    <p:set>
-                                      <p:cBhvr>
-                                        <p:cTn id="36" dur="1" fill="hold">
-                                          <p:stCondLst>
-                                            <p:cond delay="0"/>
-                                          </p:stCondLst>
-                                        </p:cTn>
-                                        <p:tgtEl>
-                                          <p:spTgt spid="16"/>
-                                        </p:tgtEl>
-                                        <p:attrNameLst>
-                                          <p:attrName>style.visibility</p:attrName>
-                                        </p:attrNameLst>
-                                      </p:cBhvr>
-                                      <p:to>
-                                        <p:strVal val="hidden"/>
-                                      </p:to>
-                                    </p:set>
-                                  </p:childTnLst>
-                                </p:cTn>
-                              </p:par>
-                              <p:par>
-                                <p:cTn id="37" presetID="1" presetClass="exit" presetSubtype="0" fill="hold" grpId="1" nodeType="withEffect">
-                                  <p:stCondLst>
-                                    <p:cond delay="0"/>
-                                  </p:stCondLst>
-                                  <p:childTnLst>
-                                    <p:set>
-                                      <p:cBhvr>
-                                        <p:cTn id="38" dur="1" fill="hold">
-                                          <p:stCondLst>
-                                            <p:cond delay="0"/>
-                                          </p:stCondLst>
-                                        </p:cTn>
-                                        <p:tgtEl>
-                                          <p:spTgt spid="17"/>
-                                        </p:tgtEl>
-                                        <p:attrNameLst>
-                                          <p:attrName>style.visibility</p:attrName>
-                                        </p:attrNameLst>
-                                      </p:cBhvr>
-                                      <p:to>
-                                        <p:strVal val="hidden"/>
-                                      </p:to>
-                                    </p:set>
-                                  </p:childTnLst>
-                                </p:cTn>
-                              </p:par>
-                            </p:childTnLst>
-                          </p:cTn>
-                        </p:par>
-                        <p:par>
-                          <p:cTn id="39" fill="hold">
-                            <p:stCondLst>
-                              <p:cond delay="0"/>
-                            </p:stCondLst>
-                            <p:childTnLst>
-                              <p:par>
-                                <p:cTn id="40" presetID="1" presetClass="entr" presetSubtype="0" fill="hold" nodeType="afterEffect">
-                                  <p:stCondLst>
-                                    <p:cond delay="0"/>
-                                  </p:stCondLst>
-                                  <p:childTnLst>
-                                    <p:set>
-                                      <p:cBhvr>
-                                        <p:cTn id="41" dur="1" fill="hold">
-                                          <p:stCondLst>
-                                            <p:cond delay="0"/>
-                                          </p:stCondLst>
-                                        </p:cTn>
-                                        <p:tgtEl>
-                                          <p:spTgt spid="19">
-                                            <p:txEl>
-                                              <p:pRg st="0" end="0"/>
-                                            </p:txEl>
-                                          </p:spTgt>
-                                        </p:tgtEl>
-                                        <p:attrNameLst>
-                                          <p:attrName>style.visibility</p:attrName>
-                                        </p:attrNameLst>
-                                      </p:cBhvr>
-                                      <p:to>
-                                        <p:strVal val="visible"/>
-                                      </p:to>
-                                    </p:set>
-                                  </p:childTnLst>
-                                </p:cTn>
-                              </p:par>
-                            </p:childTnLst>
-                          </p:cTn>
-                        </p:par>
-                      </p:childTnLst>
-                    </p:cTn>
-                  </p:par>
-                  <p:par>
-                    <p:cTn id="42" fill="hold">
-                      <p:stCondLst>
-                        <p:cond delay="indefinite"/>
-                      </p:stCondLst>
-                      <p:childTnLst>
-                        <p:par>
-                          <p:cTn id="43" fill="hold">
-                            <p:stCondLst>
-                              <p:cond delay="0"/>
-                            </p:stCondLst>
-                            <p:childTnLst>
-                              <p:par>
-                                <p:cTn id="44" presetID="1" presetClass="entr" presetSubtype="0" fill="hold" nodeType="clickEffect">
-                                  <p:stCondLst>
-                                    <p:cond delay="0"/>
-                                  </p:stCondLst>
-                                  <p:childTnLst>
-                                    <p:set>
-                                      <p:cBhvr>
-                                        <p:cTn id="45" dur="1" fill="hold">
-                                          <p:stCondLst>
-                                            <p:cond delay="0"/>
-                                          </p:stCondLst>
-                                        </p:cTn>
-                                        <p:tgtEl>
-                                          <p:spTgt spid="19">
-                                            <p:txEl>
-                                              <p:pRg st="1" end="1"/>
-                                            </p:txEl>
-                                          </p:spTgt>
-                                        </p:tgtEl>
-                                        <p:attrNameLst>
-                                          <p:attrName>style.visibility</p:attrName>
-                                        </p:attrNameLst>
-                                      </p:cBhvr>
-                                      <p:to>
-                                        <p:strVal val="visible"/>
-                                      </p:to>
-                                    </p:set>
-                                  </p:childTnLst>
-                                </p:cTn>
-                              </p:par>
-                              <p:par>
-                                <p:cTn id="46" presetID="1" presetClass="entr" presetSubtype="0" fill="hold" nodeType="withEffect">
-                                  <p:stCondLst>
-                                    <p:cond delay="0"/>
-                                  </p:stCondLst>
-                                  <p:childTnLst>
-                                    <p:set>
-                                      <p:cBhvr>
-                                        <p:cTn id="47" dur="1" fill="hold">
-                                          <p:stCondLst>
-                                            <p:cond delay="0"/>
-                                          </p:stCondLst>
-                                        </p:cTn>
-                                        <p:tgtEl>
-                                          <p:spTgt spid="19">
-                                            <p:txEl>
-                                              <p:pRg st="2" end="2"/>
-                                            </p:txEl>
-                                          </p:spTgt>
-                                        </p:tgtEl>
-                                        <p:attrNameLst>
-                                          <p:attrName>style.visibility</p:attrName>
-                                        </p:attrNameLst>
-                                      </p:cBhvr>
-                                      <p:to>
-                                        <p:strVal val="visible"/>
-                                      </p:to>
-                                    </p:set>
-                                  </p:childTnLst>
-                                </p:cTn>
-                              </p:par>
-                              <p:par>
-                                <p:cTn id="48" presetID="1" presetClass="entr" presetSubtype="0" fill="hold" nodeType="withEffect">
-                                  <p:stCondLst>
-                                    <p:cond delay="0"/>
-                                  </p:stCondLst>
-                                  <p:childTnLst>
-                                    <p:set>
-                                      <p:cBhvr>
-                                        <p:cTn id="49" dur="1" fill="hold">
-                                          <p:stCondLst>
-                                            <p:cond delay="0"/>
-                                          </p:stCondLst>
-                                        </p:cTn>
-                                        <p:tgtEl>
-                                          <p:spTgt spid="19">
-                                            <p:txEl>
-                                              <p:pRg st="3" end="3"/>
-                                            </p:txEl>
-                                          </p:spTgt>
-                                        </p:tgtEl>
-                                        <p:attrNameLst>
-                                          <p:attrName>style.visibility</p:attrName>
-                                        </p:attrNameLst>
-                                      </p:cBhvr>
-                                      <p:to>
-                                        <p:strVal val="visible"/>
-                                      </p:to>
-                                    </p:set>
-                                  </p:childTnLst>
-                                </p:cTn>
-                              </p:par>
-                            </p:childTnLst>
-                          </p:cTn>
-                        </p:par>
-                      </p:childTnLst>
-                    </p:cTn>
-                  </p:par>
-                </p:childTnLst>
-              </p:cTn>
-              <p:prevCondLst>
-                <p:cond evt="onPrev" delay="0">
-                  <p:tgtEl>
-                    <p:sldTgt/>
-                  </p:tgtEl>
-                </p:cond>
-              </p:prevCondLst>
-              <p:nextCondLst>
-                <p:cond evt="onNext" delay="0">
-                  <p:tgtEl>
-                    <p:sldTgt/>
-                  </p:tgtEl>
-                </p:cond>
-              </p:nextCondLst>
-            </p:seq>
-          </p:childTnLst>
-        </p:cTn>
-      </p:par>
-    </p:tnLst>
-    <p:bldLst>
-      <p:bldP spid="15" grpId="0"/>
-      <p:bldP spid="15" grpId="1"/>
-      <p:bldP spid="16" grpId="0" animBg="1"/>
-      <p:bldP spid="16" grpId="1" animBg="1"/>
-      <p:bldP spid="17" grpId="0"/>
-      <p:bldP spid="17" grpId="1"/>
-    </p:bldLst>
-  </p:timing>
 </p:sld>
 </file>
 
@@ -14215,9 +12904,12 @@
           <a:p>
             <a:r>
               <a:rPr lang="en-US" dirty="0"/>
-              <a:t>Agenda</a:t>
-            </a:r>
-            <a:endParaRPr lang="cs-CZ" dirty="0"/>
+              <a:t>Why testing</a:t>
+            </a:r>
+            <a:r>
+              <a:rPr lang="cs-CZ" dirty="0"/>
+              <a:t>?</a:t>
+            </a:r>
           </a:p>
         </p:txBody>
       </p:sp>
@@ -14233,107 +12925,60 @@
         </p:nvSpPr>
         <p:spPr/>
         <p:txBody>
-          <a:bodyPr>
-            <a:normAutofit fontScale="92500" lnSpcReduction="10000"/>
-          </a:bodyPr>
+          <a:bodyPr/>
           <a:lstStyle/>
           <a:p>
             <a:r>
               <a:rPr lang="en-US" dirty="0"/>
-              <a:t>Testing? Why should I care?</a:t>
+              <a:t>Tests define the behavior of application</a:t>
             </a:r>
           </a:p>
           <a:p>
             <a:r>
               <a:rPr lang="en-US" dirty="0"/>
-              <a:t>Test pyramid</a:t>
-            </a:r>
+              <a:t>Allow safe changes and refactoring</a:t>
+            </a:r>
+            <a:endParaRPr lang="cs-CZ" dirty="0"/>
           </a:p>
           <a:p>
             <a:r>
               <a:rPr lang="en-US" dirty="0"/>
-              <a:t>Different kinds of tests</a:t>
-            </a:r>
+              <a:t>Simplify debugging</a:t>
+            </a:r>
+            <a:endParaRPr lang="cs-CZ" dirty="0"/>
           </a:p>
           <a:p>
             <a:pPr lvl="1"/>
             <a:r>
               <a:rPr lang="en-US" dirty="0"/>
-              <a:t>Unit tests</a:t>
+              <a:t>Debugging against unit test is much cheaper than against live application</a:t>
+            </a:r>
+            <a:endParaRPr lang="cs-CZ" dirty="0"/>
+          </a:p>
+          <a:p>
+            <a:r>
+              <a:rPr lang="en-US" dirty="0"/>
+              <a:t>Improve code quality</a:t>
+            </a:r>
+          </a:p>
+          <a:p>
+            <a:r>
+              <a:rPr lang="en-US" dirty="0"/>
+              <a:t>What to test?</a:t>
             </a:r>
           </a:p>
           <a:p>
             <a:pPr lvl="1"/>
             <a:r>
               <a:rPr lang="en-US" dirty="0"/>
-              <a:t>Integration tests</a:t>
+              <a:t>Consider gain/price ratio</a:t>
             </a:r>
           </a:p>
           <a:p>
             <a:pPr lvl="1"/>
             <a:r>
               <a:rPr lang="en-US" dirty="0"/>
-              <a:t>End to end tests</a:t>
-            </a:r>
-          </a:p>
-          <a:p>
-            <a:r>
-              <a:rPr lang="en-US" dirty="0"/>
-              <a:t>Sample application</a:t>
-            </a:r>
-          </a:p>
-          <a:p>
-            <a:pPr lvl="1"/>
-            <a:r>
-              <a:rPr lang="en-US" dirty="0"/>
-              <a:t>Angular 5, ASP.NET Core 2.0 </a:t>
-            </a:r>
-            <a:r>
-              <a:rPr lang="en-US" dirty="0" err="1"/>
-              <a:t>WebApi</a:t>
-            </a:r>
-            <a:endParaRPr lang="en-US" dirty="0"/>
-          </a:p>
-          <a:p>
-            <a:pPr lvl="1"/>
-            <a:r>
-              <a:rPr lang="en-US" dirty="0"/>
-              <a:t>Server part</a:t>
-            </a:r>
-          </a:p>
-          <a:p>
-            <a:pPr lvl="2"/>
-            <a:r>
-              <a:rPr lang="en-US" dirty="0"/>
-              <a:t>code walkthrough</a:t>
-            </a:r>
-          </a:p>
-          <a:p>
-            <a:pPr lvl="2"/>
-            <a:r>
-              <a:rPr lang="en-US" dirty="0"/>
-              <a:t>tests walkthrough</a:t>
-            </a:r>
-          </a:p>
-          <a:p>
-            <a:pPr lvl="1"/>
-            <a:r>
-              <a:rPr lang="en-US" dirty="0"/>
-              <a:t>Client part</a:t>
-            </a:r>
-          </a:p>
-          <a:p>
-            <a:pPr lvl="2"/>
-            <a:r>
-              <a:rPr lang="en-US" dirty="0"/>
-              <a:t>code walkthrough</a:t>
-            </a:r>
-          </a:p>
-          <a:p>
-            <a:pPr lvl="2"/>
-            <a:r>
-              <a:rPr lang="en-US" dirty="0"/>
-              <a:t>tests walkthrough</a:t>
+              <a:t>Parts that have high impact on functionality bring more benefit</a:t>
             </a:r>
             <a:endParaRPr lang="cs-CZ" dirty="0"/>
           </a:p>
@@ -14366,7 +13011,7 @@
     </p:spTree>
     <p:extLst>
       <p:ext uri="{BB962C8B-B14F-4D97-AF65-F5344CB8AC3E}">
-        <p14:creationId xmlns:p14="http://schemas.microsoft.com/office/powerpoint/2010/main" val="22058017"/>
+        <p14:creationId xmlns:p14="http://schemas.microsoft.com/office/powerpoint/2010/main" val="714382908"/>
       </p:ext>
     </p:extLst>
   </p:cSld>
@@ -14409,84 +13054,10 @@
           <a:lstStyle/>
           <a:p>
             <a:r>
-              <a:rPr lang="en-US" dirty="0"/>
-              <a:t>Why testing</a:t>
-            </a:r>
-            <a:r>
               <a:rPr lang="cs-CZ" dirty="0"/>
-              <a:t>?</a:t>
-            </a:r>
-          </a:p>
-        </p:txBody>
-      </p:sp>
-      <p:sp>
-        <p:nvSpPr>
-          <p:cNvPr id="3" name="Content Placeholder 2"/>
-          <p:cNvSpPr>
-            <a:spLocks noGrp="1"/>
-          </p:cNvSpPr>
-          <p:nvPr>
-            <p:ph idx="1"/>
-          </p:nvPr>
-        </p:nvSpPr>
-        <p:spPr/>
-        <p:txBody>
-          <a:bodyPr/>
-          <a:lstStyle/>
-          <a:p>
-            <a:r>
-              <a:rPr lang="en-US" dirty="0"/>
-              <a:t>Tests define the behavior of application</a:t>
-            </a:r>
-          </a:p>
-          <a:p>
-            <a:r>
-              <a:rPr lang="en-US" dirty="0"/>
-              <a:t>Allow safe changes and refactoring</a:t>
-            </a:r>
-            <a:endParaRPr lang="cs-CZ" dirty="0"/>
-          </a:p>
-          <a:p>
-            <a:r>
-              <a:rPr lang="en-US" dirty="0"/>
-              <a:t>Simplify debugging</a:t>
-            </a:r>
-            <a:endParaRPr lang="cs-CZ" dirty="0"/>
-          </a:p>
-          <a:p>
-            <a:pPr lvl="1"/>
-            <a:r>
-              <a:rPr lang="en-US" dirty="0"/>
-              <a:t>Debugging against unit test is much cheaper than against live application</a:t>
-            </a:r>
-            <a:endParaRPr lang="cs-CZ" dirty="0"/>
-          </a:p>
-          <a:p>
-            <a:r>
-              <a:rPr lang="en-US" dirty="0"/>
-              <a:t>Improve code quality</a:t>
-            </a:r>
-          </a:p>
-          <a:p>
-            <a:r>
-              <a:rPr lang="en-US" dirty="0"/>
-              <a:t>What to test?</a:t>
-            </a:r>
-          </a:p>
-          <a:p>
-            <a:pPr lvl="1"/>
-            <a:r>
-              <a:rPr lang="en-US" dirty="0"/>
-              <a:t>Consider gain/price ratio</a:t>
-            </a:r>
-          </a:p>
-          <a:p>
-            <a:pPr lvl="1"/>
-            <a:r>
-              <a:rPr lang="en-US" dirty="0"/>
-              <a:t>Parts that have high impact on functionality bring more benefit</a:t>
-            </a:r>
-            <a:endParaRPr lang="cs-CZ" dirty="0"/>
+              <a:t>Test pyramid</a:t>
+            </a:r>
+            <a:endParaRPr lang="en-US" dirty="0"/>
           </a:p>
         </p:txBody>
       </p:sp>
@@ -14509,83 +13080,6 @@
               <a:rPr lang="en-US" smtClean="0"/>
               <a:pPr/>
               <a:t>4</a:t>
-            </a:fld>
-            <a:endParaRPr lang="en-US" dirty="0"/>
-          </a:p>
-        </p:txBody>
-      </p:sp>
-    </p:spTree>
-    <p:extLst>
-      <p:ext uri="{BB962C8B-B14F-4D97-AF65-F5344CB8AC3E}">
-        <p14:creationId xmlns:p14="http://schemas.microsoft.com/office/powerpoint/2010/main" val="714382908"/>
-      </p:ext>
-    </p:extLst>
-  </p:cSld>
-  <p:clrMapOvr>
-    <a:masterClrMapping/>
-  </p:clrMapOvr>
-</p:sld>
-</file>
-
-<file path=ppt/slides/slide5.xml><?xml version="1.0" encoding="utf-8"?>
-<p:sld xmlns:a="http://schemas.openxmlformats.org/drawingml/2006/main" xmlns:r="http://schemas.openxmlformats.org/officeDocument/2006/relationships" xmlns:p="http://schemas.openxmlformats.org/presentationml/2006/main">
-  <p:cSld>
-    <p:spTree>
-      <p:nvGrpSpPr>
-        <p:cNvPr id="1" name=""/>
-        <p:cNvGrpSpPr/>
-        <p:nvPr/>
-      </p:nvGrpSpPr>
-      <p:grpSpPr>
-        <a:xfrm>
-          <a:off x="0" y="0"/>
-          <a:ext cx="0" cy="0"/>
-          <a:chOff x="0" y="0"/>
-          <a:chExt cx="0" cy="0"/>
-        </a:xfrm>
-      </p:grpSpPr>
-      <p:sp>
-        <p:nvSpPr>
-          <p:cNvPr id="2" name="Title 1"/>
-          <p:cNvSpPr>
-            <a:spLocks noGrp="1"/>
-          </p:cNvSpPr>
-          <p:nvPr>
-            <p:ph type="title"/>
-          </p:nvPr>
-        </p:nvSpPr>
-        <p:spPr/>
-        <p:txBody>
-          <a:bodyPr/>
-          <a:lstStyle/>
-          <a:p>
-            <a:r>
-              <a:rPr lang="cs-CZ" dirty="0"/>
-              <a:t>Test pyramid</a:t>
-            </a:r>
-            <a:endParaRPr lang="en-US" dirty="0"/>
-          </a:p>
-        </p:txBody>
-      </p:sp>
-      <p:sp>
-        <p:nvSpPr>
-          <p:cNvPr id="5" name="Slide Number Placeholder 4"/>
-          <p:cNvSpPr>
-            <a:spLocks noGrp="1"/>
-          </p:cNvSpPr>
-          <p:nvPr>
-            <p:ph type="sldNum" sz="quarter" idx="12"/>
-          </p:nvPr>
-        </p:nvSpPr>
-        <p:spPr/>
-        <p:txBody>
-          <a:bodyPr/>
-          <a:lstStyle/>
-          <a:p>
-            <a:fld id="{009831D7-A162-FC48-82E7-0E3299834122}" type="slidenum">
-              <a:rPr lang="en-US" smtClean="0"/>
-              <a:pPr/>
-              <a:t>5</a:t>
             </a:fld>
             <a:endParaRPr lang="en-US" dirty="0"/>
           </a:p>
@@ -14824,7 +13318,7 @@
 </p:sld>
 </file>
 
-<file path=ppt/slides/slide6.xml><?xml version="1.0" encoding="utf-8"?>
+<file path=ppt/slides/slide5.xml><?xml version="1.0" encoding="utf-8"?>
 <p:sld xmlns:a="http://schemas.openxmlformats.org/drawingml/2006/main" xmlns:r="http://schemas.openxmlformats.org/officeDocument/2006/relationships" xmlns:p="http://schemas.openxmlformats.org/presentationml/2006/main">
   <p:cSld>
     <p:spTree>
@@ -15037,7 +13531,7 @@
 </p:sld>
 </file>
 
-<file path=ppt/slides/slide7.xml><?xml version="1.0" encoding="utf-8"?>
+<file path=ppt/slides/slide6.xml><?xml version="1.0" encoding="utf-8"?>
 <p:sld xmlns:a="http://schemas.openxmlformats.org/drawingml/2006/main" xmlns:r="http://schemas.openxmlformats.org/officeDocument/2006/relationships" xmlns:p="http://schemas.openxmlformats.org/presentationml/2006/main">
   <p:cSld>
     <p:spTree>
@@ -15157,7 +13651,7 @@
             <a:fld id="{009831D7-A162-FC48-82E7-0E3299834122}" type="slidenum">
               <a:rPr lang="en-US" smtClean="0"/>
               <a:pPr/>
-              <a:t>7</a:t>
+              <a:t>6</a:t>
             </a:fld>
             <a:endParaRPr lang="en-US" dirty="0"/>
           </a:p>
@@ -15404,7 +13898,7 @@
 </p:sld>
 </file>
 
-<file path=ppt/slides/slide8.xml><?xml version="1.0" encoding="utf-8"?>
+<file path=ppt/slides/slide7.xml><?xml version="1.0" encoding="utf-8"?>
 <p:sld xmlns:a="http://schemas.openxmlformats.org/drawingml/2006/main" xmlns:r="http://schemas.openxmlformats.org/officeDocument/2006/relationships" xmlns:p="http://schemas.openxmlformats.org/presentationml/2006/main">
   <p:cSld>
     <p:spTree>
@@ -15554,7 +14048,7 @@
             <a:fld id="{009831D7-A162-FC48-82E7-0E3299834122}" type="slidenum">
               <a:rPr lang="en-US" smtClean="0"/>
               <a:pPr/>
-              <a:t>8</a:t>
+              <a:t>7</a:t>
             </a:fld>
             <a:endParaRPr lang="en-US" dirty="0"/>
           </a:p>
@@ -15856,7 +14350,7 @@
 </p:sld>
 </file>
 
-<file path=ppt/slides/slide9.xml><?xml version="1.0" encoding="utf-8"?>
+<file path=ppt/slides/slide8.xml><?xml version="1.0" encoding="utf-8"?>
 <p:sld xmlns:a="http://schemas.openxmlformats.org/drawingml/2006/main" xmlns:r="http://schemas.openxmlformats.org/officeDocument/2006/relationships" xmlns:p="http://schemas.openxmlformats.org/presentationml/2006/main">
   <p:cSld>
     <p:spTree>
@@ -16030,7 +14524,7 @@
             <a:fld id="{009831D7-A162-FC48-82E7-0E3299834122}" type="slidenum">
               <a:rPr lang="en-US" smtClean="0"/>
               <a:pPr/>
-              <a:t>9</a:t>
+              <a:t>8</a:t>
             </a:fld>
             <a:endParaRPr lang="en-US" dirty="0"/>
           </a:p>
@@ -16507,6 +15001,174 @@
       </p:par>
     </p:tnLst>
   </p:timing>
+</p:sld>
+</file>
+
+<file path=ppt/slides/slide9.xml><?xml version="1.0" encoding="utf-8"?>
+<p:sld xmlns:a="http://schemas.openxmlformats.org/drawingml/2006/main" xmlns:r="http://schemas.openxmlformats.org/officeDocument/2006/relationships" xmlns:p="http://schemas.openxmlformats.org/presentationml/2006/main">
+  <p:cSld>
+    <p:spTree>
+      <p:nvGrpSpPr>
+        <p:cNvPr id="1" name=""/>
+        <p:cNvGrpSpPr/>
+        <p:nvPr/>
+      </p:nvGrpSpPr>
+      <p:grpSpPr>
+        <a:xfrm>
+          <a:off x="0" y="0"/>
+          <a:ext cx="0" cy="0"/>
+          <a:chOff x="0" y="0"/>
+          <a:chExt cx="0" cy="0"/>
+        </a:xfrm>
+      </p:grpSpPr>
+      <p:sp>
+        <p:nvSpPr>
+          <p:cNvPr id="2" name="Title 1"/>
+          <p:cNvSpPr>
+            <a:spLocks noGrp="1"/>
+          </p:cNvSpPr>
+          <p:nvPr>
+            <p:ph type="title"/>
+          </p:nvPr>
+        </p:nvSpPr>
+        <p:spPr/>
+        <p:txBody>
+          <a:bodyPr/>
+          <a:lstStyle/>
+          <a:p>
+            <a:r>
+              <a:rPr lang="en-US" dirty="0"/>
+              <a:t>Integration tests</a:t>
+            </a:r>
+            <a:endParaRPr lang="cs-CZ" dirty="0"/>
+          </a:p>
+        </p:txBody>
+      </p:sp>
+      <p:sp>
+        <p:nvSpPr>
+          <p:cNvPr id="3" name="Content Placeholder 2"/>
+          <p:cNvSpPr>
+            <a:spLocks noGrp="1"/>
+          </p:cNvSpPr>
+          <p:nvPr>
+            <p:ph idx="1"/>
+          </p:nvPr>
+        </p:nvSpPr>
+        <p:spPr/>
+        <p:txBody>
+          <a:bodyPr/>
+          <a:lstStyle/>
+          <a:p>
+            <a:r>
+              <a:rPr lang="en-US" dirty="0"/>
+              <a:t>Test more classes or components together</a:t>
+            </a:r>
+            <a:endParaRPr lang="cs-CZ" dirty="0"/>
+          </a:p>
+          <a:p>
+            <a:r>
+              <a:rPr lang="en-US" dirty="0"/>
+              <a:t>Focused on component integration</a:t>
+            </a:r>
+            <a:endParaRPr lang="cs-CZ" dirty="0"/>
+          </a:p>
+          <a:p>
+            <a:pPr lvl="1"/>
+            <a:r>
+              <a:rPr lang="en-US" dirty="0"/>
+              <a:t>Correct use of API</a:t>
+            </a:r>
+            <a:endParaRPr lang="cs-CZ" dirty="0"/>
+          </a:p>
+          <a:p>
+            <a:r>
+              <a:rPr lang="en-US" dirty="0"/>
+              <a:t>Good to use when</a:t>
+            </a:r>
+            <a:endParaRPr lang="cs-CZ" dirty="0"/>
+          </a:p>
+          <a:p>
+            <a:pPr lvl="1"/>
+            <a:r>
+              <a:rPr lang="en-US" dirty="0"/>
+              <a:t>Testing component alone is too complex to setup</a:t>
+            </a:r>
+            <a:endParaRPr lang="cs-CZ" dirty="0"/>
+          </a:p>
+          <a:p>
+            <a:pPr lvl="1"/>
+            <a:r>
+              <a:rPr lang="en-US" dirty="0"/>
+              <a:t>Component integration is not trivial</a:t>
+            </a:r>
+            <a:endParaRPr lang="cs-CZ" dirty="0"/>
+          </a:p>
+          <a:p>
+            <a:pPr lvl="1"/>
+            <a:r>
+              <a:rPr lang="en-US" dirty="0"/>
+              <a:t>To test complex workflows</a:t>
+            </a:r>
+          </a:p>
+          <a:p>
+            <a:r>
+              <a:rPr lang="en-US" dirty="0"/>
+              <a:t>More expensive than unit tests but still good</a:t>
+            </a:r>
+          </a:p>
+          <a:p>
+            <a:pPr lvl="1"/>
+            <a:r>
+              <a:rPr lang="en-US" dirty="0"/>
+              <a:t>Slower</a:t>
+            </a:r>
+          </a:p>
+          <a:p>
+            <a:pPr lvl="1"/>
+            <a:r>
+              <a:rPr lang="en-US" dirty="0"/>
+              <a:t>Harder to maintain</a:t>
+            </a:r>
+          </a:p>
+        </p:txBody>
+      </p:sp>
+      <p:sp>
+        <p:nvSpPr>
+          <p:cNvPr id="4" name="Slide Number Placeholder 4"/>
+          <p:cNvSpPr>
+            <a:spLocks noGrp="1"/>
+          </p:cNvSpPr>
+          <p:nvPr>
+            <p:ph type="sldNum" sz="quarter" idx="12"/>
+          </p:nvPr>
+        </p:nvSpPr>
+        <p:spPr>
+          <a:xfrm>
+            <a:off x="4264783" y="6473950"/>
+            <a:ext cx="614434" cy="365125"/>
+          </a:xfrm>
+        </p:spPr>
+        <p:txBody>
+          <a:bodyPr/>
+          <a:lstStyle/>
+          <a:p>
+            <a:r>
+              <a:rPr lang="en-US" dirty="0"/>
+              <a:t>8</a:t>
+            </a:r>
+          </a:p>
+        </p:txBody>
+      </p:sp>
+    </p:spTree>
+    <p:extLst>
+      <p:ext uri="{BB962C8B-B14F-4D97-AF65-F5344CB8AC3E}">
+        <p14:creationId xmlns:p14="http://schemas.microsoft.com/office/powerpoint/2010/main" val="3548815812"/>
+      </p:ext>
+    </p:extLst>
+  </p:cSld>
+  <p:clrMapOvr>
+    <a:masterClrMapping/>
+  </p:clrMapOvr>
 </p:sld>
 </file>
 

</xml_diff>